<commit_message>
Se agregaron imágenes de apoyo
</commit_message>
<xml_diff>
--- a/DocumentosTesina/Presentación.pptx
+++ b/DocumentosTesina/Presentación.pptx
@@ -129,7 +129,7 @@
 
 <file path=ppt/commentAuthors.xml><?xml version="1.0" encoding="utf-8"?>
 <p:cmAuthorLst xmlns:a="http://schemas.openxmlformats.org/drawingml/2006/main" xmlns:r="http://schemas.openxmlformats.org/officeDocument/2006/relationships" xmlns:p="http://schemas.openxmlformats.org/presentationml/2006/main">
-  <p:cmAuthor id="2" name="Autor" initials="A" lastIdx="6" clrIdx="1"/>
+  <p:cmAuthor id="2" name="Autor" initials="A" lastIdx="9" clrIdx="1"/>
 </p:cmAuthorLst>
 </file>
 
@@ -139,6 +139,15 @@
     <p:pos x="10" y="10"/>
     <p:text>Diapositiva #1
 Titulo, autor, director de tesis y comité tutoral, fecha de la presentación</p:text>
+    <p:extLst>
+      <p:ext uri="{C676402C-5697-4E1C-873F-D02D1690AC5C}">
+        <p15:threadingInfo xmlns:p15="http://schemas.microsoft.com/office/powerpoint/2012/main" timeZoneBias="300"/>
+      </p:ext>
+    </p:extLst>
+  </p:cm>
+  <p:cm authorId="2" dt="2020-04-16T16:42:20.421" idx="7">
+    <p:pos x="146" y="146"/>
+    <p:text/>
     <p:extLst>
       <p:ext uri="{C676402C-5697-4E1C-873F-D02D1690AC5C}">
         <p15:threadingInfo xmlns:p15="http://schemas.microsoft.com/office/powerpoint/2012/main" timeZoneBias="300"/>
@@ -169,6 +178,15 @@
     <p:pos x="10" y="10"/>
     <p:text>Diapositiva #3
 Objetivos.</p:text>
+    <p:extLst>
+      <p:ext uri="{C676402C-5697-4E1C-873F-D02D1690AC5C}">
+        <p15:threadingInfo xmlns:p15="http://schemas.microsoft.com/office/powerpoint/2012/main" timeZoneBias="300"/>
+      </p:ext>
+    </p:extLst>
+  </p:cm>
+  <p:cm authorId="2" dt="2020-04-16T17:05:01.934" idx="8">
+    <p:pos x="146" y="146"/>
+    <p:text/>
     <p:extLst>
       <p:ext uri="{C676402C-5697-4E1C-873F-D02D1690AC5C}">
         <p15:threadingInfo xmlns:p15="http://schemas.microsoft.com/office/powerpoint/2012/main" timeZoneBias="300"/>
@@ -207,6 +225,15 @@
       </p:ext>
     </p:extLst>
   </p:cm>
+  <p:cm authorId="2" dt="2020-04-16T17:25:10.834" idx="9">
+    <p:pos x="146" y="146"/>
+    <p:text/>
+    <p:extLst>
+      <p:ext uri="{C676402C-5697-4E1C-873F-D02D1690AC5C}">
+        <p15:threadingInfo xmlns:p15="http://schemas.microsoft.com/office/powerpoint/2012/main" timeZoneBias="300"/>
+      </p:ext>
+    </p:extLst>
+  </p:cm>
 </p:cmLst>
 </file>
 
@@ -225,2819 +252,6 @@
     </p:extLst>
   </p:cm>
 </p:cmLst>
-</file>
-
-<file path=ppt/diagrams/colors1.xml><?xml version="1.0" encoding="utf-8"?>
-<dgm:colorsDef xmlns:dgm="http://schemas.openxmlformats.org/drawingml/2006/diagram" xmlns:a="http://schemas.openxmlformats.org/drawingml/2006/main" uniqueId="urn:microsoft.com/office/officeart/2018/5/colors/Iconchunking_neutralbg_colorful1">
-  <dgm:title val=""/>
-  <dgm:desc val=""/>
-  <dgm:catLst>
-    <dgm:cat type="colorful" pri="10100"/>
-  </dgm:catLst>
-  <dgm:styleLbl name="node0">
-    <dgm:fillClrLst meth="repeat">
-      <a:schemeClr val="accent1"/>
-    </dgm:fillClrLst>
-    <dgm:linClrLst meth="repeat">
-      <a:schemeClr val="lt1"/>
-    </dgm:linClrLst>
-    <dgm:effectClrLst/>
-    <dgm:txLinClrLst/>
-    <dgm:txFillClrLst/>
-    <dgm:txEffectClrLst/>
-  </dgm:styleLbl>
-  <dgm:styleLbl name="node1">
-    <dgm:fillClrLst meth="repeat">
-      <a:schemeClr val="accent2"/>
-      <a:schemeClr val="accent3"/>
-      <a:schemeClr val="accent4"/>
-      <a:schemeClr val="accent5"/>
-      <a:schemeClr val="accent6"/>
-    </dgm:fillClrLst>
-    <dgm:linClrLst meth="repeat">
-      <a:schemeClr val="lt1">
-        <a:alpha val="0"/>
-      </a:schemeClr>
-    </dgm:linClrLst>
-    <dgm:effectClrLst/>
-    <dgm:txLinClrLst/>
-    <dgm:txFillClrLst/>
-    <dgm:txEffectClrLst/>
-  </dgm:styleLbl>
-  <dgm:styleLbl name="alignNode1">
-    <dgm:fillClrLst meth="repeat">
-      <a:schemeClr val="accent2"/>
-      <a:schemeClr val="accent3"/>
-      <a:schemeClr val="accent4"/>
-      <a:schemeClr val="accent5"/>
-      <a:schemeClr val="accent6"/>
-    </dgm:fillClrLst>
-    <dgm:linClrLst meth="repeat">
-      <a:schemeClr val="accent2"/>
-      <a:schemeClr val="accent3"/>
-      <a:schemeClr val="accent4"/>
-      <a:schemeClr val="accent5"/>
-      <a:schemeClr val="accent6"/>
-    </dgm:linClrLst>
-    <dgm:effectClrLst/>
-    <dgm:txLinClrLst/>
-    <dgm:txFillClrLst/>
-    <dgm:txEffectClrLst/>
-  </dgm:styleLbl>
-  <dgm:styleLbl name="lnNode1">
-    <dgm:fillClrLst meth="repeat">
-      <a:schemeClr val="accent2"/>
-      <a:schemeClr val="accent3"/>
-      <a:schemeClr val="accent4"/>
-      <a:schemeClr val="accent5"/>
-      <a:schemeClr val="accent6"/>
-    </dgm:fillClrLst>
-    <dgm:linClrLst meth="repeat">
-      <a:schemeClr val="lt1"/>
-    </dgm:linClrLst>
-    <dgm:effectClrLst/>
-    <dgm:txLinClrLst/>
-    <dgm:txFillClrLst/>
-    <dgm:txEffectClrLst/>
-  </dgm:styleLbl>
-  <dgm:styleLbl name="vennNode1">
-    <dgm:fillClrLst meth="repeat">
-      <a:schemeClr val="accent2">
-        <a:alpha val="50000"/>
-      </a:schemeClr>
-      <a:schemeClr val="accent3">
-        <a:alpha val="50000"/>
-      </a:schemeClr>
-      <a:schemeClr val="accent4">
-        <a:alpha val="50000"/>
-      </a:schemeClr>
-      <a:schemeClr val="accent5">
-        <a:alpha val="50000"/>
-      </a:schemeClr>
-      <a:schemeClr val="accent6">
-        <a:alpha val="50000"/>
-      </a:schemeClr>
-    </dgm:fillClrLst>
-    <dgm:linClrLst meth="repeat">
-      <a:schemeClr val="lt1"/>
-    </dgm:linClrLst>
-    <dgm:effectClrLst/>
-    <dgm:txLinClrLst/>
-    <dgm:txFillClrLst/>
-    <dgm:txEffectClrLst/>
-  </dgm:styleLbl>
-  <dgm:styleLbl name="node2">
-    <dgm:fillClrLst>
-      <a:schemeClr val="accent2"/>
-    </dgm:fillClrLst>
-    <dgm:linClrLst meth="repeat">
-      <a:schemeClr val="lt1"/>
-    </dgm:linClrLst>
-    <dgm:effectClrLst/>
-    <dgm:txLinClrLst/>
-    <dgm:txFillClrLst/>
-    <dgm:txEffectClrLst/>
-  </dgm:styleLbl>
-  <dgm:styleLbl name="node3">
-    <dgm:fillClrLst>
-      <a:schemeClr val="accent3"/>
-    </dgm:fillClrLst>
-    <dgm:linClrLst meth="repeat">
-      <a:schemeClr val="lt1"/>
-    </dgm:linClrLst>
-    <dgm:effectClrLst/>
-    <dgm:txLinClrLst/>
-    <dgm:txFillClrLst/>
-    <dgm:txEffectClrLst/>
-  </dgm:styleLbl>
-  <dgm:styleLbl name="node4">
-    <dgm:fillClrLst>
-      <a:schemeClr val="accent4"/>
-    </dgm:fillClrLst>
-    <dgm:linClrLst meth="repeat">
-      <a:schemeClr val="lt1"/>
-    </dgm:linClrLst>
-    <dgm:effectClrLst/>
-    <dgm:txLinClrLst/>
-    <dgm:txFillClrLst/>
-    <dgm:txEffectClrLst/>
-  </dgm:styleLbl>
-  <dgm:styleLbl name="fgImgPlace1">
-    <dgm:fillClrLst meth="repeat">
-      <a:schemeClr val="accent2">
-        <a:tint val="50000"/>
-      </a:schemeClr>
-      <a:schemeClr val="accent3">
-        <a:tint val="50000"/>
-      </a:schemeClr>
-      <a:schemeClr val="accent4">
-        <a:tint val="50000"/>
-      </a:schemeClr>
-      <a:schemeClr val="accent5">
-        <a:tint val="50000"/>
-      </a:schemeClr>
-      <a:schemeClr val="accent6">
-        <a:tint val="50000"/>
-      </a:schemeClr>
-    </dgm:fillClrLst>
-    <dgm:linClrLst meth="repeat">
-      <a:schemeClr val="lt1"/>
-    </dgm:linClrLst>
-    <dgm:effectClrLst/>
-    <dgm:txLinClrLst/>
-    <dgm:txFillClrLst meth="repeat">
-      <a:schemeClr val="lt1"/>
-    </dgm:txFillClrLst>
-    <dgm:txEffectClrLst/>
-  </dgm:styleLbl>
-  <dgm:styleLbl name="alignImgPlace1">
-    <dgm:fillClrLst>
-      <a:schemeClr val="accent1">
-        <a:tint val="50000"/>
-      </a:schemeClr>
-      <a:schemeClr val="accent2">
-        <a:tint val="20000"/>
-      </a:schemeClr>
-    </dgm:fillClrLst>
-    <dgm:linClrLst meth="repeat">
-      <a:schemeClr val="lt1"/>
-    </dgm:linClrLst>
-    <dgm:effectClrLst/>
-    <dgm:txLinClrLst/>
-    <dgm:txFillClrLst meth="repeat">
-      <a:schemeClr val="lt1"/>
-    </dgm:txFillClrLst>
-    <dgm:txEffectClrLst/>
-  </dgm:styleLbl>
-  <dgm:styleLbl name="bgImgPlace1">
-    <dgm:fillClrLst>
-      <a:schemeClr val="accent1">
-        <a:tint val="50000"/>
-      </a:schemeClr>
-      <a:schemeClr val="accent2">
-        <a:tint val="20000"/>
-      </a:schemeClr>
-    </dgm:fillClrLst>
-    <dgm:linClrLst meth="repeat">
-      <a:schemeClr val="lt1"/>
-    </dgm:linClrLst>
-    <dgm:effectClrLst/>
-    <dgm:txLinClrLst/>
-    <dgm:txFillClrLst meth="repeat">
-      <a:schemeClr val="lt1"/>
-    </dgm:txFillClrLst>
-    <dgm:txEffectClrLst/>
-  </dgm:styleLbl>
-  <dgm:styleLbl name="sibTrans2D1">
-    <dgm:fillClrLst meth="repeat">
-      <a:schemeClr val="accent2"/>
-      <a:schemeClr val="accent3"/>
-      <a:schemeClr val="accent4"/>
-      <a:schemeClr val="accent5"/>
-      <a:schemeClr val="accent6"/>
-    </dgm:fillClrLst>
-    <dgm:linClrLst meth="cycle">
-      <a:schemeClr val="lt1"/>
-    </dgm:linClrLst>
-    <dgm:effectClrLst/>
-    <dgm:txLinClrLst/>
-    <dgm:txFillClrLst/>
-    <dgm:txEffectClrLst/>
-  </dgm:styleLbl>
-  <dgm:styleLbl name="fgSibTrans2D1">
-    <dgm:fillClrLst meth="repeat">
-      <a:schemeClr val="accent2"/>
-      <a:schemeClr val="accent3"/>
-      <a:schemeClr val="accent4"/>
-      <a:schemeClr val="accent5"/>
-      <a:schemeClr val="accent6"/>
-    </dgm:fillClrLst>
-    <dgm:linClrLst meth="cycle">
-      <a:schemeClr val="lt1"/>
-    </dgm:linClrLst>
-    <dgm:effectClrLst/>
-    <dgm:txLinClrLst/>
-    <dgm:txFillClrLst meth="repeat">
-      <a:schemeClr val="lt1"/>
-    </dgm:txFillClrLst>
-    <dgm:txEffectClrLst/>
-  </dgm:styleLbl>
-  <dgm:styleLbl name="bgSibTrans2D1">
-    <dgm:fillClrLst meth="repeat">
-      <a:schemeClr val="accent2"/>
-      <a:schemeClr val="accent3"/>
-      <a:schemeClr val="accent4"/>
-      <a:schemeClr val="accent5"/>
-      <a:schemeClr val="accent6"/>
-    </dgm:fillClrLst>
-    <dgm:linClrLst meth="cycle">
-      <a:schemeClr val="lt1"/>
-    </dgm:linClrLst>
-    <dgm:effectClrLst/>
-    <dgm:txLinClrLst/>
-    <dgm:txFillClrLst meth="repeat">
-      <a:schemeClr val="lt1"/>
-    </dgm:txFillClrLst>
-    <dgm:txEffectClrLst/>
-  </dgm:styleLbl>
-  <dgm:styleLbl name="sibTrans1D1">
-    <dgm:fillClrLst meth="repeat">
-      <a:schemeClr val="accent2"/>
-      <a:schemeClr val="accent3"/>
-      <a:schemeClr val="accent4"/>
-      <a:schemeClr val="accent5"/>
-      <a:schemeClr val="accent6"/>
-    </dgm:fillClrLst>
-    <dgm:linClrLst meth="repeat">
-      <a:schemeClr val="accent2"/>
-      <a:schemeClr val="accent3"/>
-      <a:schemeClr val="accent4"/>
-      <a:schemeClr val="accent5"/>
-      <a:schemeClr val="accent6"/>
-    </dgm:linClrLst>
-    <dgm:effectClrLst/>
-    <dgm:txLinClrLst/>
-    <dgm:txFillClrLst meth="repeat">
-      <a:schemeClr val="tx1"/>
-    </dgm:txFillClrLst>
-    <dgm:txEffectClrLst/>
-  </dgm:styleLbl>
-  <dgm:styleLbl name="callout">
-    <dgm:fillClrLst meth="repeat">
-      <a:schemeClr val="accent2"/>
-    </dgm:fillClrLst>
-    <dgm:linClrLst meth="repeat">
-      <a:schemeClr val="accent2">
-        <a:tint val="50000"/>
-      </a:schemeClr>
-    </dgm:linClrLst>
-    <dgm:effectClrLst/>
-    <dgm:txLinClrLst/>
-    <dgm:txFillClrLst meth="repeat">
-      <a:schemeClr val="tx1"/>
-    </dgm:txFillClrLst>
-    <dgm:txEffectClrLst/>
-  </dgm:styleLbl>
-  <dgm:styleLbl name="asst0">
-    <dgm:fillClrLst meth="repeat">
-      <a:schemeClr val="accent1"/>
-    </dgm:fillClrLst>
-    <dgm:linClrLst meth="repeat">
-      <a:schemeClr val="lt1"/>
-    </dgm:linClrLst>
-    <dgm:effectClrLst/>
-    <dgm:txLinClrLst/>
-    <dgm:txFillClrLst/>
-    <dgm:txEffectClrLst/>
-  </dgm:styleLbl>
-  <dgm:styleLbl name="asst1">
-    <dgm:fillClrLst meth="repeat">
-      <a:schemeClr val="accent2"/>
-    </dgm:fillClrLst>
-    <dgm:linClrLst meth="repeat">
-      <a:schemeClr val="lt1"/>
-    </dgm:linClrLst>
-    <dgm:effectClrLst/>
-    <dgm:txLinClrLst/>
-    <dgm:txFillClrLst/>
-    <dgm:txEffectClrLst/>
-  </dgm:styleLbl>
-  <dgm:styleLbl name="asst2">
-    <dgm:fillClrLst>
-      <a:schemeClr val="accent3"/>
-    </dgm:fillClrLst>
-    <dgm:linClrLst meth="repeat">
-      <a:schemeClr val="lt1"/>
-    </dgm:linClrLst>
-    <dgm:effectClrLst/>
-    <dgm:txLinClrLst/>
-    <dgm:txFillClrLst/>
-    <dgm:txEffectClrLst/>
-  </dgm:styleLbl>
-  <dgm:styleLbl name="asst3">
-    <dgm:fillClrLst>
-      <a:schemeClr val="accent4"/>
-    </dgm:fillClrLst>
-    <dgm:linClrLst meth="repeat">
-      <a:schemeClr val="lt1"/>
-    </dgm:linClrLst>
-    <dgm:effectClrLst/>
-    <dgm:txLinClrLst/>
-    <dgm:txFillClrLst/>
-    <dgm:txEffectClrLst/>
-  </dgm:styleLbl>
-  <dgm:styleLbl name="asst4">
-    <dgm:fillClrLst>
-      <a:schemeClr val="accent5"/>
-    </dgm:fillClrLst>
-    <dgm:linClrLst meth="repeat">
-      <a:schemeClr val="lt1"/>
-    </dgm:linClrLst>
-    <dgm:effectClrLst/>
-    <dgm:txLinClrLst/>
-    <dgm:txFillClrLst/>
-    <dgm:txEffectClrLst/>
-  </dgm:styleLbl>
-  <dgm:styleLbl name="parChTrans2D1">
-    <dgm:fillClrLst meth="repeat">
-      <a:schemeClr val="accent2"/>
-    </dgm:fillClrLst>
-    <dgm:linClrLst meth="repeat">
-      <a:schemeClr val="lt1"/>
-    </dgm:linClrLst>
-    <dgm:effectClrLst/>
-    <dgm:txLinClrLst/>
-    <dgm:txFillClrLst meth="repeat">
-      <a:schemeClr val="lt1"/>
-    </dgm:txFillClrLst>
-    <dgm:txEffectClrLst/>
-  </dgm:styleLbl>
-  <dgm:styleLbl name="parChTrans2D2">
-    <dgm:fillClrLst meth="repeat">
-      <a:schemeClr val="accent3"/>
-    </dgm:fillClrLst>
-    <dgm:linClrLst meth="repeat">
-      <a:schemeClr val="lt1"/>
-    </dgm:linClrLst>
-    <dgm:effectClrLst/>
-    <dgm:txLinClrLst/>
-    <dgm:txFillClrLst/>
-    <dgm:txEffectClrLst/>
-  </dgm:styleLbl>
-  <dgm:styleLbl name="parChTrans2D3">
-    <dgm:fillClrLst meth="repeat">
-      <a:schemeClr val="accent4"/>
-    </dgm:fillClrLst>
-    <dgm:linClrLst meth="repeat">
-      <a:schemeClr val="lt1"/>
-    </dgm:linClrLst>
-    <dgm:effectClrLst/>
-    <dgm:txLinClrLst/>
-    <dgm:txFillClrLst/>
-    <dgm:txEffectClrLst/>
-  </dgm:styleLbl>
-  <dgm:styleLbl name="parChTrans2D4">
-    <dgm:fillClrLst meth="repeat">
-      <a:schemeClr val="accent5"/>
-    </dgm:fillClrLst>
-    <dgm:linClrLst meth="repeat">
-      <a:schemeClr val="lt1"/>
-    </dgm:linClrLst>
-    <dgm:effectClrLst/>
-    <dgm:txLinClrLst/>
-    <dgm:txFillClrLst meth="repeat">
-      <a:schemeClr val="lt1"/>
-    </dgm:txFillClrLst>
-    <dgm:txEffectClrLst/>
-  </dgm:styleLbl>
-  <dgm:styleLbl name="parChTrans1D1">
-    <dgm:fillClrLst meth="repeat">
-      <a:schemeClr val="accent2"/>
-    </dgm:fillClrLst>
-    <dgm:linClrLst meth="repeat">
-      <a:schemeClr val="accent1"/>
-    </dgm:linClrLst>
-    <dgm:effectClrLst/>
-    <dgm:txLinClrLst/>
-    <dgm:txFillClrLst meth="repeat">
-      <a:schemeClr val="tx1"/>
-    </dgm:txFillClrLst>
-    <dgm:txEffectClrLst/>
-  </dgm:styleLbl>
-  <dgm:styleLbl name="parChTrans1D2">
-    <dgm:fillClrLst meth="repeat">
-      <a:schemeClr val="accent3">
-        <a:tint val="90000"/>
-      </a:schemeClr>
-    </dgm:fillClrLst>
-    <dgm:linClrLst meth="repeat">
-      <a:schemeClr val="accent2"/>
-    </dgm:linClrLst>
-    <dgm:effectClrLst/>
-    <dgm:txLinClrLst/>
-    <dgm:txFillClrLst meth="repeat">
-      <a:schemeClr val="tx1"/>
-    </dgm:txFillClrLst>
-    <dgm:txEffectClrLst/>
-  </dgm:styleLbl>
-  <dgm:styleLbl name="parChTrans1D3">
-    <dgm:fillClrLst meth="repeat">
-      <a:schemeClr val="accent4">
-        <a:tint val="70000"/>
-      </a:schemeClr>
-    </dgm:fillClrLst>
-    <dgm:linClrLst meth="repeat">
-      <a:schemeClr val="accent3"/>
-    </dgm:linClrLst>
-    <dgm:effectClrLst/>
-    <dgm:txLinClrLst/>
-    <dgm:txFillClrLst meth="repeat">
-      <a:schemeClr val="tx1"/>
-    </dgm:txFillClrLst>
-    <dgm:txEffectClrLst/>
-  </dgm:styleLbl>
-  <dgm:styleLbl name="parChTrans1D4">
-    <dgm:fillClrLst meth="repeat">
-      <a:schemeClr val="accent5">
-        <a:tint val="50000"/>
-      </a:schemeClr>
-    </dgm:fillClrLst>
-    <dgm:linClrLst meth="repeat">
-      <a:schemeClr val="accent4"/>
-    </dgm:linClrLst>
-    <dgm:effectClrLst/>
-    <dgm:txLinClrLst/>
-    <dgm:txFillClrLst meth="repeat">
-      <a:schemeClr val="tx1"/>
-    </dgm:txFillClrLst>
-    <dgm:txEffectClrLst/>
-  </dgm:styleLbl>
-  <dgm:styleLbl name="fgAcc1">
-    <dgm:fillClrLst meth="repeat">
-      <a:schemeClr val="lt1">
-        <a:alpha val="90000"/>
-      </a:schemeClr>
-    </dgm:fillClrLst>
-    <dgm:linClrLst meth="repeat">
-      <a:schemeClr val="accent2"/>
-      <a:schemeClr val="accent3"/>
-      <a:schemeClr val="accent4"/>
-      <a:schemeClr val="accent5"/>
-      <a:schemeClr val="accent6"/>
-    </dgm:linClrLst>
-    <dgm:effectClrLst/>
-    <dgm:txLinClrLst/>
-    <dgm:txFillClrLst meth="repeat">
-      <a:schemeClr val="dk1"/>
-    </dgm:txFillClrLst>
-    <dgm:txEffectClrLst/>
-  </dgm:styleLbl>
-  <dgm:styleLbl name="conFgAcc1">
-    <dgm:fillClrLst meth="repeat">
-      <a:schemeClr val="lt1">
-        <a:alpha val="90000"/>
-      </a:schemeClr>
-    </dgm:fillClrLst>
-    <dgm:linClrLst meth="repeat">
-      <a:schemeClr val="accent2"/>
-      <a:schemeClr val="accent3"/>
-      <a:schemeClr val="accent4"/>
-      <a:schemeClr val="accent5"/>
-      <a:schemeClr val="accent6"/>
-    </dgm:linClrLst>
-    <dgm:effectClrLst/>
-    <dgm:txLinClrLst/>
-    <dgm:txFillClrLst meth="repeat">
-      <a:schemeClr val="dk1"/>
-    </dgm:txFillClrLst>
-    <dgm:txEffectClrLst/>
-  </dgm:styleLbl>
-  <dgm:styleLbl name="alignAcc1">
-    <dgm:fillClrLst meth="repeat">
-      <a:schemeClr val="lt1">
-        <a:alpha val="90000"/>
-      </a:schemeClr>
-    </dgm:fillClrLst>
-    <dgm:linClrLst meth="repeat">
-      <a:schemeClr val="accent2"/>
-      <a:schemeClr val="accent3"/>
-      <a:schemeClr val="accent4"/>
-      <a:schemeClr val="accent5"/>
-      <a:schemeClr val="accent6"/>
-    </dgm:linClrLst>
-    <dgm:effectClrLst/>
-    <dgm:txLinClrLst/>
-    <dgm:txFillClrLst meth="repeat">
-      <a:schemeClr val="dk1"/>
-    </dgm:txFillClrLst>
-    <dgm:txEffectClrLst/>
-  </dgm:styleLbl>
-  <dgm:styleLbl name="trAlignAcc1">
-    <dgm:fillClrLst meth="repeat">
-      <a:schemeClr val="lt1">
-        <a:alpha val="40000"/>
-      </a:schemeClr>
-    </dgm:fillClrLst>
-    <dgm:linClrLst meth="repeat">
-      <a:schemeClr val="accent1"/>
-    </dgm:linClrLst>
-    <dgm:effectClrLst/>
-    <dgm:txLinClrLst/>
-    <dgm:txFillClrLst meth="repeat">
-      <a:schemeClr val="dk1"/>
-    </dgm:txFillClrLst>
-    <dgm:txEffectClrLst/>
-  </dgm:styleLbl>
-  <dgm:styleLbl name="bgAcc1">
-    <dgm:fillClrLst meth="repeat">
-      <a:schemeClr val="lt1">
-        <a:alpha val="90000"/>
-      </a:schemeClr>
-    </dgm:fillClrLst>
-    <dgm:linClrLst meth="repeat">
-      <a:schemeClr val="accent2"/>
-      <a:schemeClr val="accent3"/>
-      <a:schemeClr val="accent4"/>
-      <a:schemeClr val="accent5"/>
-      <a:schemeClr val="accent6"/>
-    </dgm:linClrLst>
-    <dgm:effectClrLst/>
-    <dgm:txLinClrLst/>
-    <dgm:txFillClrLst meth="repeat">
-      <a:schemeClr val="dk1"/>
-    </dgm:txFillClrLst>
-    <dgm:txEffectClrLst/>
-  </dgm:styleLbl>
-  <dgm:styleLbl name="solidFgAcc1">
-    <dgm:fillClrLst meth="repeat">
-      <a:schemeClr val="lt1"/>
-    </dgm:fillClrLst>
-    <dgm:linClrLst meth="repeat">
-      <a:schemeClr val="accent2"/>
-      <a:schemeClr val="accent3"/>
-      <a:schemeClr val="accent4"/>
-      <a:schemeClr val="accent5"/>
-      <a:schemeClr val="accent6"/>
-    </dgm:linClrLst>
-    <dgm:effectClrLst/>
-    <dgm:txLinClrLst/>
-    <dgm:txFillClrLst meth="repeat">
-      <a:schemeClr val="dk1"/>
-    </dgm:txFillClrLst>
-    <dgm:txEffectClrLst/>
-  </dgm:styleLbl>
-  <dgm:styleLbl name="solidAlignAcc1">
-    <dgm:fillClrLst meth="repeat">
-      <a:schemeClr val="lt1"/>
-    </dgm:fillClrLst>
-    <dgm:linClrLst meth="repeat">
-      <a:schemeClr val="accent2"/>
-      <a:schemeClr val="accent3"/>
-      <a:schemeClr val="accent4"/>
-      <a:schemeClr val="accent5"/>
-      <a:schemeClr val="accent6"/>
-    </dgm:linClrLst>
-    <dgm:effectClrLst/>
-    <dgm:txLinClrLst/>
-    <dgm:txFillClrLst meth="repeat">
-      <a:schemeClr val="dk1"/>
-    </dgm:txFillClrLst>
-    <dgm:txEffectClrLst/>
-  </dgm:styleLbl>
-  <dgm:styleLbl name="solidBgAcc1">
-    <dgm:fillClrLst meth="repeat">
-      <a:schemeClr val="lt1"/>
-    </dgm:fillClrLst>
-    <dgm:linClrLst meth="repeat">
-      <a:schemeClr val="accent2"/>
-      <a:schemeClr val="accent3"/>
-      <a:schemeClr val="accent4"/>
-      <a:schemeClr val="accent5"/>
-      <a:schemeClr val="accent6"/>
-    </dgm:linClrLst>
-    <dgm:effectClrLst/>
-    <dgm:txLinClrLst/>
-    <dgm:txFillClrLst meth="repeat">
-      <a:schemeClr val="dk1"/>
-    </dgm:txFillClrLst>
-    <dgm:txEffectClrLst/>
-  </dgm:styleLbl>
-  <dgm:styleLbl name="fgAccFollowNode1">
-    <dgm:fillClrLst meth="repeat">
-      <a:schemeClr val="accent2">
-        <a:tint val="40000"/>
-        <a:alpha val="90000"/>
-      </a:schemeClr>
-      <a:schemeClr val="accent3">
-        <a:tint val="40000"/>
-        <a:alpha val="90000"/>
-      </a:schemeClr>
-      <a:schemeClr val="accent4">
-        <a:tint val="40000"/>
-        <a:alpha val="90000"/>
-      </a:schemeClr>
-      <a:schemeClr val="accent5">
-        <a:tint val="40000"/>
-        <a:alpha val="90000"/>
-      </a:schemeClr>
-      <a:schemeClr val="accent6">
-        <a:tint val="40000"/>
-        <a:alpha val="90000"/>
-      </a:schemeClr>
-    </dgm:fillClrLst>
-    <dgm:linClrLst meth="repeat">
-      <a:schemeClr val="accent2">
-        <a:tint val="40000"/>
-        <a:alpha val="90000"/>
-      </a:schemeClr>
-      <a:schemeClr val="accent3">
-        <a:tint val="40000"/>
-        <a:alpha val="90000"/>
-      </a:schemeClr>
-      <a:schemeClr val="accent4">
-        <a:tint val="40000"/>
-        <a:alpha val="90000"/>
-      </a:schemeClr>
-      <a:schemeClr val="accent5">
-        <a:tint val="40000"/>
-        <a:alpha val="90000"/>
-      </a:schemeClr>
-      <a:schemeClr val="accent6">
-        <a:tint val="40000"/>
-        <a:alpha val="90000"/>
-      </a:schemeClr>
-    </dgm:linClrLst>
-    <dgm:effectClrLst/>
-    <dgm:txLinClrLst/>
-    <dgm:txFillClrLst meth="repeat">
-      <a:schemeClr val="dk1"/>
-    </dgm:txFillClrLst>
-    <dgm:txEffectClrLst/>
-  </dgm:styleLbl>
-  <dgm:styleLbl name="alignAccFollowNode1">
-    <dgm:fillClrLst meth="repeat">
-      <a:schemeClr val="accent2">
-        <a:tint val="40000"/>
-        <a:alpha val="90000"/>
-      </a:schemeClr>
-      <a:schemeClr val="accent3">
-        <a:tint val="40000"/>
-        <a:alpha val="90000"/>
-      </a:schemeClr>
-      <a:schemeClr val="accent4">
-        <a:tint val="40000"/>
-        <a:alpha val="90000"/>
-      </a:schemeClr>
-      <a:schemeClr val="accent5">
-        <a:tint val="40000"/>
-        <a:alpha val="90000"/>
-      </a:schemeClr>
-      <a:schemeClr val="accent6">
-        <a:tint val="40000"/>
-        <a:alpha val="90000"/>
-      </a:schemeClr>
-    </dgm:fillClrLst>
-    <dgm:linClrLst meth="repeat">
-      <a:schemeClr val="accent2">
-        <a:tint val="40000"/>
-        <a:alpha val="90000"/>
-      </a:schemeClr>
-      <a:schemeClr val="accent3">
-        <a:tint val="40000"/>
-        <a:alpha val="90000"/>
-      </a:schemeClr>
-      <a:schemeClr val="accent4">
-        <a:tint val="40000"/>
-        <a:alpha val="90000"/>
-      </a:schemeClr>
-      <a:schemeClr val="accent5">
-        <a:tint val="40000"/>
-        <a:alpha val="90000"/>
-      </a:schemeClr>
-      <a:schemeClr val="accent6">
-        <a:tint val="40000"/>
-        <a:alpha val="90000"/>
-      </a:schemeClr>
-    </dgm:linClrLst>
-    <dgm:effectClrLst/>
-    <dgm:txLinClrLst/>
-    <dgm:txFillClrLst meth="repeat">
-      <a:schemeClr val="dk1"/>
-    </dgm:txFillClrLst>
-    <dgm:txEffectClrLst/>
-  </dgm:styleLbl>
-  <dgm:styleLbl name="bgAccFollowNode1">
-    <dgm:fillClrLst meth="repeat">
-      <a:schemeClr val="accent2">
-        <a:tint val="40000"/>
-        <a:alpha val="90000"/>
-      </a:schemeClr>
-      <a:schemeClr val="accent3">
-        <a:tint val="40000"/>
-        <a:alpha val="90000"/>
-      </a:schemeClr>
-      <a:schemeClr val="accent4">
-        <a:tint val="40000"/>
-        <a:alpha val="90000"/>
-      </a:schemeClr>
-      <a:schemeClr val="accent5">
-        <a:tint val="40000"/>
-        <a:alpha val="90000"/>
-      </a:schemeClr>
-      <a:schemeClr val="accent6">
-        <a:tint val="40000"/>
-        <a:alpha val="90000"/>
-      </a:schemeClr>
-    </dgm:fillClrLst>
-    <dgm:linClrLst meth="repeat">
-      <a:schemeClr val="accent2">
-        <a:tint val="40000"/>
-        <a:alpha val="90000"/>
-      </a:schemeClr>
-      <a:schemeClr val="accent3">
-        <a:tint val="40000"/>
-        <a:alpha val="90000"/>
-      </a:schemeClr>
-      <a:schemeClr val="accent4">
-        <a:tint val="40000"/>
-        <a:alpha val="90000"/>
-      </a:schemeClr>
-      <a:schemeClr val="accent5">
-        <a:tint val="40000"/>
-        <a:alpha val="90000"/>
-      </a:schemeClr>
-      <a:schemeClr val="accent6">
-        <a:tint val="40000"/>
-        <a:alpha val="90000"/>
-      </a:schemeClr>
-    </dgm:linClrLst>
-    <dgm:effectClrLst/>
-    <dgm:txLinClrLst/>
-    <dgm:txFillClrLst meth="repeat">
-      <a:schemeClr val="dk1"/>
-    </dgm:txFillClrLst>
-    <dgm:txEffectClrLst/>
-  </dgm:styleLbl>
-  <dgm:styleLbl name="fgAcc0">
-    <dgm:fillClrLst meth="repeat">
-      <a:schemeClr val="lt1">
-        <a:alpha val="90000"/>
-      </a:schemeClr>
-    </dgm:fillClrLst>
-    <dgm:linClrLst>
-      <a:schemeClr val="accent1"/>
-    </dgm:linClrLst>
-    <dgm:effectClrLst/>
-    <dgm:txLinClrLst/>
-    <dgm:txFillClrLst meth="repeat">
-      <a:schemeClr val="dk1"/>
-    </dgm:txFillClrLst>
-    <dgm:txEffectClrLst/>
-  </dgm:styleLbl>
-  <dgm:styleLbl name="fgAcc2">
-    <dgm:fillClrLst meth="repeat">
-      <a:schemeClr val="lt1">
-        <a:alpha val="90000"/>
-      </a:schemeClr>
-    </dgm:fillClrLst>
-    <dgm:linClrLst>
-      <a:schemeClr val="accent2"/>
-    </dgm:linClrLst>
-    <dgm:effectClrLst/>
-    <dgm:txLinClrLst/>
-    <dgm:txFillClrLst meth="repeat">
-      <a:schemeClr val="dk1"/>
-    </dgm:txFillClrLst>
-    <dgm:txEffectClrLst/>
-  </dgm:styleLbl>
-  <dgm:styleLbl name="fgAcc3">
-    <dgm:fillClrLst meth="repeat">
-      <a:schemeClr val="lt1">
-        <a:alpha val="90000"/>
-      </a:schemeClr>
-    </dgm:fillClrLst>
-    <dgm:linClrLst>
-      <a:schemeClr val="accent3"/>
-    </dgm:linClrLst>
-    <dgm:effectClrLst/>
-    <dgm:txLinClrLst/>
-    <dgm:txFillClrLst meth="repeat">
-      <a:schemeClr val="dk1"/>
-    </dgm:txFillClrLst>
-    <dgm:txEffectClrLst/>
-  </dgm:styleLbl>
-  <dgm:styleLbl name="fgAcc4">
-    <dgm:fillClrLst meth="repeat">
-      <a:schemeClr val="lt1">
-        <a:alpha val="90000"/>
-      </a:schemeClr>
-    </dgm:fillClrLst>
-    <dgm:linClrLst>
-      <a:schemeClr val="accent4"/>
-    </dgm:linClrLst>
-    <dgm:effectClrLst/>
-    <dgm:txLinClrLst/>
-    <dgm:txFillClrLst meth="repeat">
-      <a:schemeClr val="dk1"/>
-    </dgm:txFillClrLst>
-    <dgm:txEffectClrLst/>
-  </dgm:styleLbl>
-  <dgm:styleLbl name="bgShp">
-    <dgm:fillClrLst meth="repeat">
-      <a:schemeClr val="bg1">
-        <a:lumMod val="95000"/>
-      </a:schemeClr>
-    </dgm:fillClrLst>
-    <dgm:linClrLst meth="repeat">
-      <a:schemeClr val="dk1"/>
-    </dgm:linClrLst>
-    <dgm:effectClrLst/>
-    <dgm:txLinClrLst/>
-    <dgm:txFillClrLst meth="repeat">
-      <a:schemeClr val="dk1"/>
-    </dgm:txFillClrLst>
-    <dgm:txEffectClrLst/>
-  </dgm:styleLbl>
-  <dgm:styleLbl name="dkBgShp">
-    <dgm:fillClrLst meth="repeat">
-      <a:schemeClr val="accent2">
-        <a:shade val="90000"/>
-      </a:schemeClr>
-    </dgm:fillClrLst>
-    <dgm:linClrLst meth="repeat">
-      <a:schemeClr val="dk1"/>
-    </dgm:linClrLst>
-    <dgm:effectClrLst/>
-    <dgm:txLinClrLst/>
-    <dgm:txFillClrLst meth="repeat">
-      <a:schemeClr val="lt1"/>
-    </dgm:txFillClrLst>
-    <dgm:txEffectClrLst/>
-  </dgm:styleLbl>
-  <dgm:styleLbl name="trBgShp">
-    <dgm:fillClrLst meth="repeat">
-      <a:schemeClr val="accent1">
-        <a:tint val="50000"/>
-        <a:alpha val="40000"/>
-      </a:schemeClr>
-    </dgm:fillClrLst>
-    <dgm:linClrLst meth="repeat">
-      <a:schemeClr val="accent2"/>
-    </dgm:linClrLst>
-    <dgm:effectClrLst/>
-    <dgm:txLinClrLst/>
-    <dgm:txFillClrLst meth="repeat">
-      <a:schemeClr val="lt1"/>
-    </dgm:txFillClrLst>
-    <dgm:txEffectClrLst/>
-  </dgm:styleLbl>
-  <dgm:styleLbl name="fgShp">
-    <dgm:fillClrLst meth="repeat">
-      <a:schemeClr val="accent2">
-        <a:tint val="40000"/>
-      </a:schemeClr>
-    </dgm:fillClrLst>
-    <dgm:linClrLst meth="repeat">
-      <a:schemeClr val="lt1"/>
-    </dgm:linClrLst>
-    <dgm:effectClrLst/>
-    <dgm:txLinClrLst/>
-    <dgm:txFillClrLst meth="repeat">
-      <a:schemeClr val="dk1"/>
-    </dgm:txFillClrLst>
-    <dgm:txEffectClrLst/>
-  </dgm:styleLbl>
-  <dgm:styleLbl name="revTx">
-    <dgm:fillClrLst meth="repeat">
-      <a:schemeClr val="lt1">
-        <a:alpha val="0"/>
-      </a:schemeClr>
-    </dgm:fillClrLst>
-    <dgm:linClrLst meth="repeat">
-      <a:schemeClr val="dk1">
-        <a:alpha val="0"/>
-      </a:schemeClr>
-    </dgm:linClrLst>
-    <dgm:effectClrLst/>
-    <dgm:txLinClrLst/>
-    <dgm:txFillClrLst meth="repeat">
-      <a:schemeClr val="tx1"/>
-    </dgm:txFillClrLst>
-    <dgm:txEffectClrLst/>
-  </dgm:styleLbl>
-</dgm:colorsDef>
-</file>
-
-<file path=ppt/diagrams/data1.xml><?xml version="1.0" encoding="utf-8"?>
-<dgm:dataModel xmlns:dgm="http://schemas.openxmlformats.org/drawingml/2006/diagram" xmlns:a="http://schemas.openxmlformats.org/drawingml/2006/main">
-  <dgm:ptLst>
-    <dgm:pt modelId="{7D9C16A6-8C48-4165-8DAF-8C957C12A8FA}" type="doc">
-      <dgm:prSet loTypeId="urn:microsoft.com/office/officeart/2018/2/layout/IconLabelList" loCatId="icon" qsTypeId="urn:microsoft.com/office/officeart/2005/8/quickstyle/simple4" qsCatId="simple" csTypeId="urn:microsoft.com/office/officeart/2018/5/colors/Iconchunking_neutralbg_colorful1" csCatId="colorful" phldr="1"/>
-      <dgm:spPr/>
-    </dgm:pt>
-    <dgm:pt modelId="{701D68F5-42F8-47BC-8FED-84C50F595DF0}">
-      <dgm:prSet phldrT="[Text]"/>
-      <dgm:spPr/>
-      <dgm:t>
-        <a:bodyPr rtlCol="0"/>
-        <a:lstStyle/>
-        <a:p>
-          <a:pPr rtl="0">
-            <a:lnSpc>
-              <a:spcPct val="100000"/>
-            </a:lnSpc>
-          </a:pPr>
-          <a:r>
-            <a:rPr lang="es-ES" noProof="0" dirty="0"/>
-            <a:t>Red</a:t>
-          </a:r>
-        </a:p>
-      </dgm:t>
-    </dgm:pt>
-    <dgm:pt modelId="{9617668C-C38C-4017-8DDF-37855B15D110}" type="parTrans" cxnId="{C4BA385D-31ED-40EF-A5D6-98DFBA64E71A}">
-      <dgm:prSet/>
-      <dgm:spPr/>
-      <dgm:t>
-        <a:bodyPr rtlCol="0"/>
-        <a:lstStyle/>
-        <a:p>
-          <a:pPr rtl="0"/>
-          <a:endParaRPr lang="es-ES" noProof="0" dirty="0"/>
-        </a:p>
-      </dgm:t>
-    </dgm:pt>
-    <dgm:pt modelId="{0C95B389-AC0C-4055-9AA3-38815EFC8B0A}" type="sibTrans" cxnId="{C4BA385D-31ED-40EF-A5D6-98DFBA64E71A}">
-      <dgm:prSet/>
-      <dgm:spPr/>
-      <dgm:t>
-        <a:bodyPr rtlCol="0"/>
-        <a:lstStyle/>
-        <a:p>
-          <a:pPr rtl="0"/>
-          <a:endParaRPr lang="es-ES" noProof="0" dirty="0"/>
-        </a:p>
-      </dgm:t>
-    </dgm:pt>
-    <dgm:pt modelId="{91A66877-AC1C-46D9-BF2C-6024B638DEA9}">
-      <dgm:prSet phldrT="[Text]"/>
-      <dgm:spPr/>
-      <dgm:t>
-        <a:bodyPr rtlCol="0"/>
-        <a:lstStyle/>
-        <a:p>
-          <a:pPr rtl="0">
-            <a:lnSpc>
-              <a:spcPct val="100000"/>
-            </a:lnSpc>
-          </a:pPr>
-          <a:r>
-            <a:rPr lang="es-ES" noProof="0" dirty="0"/>
-            <a:t>Satélite</a:t>
-          </a:r>
-        </a:p>
-      </dgm:t>
-    </dgm:pt>
-    <dgm:pt modelId="{913FED05-DF41-48A7-B1F8-81937A468EF9}" type="parTrans" cxnId="{7F0DAB6F-9257-4F2D-B31A-3418F73F6952}">
-      <dgm:prSet/>
-      <dgm:spPr/>
-      <dgm:t>
-        <a:bodyPr rtlCol="0"/>
-        <a:lstStyle/>
-        <a:p>
-          <a:pPr rtl="0"/>
-          <a:endParaRPr lang="es-ES" noProof="0" dirty="0"/>
-        </a:p>
-      </dgm:t>
-    </dgm:pt>
-    <dgm:pt modelId="{BFCE4A28-C381-46FF-935A-B11534EF7D87}" type="sibTrans" cxnId="{7F0DAB6F-9257-4F2D-B31A-3418F73F6952}">
-      <dgm:prSet/>
-      <dgm:spPr/>
-      <dgm:t>
-        <a:bodyPr rtlCol="0"/>
-        <a:lstStyle/>
-        <a:p>
-          <a:pPr rtl="0"/>
-          <a:endParaRPr lang="es-ES" noProof="0" dirty="0"/>
-        </a:p>
-      </dgm:t>
-    </dgm:pt>
-    <dgm:pt modelId="{76CC3289-2662-43F0-A3C6-BA04A135F08C}">
-      <dgm:prSet phldrT="[Text]"/>
-      <dgm:spPr/>
-      <dgm:t>
-        <a:bodyPr rtlCol="0"/>
-        <a:lstStyle/>
-        <a:p>
-          <a:pPr rtl="0">
-            <a:lnSpc>
-              <a:spcPct val="100000"/>
-            </a:lnSpc>
-          </a:pPr>
-          <a:r>
-            <a:rPr lang="es-ES" noProof="0" dirty="0"/>
-            <a:t>Vínculo</a:t>
-          </a:r>
-        </a:p>
-      </dgm:t>
-    </dgm:pt>
-    <dgm:pt modelId="{D46DB4DA-1442-4ECE-89FE-BBB1E3489E3D}" type="parTrans" cxnId="{0400886E-8A1A-44C2-95A7-DB0EF4911494}">
-      <dgm:prSet/>
-      <dgm:spPr/>
-      <dgm:t>
-        <a:bodyPr rtlCol="0"/>
-        <a:lstStyle/>
-        <a:p>
-          <a:pPr rtl="0"/>
-          <a:endParaRPr lang="es-ES" noProof="0" dirty="0"/>
-        </a:p>
-      </dgm:t>
-    </dgm:pt>
-    <dgm:pt modelId="{FA28C9D6-476E-43CD-BA23-D6D990FD78D0}" type="sibTrans" cxnId="{0400886E-8A1A-44C2-95A7-DB0EF4911494}">
-      <dgm:prSet/>
-      <dgm:spPr/>
-      <dgm:t>
-        <a:bodyPr rtlCol="0"/>
-        <a:lstStyle/>
-        <a:p>
-          <a:pPr rtl="0"/>
-          <a:endParaRPr lang="es-ES" noProof="0" dirty="0"/>
-        </a:p>
-      </dgm:t>
-    </dgm:pt>
-    <dgm:pt modelId="{8994D886-A75F-411A-A9D7-D31991FF12BD}" type="pres">
-      <dgm:prSet presAssocID="{7D9C16A6-8C48-4165-8DAF-8C957C12A8FA}" presName="root" presStyleCnt="0">
-        <dgm:presLayoutVars>
-          <dgm:dir/>
-          <dgm:resizeHandles val="exact"/>
-        </dgm:presLayoutVars>
-      </dgm:prSet>
-      <dgm:spPr/>
-    </dgm:pt>
-    <dgm:pt modelId="{E1DBA6D5-BD14-4CD2-A0CC-80F867FEFA81}" type="pres">
-      <dgm:prSet presAssocID="{701D68F5-42F8-47BC-8FED-84C50F595DF0}" presName="compNode" presStyleCnt="0"/>
-      <dgm:spPr/>
-    </dgm:pt>
-    <dgm:pt modelId="{19A8DC21-3E65-409D-AD53-DA51BB9198A0}" type="pres">
-      <dgm:prSet presAssocID="{701D68F5-42F8-47BC-8FED-84C50F595DF0}" presName="iconRect" presStyleLbl="node1" presStyleIdx="0" presStyleCnt="3" custScaleX="157625" custScaleY="157625"/>
-      <dgm:spPr>
-        <a:blipFill>
-          <a:blip xmlns:r="http://schemas.openxmlformats.org/officeDocument/2006/relationships" r:embed="rId1">
-            <a:extLst>
-              <a:ext uri="{96DAC541-7B7A-43D3-8B79-37D633B846F1}">
-                <asvg:svgBlip xmlns:asvg="http://schemas.microsoft.com/office/drawing/2016/SVG/main" r:embed="rId2"/>
-              </a:ext>
-            </a:extLst>
-          </a:blip>
-          <a:srcRect/>
-          <a:stretch>
-            <a:fillRect/>
-          </a:stretch>
-        </a:blipFill>
-      </dgm:spPr>
-      <dgm:extLst>
-        <a:ext uri="{E40237B7-FDA0-4F09-8148-C483321AD2D9}">
-          <dgm14:cNvPr xmlns:dgm14="http://schemas.microsoft.com/office/drawing/2010/diagram" id="0" name="" descr="Network"/>
-        </a:ext>
-      </dgm:extLst>
-    </dgm:pt>
-    <dgm:pt modelId="{B9F90A48-FF94-4C94-A587-0190406F6FD3}" type="pres">
-      <dgm:prSet presAssocID="{701D68F5-42F8-47BC-8FED-84C50F595DF0}" presName="spaceRect" presStyleCnt="0"/>
-      <dgm:spPr/>
-    </dgm:pt>
-    <dgm:pt modelId="{A99B5DD6-89E9-4537-B415-4205CEB9323A}" type="pres">
-      <dgm:prSet presAssocID="{701D68F5-42F8-47BC-8FED-84C50F595DF0}" presName="textRect" presStyleLbl="revTx" presStyleIdx="0" presStyleCnt="3">
-        <dgm:presLayoutVars>
-          <dgm:chMax val="1"/>
-          <dgm:chPref val="1"/>
-        </dgm:presLayoutVars>
-      </dgm:prSet>
-      <dgm:spPr/>
-    </dgm:pt>
-    <dgm:pt modelId="{8B391436-B9B0-45BD-A57F-792D6376D868}" type="pres">
-      <dgm:prSet presAssocID="{0C95B389-AC0C-4055-9AA3-38815EFC8B0A}" presName="sibTrans" presStyleCnt="0"/>
-      <dgm:spPr/>
-    </dgm:pt>
-    <dgm:pt modelId="{95872155-C45D-46D3-874C-D838089A06F8}" type="pres">
-      <dgm:prSet presAssocID="{91A66877-AC1C-46D9-BF2C-6024B638DEA9}" presName="compNode" presStyleCnt="0"/>
-      <dgm:spPr/>
-    </dgm:pt>
-    <dgm:pt modelId="{CE9DF0E8-B0DE-4E1E-9FF4-6006AD8428DB}" type="pres">
-      <dgm:prSet presAssocID="{91A66877-AC1C-46D9-BF2C-6024B638DEA9}" presName="iconRect" presStyleLbl="node1" presStyleIdx="1" presStyleCnt="3" custScaleX="157625" custScaleY="157625"/>
-      <dgm:spPr>
-        <a:blipFill>
-          <a:blip xmlns:r="http://schemas.openxmlformats.org/officeDocument/2006/relationships" r:embed="rId3">
-            <a:extLst>
-              <a:ext uri="{28A0092B-C50C-407E-A947-70E740481C1C}">
-                <a14:useLocalDpi xmlns:a14="http://schemas.microsoft.com/office/drawing/2010/main" val="0"/>
-              </a:ext>
-              <a:ext uri="{96DAC541-7B7A-43D3-8B79-37D633B846F1}">
-                <asvg:svgBlip xmlns:asvg="http://schemas.microsoft.com/office/drawing/2016/SVG/main" r:embed="rId4"/>
-              </a:ext>
-            </a:extLst>
-          </a:blip>
-          <a:stretch>
-            <a:fillRect/>
-          </a:stretch>
-        </a:blipFill>
-      </dgm:spPr>
-      <dgm:extLst>
-        <a:ext uri="{E40237B7-FDA0-4F09-8148-C483321AD2D9}">
-          <dgm14:cNvPr xmlns:dgm14="http://schemas.microsoft.com/office/drawing/2010/diagram" id="0" name="" descr="Satellite"/>
-        </a:ext>
-      </dgm:extLst>
-    </dgm:pt>
-    <dgm:pt modelId="{AA0423A1-55B2-45E9-BFE7-3FBE5BDA65ED}" type="pres">
-      <dgm:prSet presAssocID="{91A66877-AC1C-46D9-BF2C-6024B638DEA9}" presName="spaceRect" presStyleCnt="0"/>
-      <dgm:spPr/>
-    </dgm:pt>
-    <dgm:pt modelId="{55120873-6F5C-4053-8EAD-6287A7F1097E}" type="pres">
-      <dgm:prSet presAssocID="{91A66877-AC1C-46D9-BF2C-6024B638DEA9}" presName="textRect" presStyleLbl="revTx" presStyleIdx="1" presStyleCnt="3">
-        <dgm:presLayoutVars>
-          <dgm:chMax val="1"/>
-          <dgm:chPref val="1"/>
-        </dgm:presLayoutVars>
-      </dgm:prSet>
-      <dgm:spPr/>
-    </dgm:pt>
-    <dgm:pt modelId="{F679C986-30E4-4F0A-A3A6-CAE528BFED76}" type="pres">
-      <dgm:prSet presAssocID="{BFCE4A28-C381-46FF-935A-B11534EF7D87}" presName="sibTrans" presStyleCnt="0"/>
-      <dgm:spPr/>
-    </dgm:pt>
-    <dgm:pt modelId="{2EC2FDE3-8908-45C7-A3FD-EB370213FE69}" type="pres">
-      <dgm:prSet presAssocID="{76CC3289-2662-43F0-A3C6-BA04A135F08C}" presName="compNode" presStyleCnt="0"/>
-      <dgm:spPr/>
-    </dgm:pt>
-    <dgm:pt modelId="{6DB1FE51-13D0-4A38-AD6E-48D4371A1AF3}" type="pres">
-      <dgm:prSet presAssocID="{76CC3289-2662-43F0-A3C6-BA04A135F08C}" presName="iconRect" presStyleLbl="node1" presStyleIdx="2" presStyleCnt="3" custScaleX="157625" custScaleY="157625"/>
-      <dgm:spPr>
-        <a:blipFill>
-          <a:blip xmlns:r="http://schemas.openxmlformats.org/officeDocument/2006/relationships" r:embed="rId5">
-            <a:extLst>
-              <a:ext uri="{28A0092B-C50C-407E-A947-70E740481C1C}">
-                <a14:useLocalDpi xmlns:a14="http://schemas.microsoft.com/office/drawing/2010/main" val="0"/>
-              </a:ext>
-              <a:ext uri="{96DAC541-7B7A-43D3-8B79-37D633B846F1}">
-                <asvg:svgBlip xmlns:asvg="http://schemas.microsoft.com/office/drawing/2016/SVG/main" r:embed="rId6"/>
-              </a:ext>
-            </a:extLst>
-          </a:blip>
-          <a:srcRect/>
-          <a:stretch>
-            <a:fillRect/>
-          </a:stretch>
-        </a:blipFill>
-      </dgm:spPr>
-      <dgm:extLst>
-        <a:ext uri="{E40237B7-FDA0-4F09-8148-C483321AD2D9}">
-          <dgm14:cNvPr xmlns:dgm14="http://schemas.microsoft.com/office/drawing/2010/diagram" id="0" name="" descr="Link"/>
-        </a:ext>
-      </dgm:extLst>
-    </dgm:pt>
-    <dgm:pt modelId="{0928538A-05CC-4A79-BD5D-92F985D1EEE5}" type="pres">
-      <dgm:prSet presAssocID="{76CC3289-2662-43F0-A3C6-BA04A135F08C}" presName="spaceRect" presStyleCnt="0"/>
-      <dgm:spPr/>
-    </dgm:pt>
-    <dgm:pt modelId="{133097FC-B1F8-4953-B0AB-E8E73D968D1C}" type="pres">
-      <dgm:prSet presAssocID="{76CC3289-2662-43F0-A3C6-BA04A135F08C}" presName="textRect" presStyleLbl="revTx" presStyleIdx="2" presStyleCnt="3">
-        <dgm:presLayoutVars>
-          <dgm:chMax val="1"/>
-          <dgm:chPref val="1"/>
-        </dgm:presLayoutVars>
-      </dgm:prSet>
-      <dgm:spPr/>
-    </dgm:pt>
-  </dgm:ptLst>
-  <dgm:cxnLst>
-    <dgm:cxn modelId="{51C9C716-0C8A-4862-A43F-A9047F6A6ECE}" type="presOf" srcId="{701D68F5-42F8-47BC-8FED-84C50F595DF0}" destId="{A99B5DD6-89E9-4537-B415-4205CEB9323A}" srcOrd="0" destOrd="0" presId="urn:microsoft.com/office/officeart/2018/2/layout/IconLabelList"/>
-    <dgm:cxn modelId="{C4BA385D-31ED-40EF-A5D6-98DFBA64E71A}" srcId="{7D9C16A6-8C48-4165-8DAF-8C957C12A8FA}" destId="{701D68F5-42F8-47BC-8FED-84C50F595DF0}" srcOrd="0" destOrd="0" parTransId="{9617668C-C38C-4017-8DDF-37855B15D110}" sibTransId="{0C95B389-AC0C-4055-9AA3-38815EFC8B0A}"/>
-    <dgm:cxn modelId="{0400886E-8A1A-44C2-95A7-DB0EF4911494}" srcId="{7D9C16A6-8C48-4165-8DAF-8C957C12A8FA}" destId="{76CC3289-2662-43F0-A3C6-BA04A135F08C}" srcOrd="2" destOrd="0" parTransId="{D46DB4DA-1442-4ECE-89FE-BBB1E3489E3D}" sibTransId="{FA28C9D6-476E-43CD-BA23-D6D990FD78D0}"/>
-    <dgm:cxn modelId="{7F0DAB6F-9257-4F2D-B31A-3418F73F6952}" srcId="{7D9C16A6-8C48-4165-8DAF-8C957C12A8FA}" destId="{91A66877-AC1C-46D9-BF2C-6024B638DEA9}" srcOrd="1" destOrd="0" parTransId="{913FED05-DF41-48A7-B1F8-81937A468EF9}" sibTransId="{BFCE4A28-C381-46FF-935A-B11534EF7D87}"/>
-    <dgm:cxn modelId="{639634AD-5727-49C2-9E58-EB6075215446}" type="presOf" srcId="{91A66877-AC1C-46D9-BF2C-6024B638DEA9}" destId="{55120873-6F5C-4053-8EAD-6287A7F1097E}" srcOrd="0" destOrd="0" presId="urn:microsoft.com/office/officeart/2018/2/layout/IconLabelList"/>
-    <dgm:cxn modelId="{05A920DF-F275-442A-AE4E-321A812BD608}" type="presOf" srcId="{7D9C16A6-8C48-4165-8DAF-8C957C12A8FA}" destId="{8994D886-A75F-411A-A9D7-D31991FF12BD}" srcOrd="0" destOrd="0" presId="urn:microsoft.com/office/officeart/2018/2/layout/IconLabelList"/>
-    <dgm:cxn modelId="{634ABEFF-3AC1-45CD-BF32-24D2F6D73D7C}" type="presOf" srcId="{76CC3289-2662-43F0-A3C6-BA04A135F08C}" destId="{133097FC-B1F8-4953-B0AB-E8E73D968D1C}" srcOrd="0" destOrd="0" presId="urn:microsoft.com/office/officeart/2018/2/layout/IconLabelList"/>
-    <dgm:cxn modelId="{CF59BB9E-C8FC-4C34-8006-3277F29FB6DE}" type="presParOf" srcId="{8994D886-A75F-411A-A9D7-D31991FF12BD}" destId="{E1DBA6D5-BD14-4CD2-A0CC-80F867FEFA81}" srcOrd="0" destOrd="0" presId="urn:microsoft.com/office/officeart/2018/2/layout/IconLabelList"/>
-    <dgm:cxn modelId="{866C03AD-DD5B-4277-8831-0C127DF86F35}" type="presParOf" srcId="{E1DBA6D5-BD14-4CD2-A0CC-80F867FEFA81}" destId="{19A8DC21-3E65-409D-AD53-DA51BB9198A0}" srcOrd="0" destOrd="0" presId="urn:microsoft.com/office/officeart/2018/2/layout/IconLabelList"/>
-    <dgm:cxn modelId="{128FBF1B-109A-47F9-B440-D03F4626A9BA}" type="presParOf" srcId="{E1DBA6D5-BD14-4CD2-A0CC-80F867FEFA81}" destId="{B9F90A48-FF94-4C94-A587-0190406F6FD3}" srcOrd="1" destOrd="0" presId="urn:microsoft.com/office/officeart/2018/2/layout/IconLabelList"/>
-    <dgm:cxn modelId="{8670118E-E162-4F28-99EA-949C482C4F26}" type="presParOf" srcId="{E1DBA6D5-BD14-4CD2-A0CC-80F867FEFA81}" destId="{A99B5DD6-89E9-4537-B415-4205CEB9323A}" srcOrd="2" destOrd="0" presId="urn:microsoft.com/office/officeart/2018/2/layout/IconLabelList"/>
-    <dgm:cxn modelId="{6A09E131-C1FE-47FA-BD91-6D46F7DB3AD7}" type="presParOf" srcId="{8994D886-A75F-411A-A9D7-D31991FF12BD}" destId="{8B391436-B9B0-45BD-A57F-792D6376D868}" srcOrd="1" destOrd="0" presId="urn:microsoft.com/office/officeart/2018/2/layout/IconLabelList"/>
-    <dgm:cxn modelId="{D7D85FB5-4AD1-46B7-8E53-62D3F1F869BE}" type="presParOf" srcId="{8994D886-A75F-411A-A9D7-D31991FF12BD}" destId="{95872155-C45D-46D3-874C-D838089A06F8}" srcOrd="2" destOrd="0" presId="urn:microsoft.com/office/officeart/2018/2/layout/IconLabelList"/>
-    <dgm:cxn modelId="{E4340D53-7996-4180-832E-9DD471AE3441}" type="presParOf" srcId="{95872155-C45D-46D3-874C-D838089A06F8}" destId="{CE9DF0E8-B0DE-4E1E-9FF4-6006AD8428DB}" srcOrd="0" destOrd="0" presId="urn:microsoft.com/office/officeart/2018/2/layout/IconLabelList"/>
-    <dgm:cxn modelId="{EEB70DE9-0FCA-47C6-AB9E-ED5E83AF66B7}" type="presParOf" srcId="{95872155-C45D-46D3-874C-D838089A06F8}" destId="{AA0423A1-55B2-45E9-BFE7-3FBE5BDA65ED}" srcOrd="1" destOrd="0" presId="urn:microsoft.com/office/officeart/2018/2/layout/IconLabelList"/>
-    <dgm:cxn modelId="{1384D7CB-9E90-4E13-BA30-2421855CB9F9}" type="presParOf" srcId="{95872155-C45D-46D3-874C-D838089A06F8}" destId="{55120873-6F5C-4053-8EAD-6287A7F1097E}" srcOrd="2" destOrd="0" presId="urn:microsoft.com/office/officeart/2018/2/layout/IconLabelList"/>
-    <dgm:cxn modelId="{0C47C2BA-718A-4D21-8A25-157E23BE208B}" type="presParOf" srcId="{8994D886-A75F-411A-A9D7-D31991FF12BD}" destId="{F679C986-30E4-4F0A-A3A6-CAE528BFED76}" srcOrd="3" destOrd="0" presId="urn:microsoft.com/office/officeart/2018/2/layout/IconLabelList"/>
-    <dgm:cxn modelId="{85792AED-F1AA-4AFB-8C0D-180EEBEC52F2}" type="presParOf" srcId="{8994D886-A75F-411A-A9D7-D31991FF12BD}" destId="{2EC2FDE3-8908-45C7-A3FD-EB370213FE69}" srcOrd="4" destOrd="0" presId="urn:microsoft.com/office/officeart/2018/2/layout/IconLabelList"/>
-    <dgm:cxn modelId="{D71858A8-07B6-4E2A-AE55-4CBB5A176FAF}" type="presParOf" srcId="{2EC2FDE3-8908-45C7-A3FD-EB370213FE69}" destId="{6DB1FE51-13D0-4A38-AD6E-48D4371A1AF3}" srcOrd="0" destOrd="0" presId="urn:microsoft.com/office/officeart/2018/2/layout/IconLabelList"/>
-    <dgm:cxn modelId="{49C82510-3B59-4CF0-B2E9-AC9595C8150B}" type="presParOf" srcId="{2EC2FDE3-8908-45C7-A3FD-EB370213FE69}" destId="{0928538A-05CC-4A79-BD5D-92F985D1EEE5}" srcOrd="1" destOrd="0" presId="urn:microsoft.com/office/officeart/2018/2/layout/IconLabelList"/>
-    <dgm:cxn modelId="{5B4A17CB-8447-41F2-94A1-DD7F7A76F118}" type="presParOf" srcId="{2EC2FDE3-8908-45C7-A3FD-EB370213FE69}" destId="{133097FC-B1F8-4953-B0AB-E8E73D968D1C}" srcOrd="2" destOrd="0" presId="urn:microsoft.com/office/officeart/2018/2/layout/IconLabelList"/>
-  </dgm:cxnLst>
-  <dgm:bg/>
-  <dgm:whole/>
-  <dgm:extLst>
-    <a:ext uri="http://schemas.microsoft.com/office/drawing/2008/diagram">
-      <dsp:dataModelExt xmlns:dsp="http://schemas.microsoft.com/office/drawing/2008/diagram" relId="rId7" minVer="http://schemas.openxmlformats.org/drawingml/2006/diagram"/>
-    </a:ext>
-    <a:ext uri="{C62137D5-CB1D-491B-B009-E17868A290BF}">
-      <dgm14:recolorImg xmlns:dgm14="http://schemas.microsoft.com/office/drawing/2010/diagram" val="1"/>
-    </a:ext>
-  </dgm:extLst>
-</dgm:dataModel>
-</file>
-
-<file path=ppt/diagrams/drawing1.xml><?xml version="1.0" encoding="utf-8"?>
-<dsp:drawing xmlns:dgm="http://schemas.openxmlformats.org/drawingml/2006/diagram" xmlns:dsp="http://schemas.microsoft.com/office/drawing/2008/diagram" xmlns:a="http://schemas.openxmlformats.org/drawingml/2006/main">
-  <dsp:spTree>
-    <dsp:nvGrpSpPr>
-      <dsp:cNvPr id="0" name=""/>
-      <dsp:cNvGrpSpPr/>
-    </dsp:nvGrpSpPr>
-    <dsp:grpSpPr/>
-    <dsp:sp modelId="{19A8DC21-3E65-409D-AD53-DA51BB9198A0}">
-      <dsp:nvSpPr>
-        <dsp:cNvPr id="0" name=""/>
-        <dsp:cNvSpPr/>
-      </dsp:nvSpPr>
-      <dsp:spPr>
-        <a:xfrm>
-          <a:off x="523237" y="494935"/>
-          <a:ext cx="2285995" cy="2285995"/>
-        </a:xfrm>
-        <a:prstGeom prst="rect">
-          <a:avLst/>
-        </a:prstGeom>
-        <a:blipFill>
-          <a:blip xmlns:r="http://schemas.openxmlformats.org/officeDocument/2006/relationships" r:embed="rId1">
-            <a:extLst>
-              <a:ext uri="{96DAC541-7B7A-43D3-8B79-37D633B846F1}">
-                <asvg:svgBlip xmlns:asvg="http://schemas.microsoft.com/office/drawing/2016/SVG/main" r:embed="rId2"/>
-              </a:ext>
-            </a:extLst>
-          </a:blip>
-          <a:srcRect/>
-          <a:stretch>
-            <a:fillRect/>
-          </a:stretch>
-        </a:blipFill>
-        <a:ln>
-          <a:noFill/>
-        </a:ln>
-        <a:effectLst>
-          <a:outerShdw blurRad="38100" dist="25400" dir="5400000" rotWithShape="0">
-            <a:srgbClr val="000000">
-              <a:alpha val="55000"/>
-            </a:srgbClr>
-          </a:outerShdw>
-        </a:effectLst>
-      </dsp:spPr>
-      <dsp:style>
-        <a:lnRef idx="0">
-          <a:scrgbClr r="0" g="0" b="0"/>
-        </a:lnRef>
-        <a:fillRef idx="3">
-          <a:scrgbClr r="0" g="0" b="0"/>
-        </a:fillRef>
-        <a:effectRef idx="2">
-          <a:scrgbClr r="0" g="0" b="0"/>
-        </a:effectRef>
-        <a:fontRef idx="minor">
-          <a:schemeClr val="lt1"/>
-        </a:fontRef>
-      </dsp:style>
-    </dsp:sp>
-    <dsp:sp modelId="{A99B5DD6-89E9-4537-B415-4205CEB9323A}">
-      <dsp:nvSpPr>
-        <dsp:cNvPr id="0" name=""/>
-        <dsp:cNvSpPr/>
-      </dsp:nvSpPr>
-      <dsp:spPr>
-        <a:xfrm>
-          <a:off x="54818" y="2746269"/>
-          <a:ext cx="3222832" cy="720000"/>
-        </a:xfrm>
-        <a:prstGeom prst="rect">
-          <a:avLst/>
-        </a:prstGeom>
-        <a:noFill/>
-        <a:ln>
-          <a:noFill/>
-        </a:ln>
-        <a:effectLst/>
-      </dsp:spPr>
-      <dsp:style>
-        <a:lnRef idx="0">
-          <a:scrgbClr r="0" g="0" b="0"/>
-        </a:lnRef>
-        <a:fillRef idx="0">
-          <a:scrgbClr r="0" g="0" b="0"/>
-        </a:fillRef>
-        <a:effectRef idx="0">
-          <a:scrgbClr r="0" g="0" b="0"/>
-        </a:effectRef>
-        <a:fontRef idx="minor"/>
-      </dsp:style>
-      <dsp:txBody>
-        <a:bodyPr spcFirstLastPara="0" vert="horz" wrap="square" lIns="0" tIns="0" rIns="0" bIns="0" numCol="1" spcCol="1270" rtlCol="0" anchor="t" anchorCtr="0">
-          <a:noAutofit/>
-        </a:bodyPr>
-        <a:lstStyle/>
-        <a:p>
-          <a:pPr marL="0" lvl="0" indent="0" algn="ctr" defTabSz="1600200" rtl="0">
-            <a:lnSpc>
-              <a:spcPct val="100000"/>
-            </a:lnSpc>
-            <a:spcBef>
-              <a:spcPct val="0"/>
-            </a:spcBef>
-            <a:spcAft>
-              <a:spcPct val="35000"/>
-            </a:spcAft>
-            <a:buNone/>
-          </a:pPr>
-          <a:r>
-            <a:rPr lang="es-ES" sz="3600" kern="1200" noProof="0" dirty="0"/>
-            <a:t>Red</a:t>
-          </a:r>
-        </a:p>
-      </dsp:txBody>
-      <dsp:txXfrm>
-        <a:off x="54818" y="2746269"/>
-        <a:ext cx="3222832" cy="720000"/>
-      </dsp:txXfrm>
-    </dsp:sp>
-    <dsp:sp modelId="{CE9DF0E8-B0DE-4E1E-9FF4-6006AD8428DB}">
-      <dsp:nvSpPr>
-        <dsp:cNvPr id="0" name=""/>
-        <dsp:cNvSpPr/>
-      </dsp:nvSpPr>
-      <dsp:spPr>
-        <a:xfrm>
-          <a:off x="4310064" y="494935"/>
-          <a:ext cx="2285995" cy="2285995"/>
-        </a:xfrm>
-        <a:prstGeom prst="rect">
-          <a:avLst/>
-        </a:prstGeom>
-        <a:blipFill>
-          <a:blip xmlns:r="http://schemas.openxmlformats.org/officeDocument/2006/relationships" r:embed="rId3">
-            <a:extLst>
-              <a:ext uri="{28A0092B-C50C-407E-A947-70E740481C1C}">
-                <a14:useLocalDpi xmlns:a14="http://schemas.microsoft.com/office/drawing/2010/main" val="0"/>
-              </a:ext>
-              <a:ext uri="{96DAC541-7B7A-43D3-8B79-37D633B846F1}">
-                <asvg:svgBlip xmlns:asvg="http://schemas.microsoft.com/office/drawing/2016/SVG/main" r:embed="rId4"/>
-              </a:ext>
-            </a:extLst>
-          </a:blip>
-          <a:stretch>
-            <a:fillRect/>
-          </a:stretch>
-        </a:blipFill>
-        <a:ln>
-          <a:noFill/>
-        </a:ln>
-        <a:effectLst>
-          <a:outerShdw blurRad="38100" dist="25400" dir="5400000" rotWithShape="0">
-            <a:srgbClr val="000000">
-              <a:alpha val="55000"/>
-            </a:srgbClr>
-          </a:outerShdw>
-        </a:effectLst>
-      </dsp:spPr>
-      <dsp:style>
-        <a:lnRef idx="0">
-          <a:scrgbClr r="0" g="0" b="0"/>
-        </a:lnRef>
-        <a:fillRef idx="3">
-          <a:scrgbClr r="0" g="0" b="0"/>
-        </a:fillRef>
-        <a:effectRef idx="2">
-          <a:scrgbClr r="0" g="0" b="0"/>
-        </a:effectRef>
-        <a:fontRef idx="minor">
-          <a:schemeClr val="lt1"/>
-        </a:fontRef>
-      </dsp:style>
-    </dsp:sp>
-    <dsp:sp modelId="{55120873-6F5C-4053-8EAD-6287A7F1097E}">
-      <dsp:nvSpPr>
-        <dsp:cNvPr id="0" name=""/>
-        <dsp:cNvSpPr/>
-      </dsp:nvSpPr>
-      <dsp:spPr>
-        <a:xfrm>
-          <a:off x="3841646" y="2746269"/>
-          <a:ext cx="3222832" cy="720000"/>
-        </a:xfrm>
-        <a:prstGeom prst="rect">
-          <a:avLst/>
-        </a:prstGeom>
-        <a:noFill/>
-        <a:ln>
-          <a:noFill/>
-        </a:ln>
-        <a:effectLst/>
-      </dsp:spPr>
-      <dsp:style>
-        <a:lnRef idx="0">
-          <a:scrgbClr r="0" g="0" b="0"/>
-        </a:lnRef>
-        <a:fillRef idx="0">
-          <a:scrgbClr r="0" g="0" b="0"/>
-        </a:fillRef>
-        <a:effectRef idx="0">
-          <a:scrgbClr r="0" g="0" b="0"/>
-        </a:effectRef>
-        <a:fontRef idx="minor"/>
-      </dsp:style>
-      <dsp:txBody>
-        <a:bodyPr spcFirstLastPara="0" vert="horz" wrap="square" lIns="0" tIns="0" rIns="0" bIns="0" numCol="1" spcCol="1270" rtlCol="0" anchor="t" anchorCtr="0">
-          <a:noAutofit/>
-        </a:bodyPr>
-        <a:lstStyle/>
-        <a:p>
-          <a:pPr marL="0" lvl="0" indent="0" algn="ctr" defTabSz="1600200" rtl="0">
-            <a:lnSpc>
-              <a:spcPct val="100000"/>
-            </a:lnSpc>
-            <a:spcBef>
-              <a:spcPct val="0"/>
-            </a:spcBef>
-            <a:spcAft>
-              <a:spcPct val="35000"/>
-            </a:spcAft>
-            <a:buNone/>
-          </a:pPr>
-          <a:r>
-            <a:rPr lang="es-ES" sz="3600" kern="1200" noProof="0" dirty="0"/>
-            <a:t>Satélite</a:t>
-          </a:r>
-        </a:p>
-      </dsp:txBody>
-      <dsp:txXfrm>
-        <a:off x="3841646" y="2746269"/>
-        <a:ext cx="3222832" cy="720000"/>
-      </dsp:txXfrm>
-    </dsp:sp>
-    <dsp:sp modelId="{6DB1FE51-13D0-4A38-AD6E-48D4371A1AF3}">
-      <dsp:nvSpPr>
-        <dsp:cNvPr id="0" name=""/>
-        <dsp:cNvSpPr/>
-      </dsp:nvSpPr>
-      <dsp:spPr>
-        <a:xfrm>
-          <a:off x="8096892" y="494935"/>
-          <a:ext cx="2285995" cy="2285995"/>
-        </a:xfrm>
-        <a:prstGeom prst="rect">
-          <a:avLst/>
-        </a:prstGeom>
-        <a:blipFill>
-          <a:blip xmlns:r="http://schemas.openxmlformats.org/officeDocument/2006/relationships" r:embed="rId5">
-            <a:extLst>
-              <a:ext uri="{28A0092B-C50C-407E-A947-70E740481C1C}">
-                <a14:useLocalDpi xmlns:a14="http://schemas.microsoft.com/office/drawing/2010/main" val="0"/>
-              </a:ext>
-              <a:ext uri="{96DAC541-7B7A-43D3-8B79-37D633B846F1}">
-                <asvg:svgBlip xmlns:asvg="http://schemas.microsoft.com/office/drawing/2016/SVG/main" r:embed="rId6"/>
-              </a:ext>
-            </a:extLst>
-          </a:blip>
-          <a:srcRect/>
-          <a:stretch>
-            <a:fillRect/>
-          </a:stretch>
-        </a:blipFill>
-        <a:ln>
-          <a:noFill/>
-        </a:ln>
-        <a:effectLst>
-          <a:outerShdw blurRad="38100" dist="25400" dir="5400000" rotWithShape="0">
-            <a:srgbClr val="000000">
-              <a:alpha val="55000"/>
-            </a:srgbClr>
-          </a:outerShdw>
-        </a:effectLst>
-      </dsp:spPr>
-      <dsp:style>
-        <a:lnRef idx="0">
-          <a:scrgbClr r="0" g="0" b="0"/>
-        </a:lnRef>
-        <a:fillRef idx="3">
-          <a:scrgbClr r="0" g="0" b="0"/>
-        </a:fillRef>
-        <a:effectRef idx="2">
-          <a:scrgbClr r="0" g="0" b="0"/>
-        </a:effectRef>
-        <a:fontRef idx="minor">
-          <a:schemeClr val="lt1"/>
-        </a:fontRef>
-      </dsp:style>
-    </dsp:sp>
-    <dsp:sp modelId="{133097FC-B1F8-4953-B0AB-E8E73D968D1C}">
-      <dsp:nvSpPr>
-        <dsp:cNvPr id="0" name=""/>
-        <dsp:cNvSpPr/>
-      </dsp:nvSpPr>
-      <dsp:spPr>
-        <a:xfrm>
-          <a:off x="7628474" y="2746269"/>
-          <a:ext cx="3222832" cy="720000"/>
-        </a:xfrm>
-        <a:prstGeom prst="rect">
-          <a:avLst/>
-        </a:prstGeom>
-        <a:noFill/>
-        <a:ln>
-          <a:noFill/>
-        </a:ln>
-        <a:effectLst/>
-      </dsp:spPr>
-      <dsp:style>
-        <a:lnRef idx="0">
-          <a:scrgbClr r="0" g="0" b="0"/>
-        </a:lnRef>
-        <a:fillRef idx="0">
-          <a:scrgbClr r="0" g="0" b="0"/>
-        </a:fillRef>
-        <a:effectRef idx="0">
-          <a:scrgbClr r="0" g="0" b="0"/>
-        </a:effectRef>
-        <a:fontRef idx="minor"/>
-      </dsp:style>
-      <dsp:txBody>
-        <a:bodyPr spcFirstLastPara="0" vert="horz" wrap="square" lIns="0" tIns="0" rIns="0" bIns="0" numCol="1" spcCol="1270" rtlCol="0" anchor="t" anchorCtr="0">
-          <a:noAutofit/>
-        </a:bodyPr>
-        <a:lstStyle/>
-        <a:p>
-          <a:pPr marL="0" lvl="0" indent="0" algn="ctr" defTabSz="1600200" rtl="0">
-            <a:lnSpc>
-              <a:spcPct val="100000"/>
-            </a:lnSpc>
-            <a:spcBef>
-              <a:spcPct val="0"/>
-            </a:spcBef>
-            <a:spcAft>
-              <a:spcPct val="35000"/>
-            </a:spcAft>
-            <a:buNone/>
-          </a:pPr>
-          <a:r>
-            <a:rPr lang="es-ES" sz="3600" kern="1200" noProof="0" dirty="0"/>
-            <a:t>Vínculo</a:t>
-          </a:r>
-        </a:p>
-      </dsp:txBody>
-      <dsp:txXfrm>
-        <a:off x="7628474" y="2746269"/>
-        <a:ext cx="3222832" cy="720000"/>
-      </dsp:txXfrm>
-    </dsp:sp>
-  </dsp:spTree>
-</dsp:drawing>
-</file>
-
-<file path=ppt/diagrams/layout1.xml><?xml version="1.0" encoding="utf-8"?>
-<dgm:layoutDef xmlns:dgm="http://schemas.openxmlformats.org/drawingml/2006/diagram" xmlns:a="http://schemas.openxmlformats.org/drawingml/2006/main" uniqueId="urn:microsoft.com/office/officeart/2018/2/layout/IconLabelList">
-  <dgm:title val="Icon Label List"/>
-  <dgm:desc val="Use to show non-sequential or grouped chunks of information accompanied by a related visuals. Works best with icons or small pictures with short text captions."/>
-  <dgm:catLst>
-    <dgm:cat type="icon" pri="500"/>
-  </dgm:catLst>
-  <dgm:sampData useDef="1">
-    <dgm:dataModel>
-      <dgm:ptLst/>
-      <dgm:bg/>
-      <dgm:whole/>
-    </dgm:dataModel>
-  </dgm:sampData>
-  <dgm:styleData useDef="1">
-    <dgm:dataModel>
-      <dgm:ptLst/>
-      <dgm:bg/>
-      <dgm:whole/>
-    </dgm:dataModel>
-  </dgm:styleData>
-  <dgm:clrData useDef="1">
-    <dgm:dataModel>
-      <dgm:ptLst/>
-      <dgm:bg/>
-      <dgm:whole/>
-    </dgm:dataModel>
-  </dgm:clrData>
-  <dgm:layoutNode name="root">
-    <dgm:varLst>
-      <dgm:dir/>
-      <dgm:resizeHandles val="exact"/>
-    </dgm:varLst>
-    <dgm:choose name="Name0">
-      <dgm:if name="Name1" axis="self" func="var" arg="dir" op="equ" val="norm">
-        <dgm:alg type="snake">
-          <dgm:param type="grDir" val="tL"/>
-          <dgm:param type="flowDir" val="row"/>
-          <dgm:param type="contDir" val="sameDir"/>
-          <dgm:param type="off" val="ctr"/>
-          <dgm:param type="vertAlign" val="mid"/>
-          <dgm:param type="horzAlign" val="ctr"/>
-        </dgm:alg>
-      </dgm:if>
-      <dgm:else name="Name2">
-        <dgm:alg type="snake">
-          <dgm:param type="grDir" val="tR"/>
-          <dgm:param type="flowDir" val="row"/>
-          <dgm:param type="contDir" val="sameDir"/>
-          <dgm:param type="off" val="ctr"/>
-          <dgm:param type="vertAlign" val="mid"/>
-          <dgm:param type="horzAlign" val="ctr"/>
-        </dgm:alg>
-      </dgm:else>
-    </dgm:choose>
-    <dgm:shape xmlns:r="http://schemas.openxmlformats.org/officeDocument/2006/relationships" r:blip="">
-      <dgm:adjLst/>
-    </dgm:shape>
-    <dgm:presOf/>
-    <dgm:choose name="Name3">
-      <dgm:if name="Name4" axis="ch" ptType="node" func="cnt" op="lte" val="2">
-        <dgm:constrLst>
-          <dgm:constr type="h" for="ch" forName="compNode" refType="h" fact="0.4"/>
-          <dgm:constr type="w" for="ch" forName="compNode" val="120"/>
-          <dgm:constr type="w" for="ch" forName="sibTrans" refType="w" refFor="ch" refForName="compNode" fact="0.175"/>
-          <dgm:constr type="sp" refType="w" refFor="ch" refForName="compNode" op="equ" fact="0.25"/>
-          <dgm:constr type="primFontSz" for="des" ptType="node" op="equ" val="50"/>
-          <dgm:constr type="h" for="des" forName="compNode" op="equ"/>
-          <dgm:constr type="h" for="des" forName="textRect" op="equ"/>
-        </dgm:constrLst>
-      </dgm:if>
-      <dgm:if name="Name5" axis="ch" ptType="node" func="cnt" op="lte" val="4">
-        <dgm:constrLst>
-          <dgm:constr type="h" for="ch" forName="compNode" refType="h" fact="0.4"/>
-          <dgm:constr type="w" for="ch" forName="compNode" refType="w"/>
-          <dgm:constr type="w" for="ch" forName="sibTrans" refType="w" refFor="ch" refForName="compNode" fact="0.175"/>
-          <dgm:constr type="sp" refType="w" refFor="ch" refForName="compNode" op="equ" fact="0.25"/>
-          <dgm:constr type="primFontSz" for="des" ptType="node" op="equ" val="36"/>
-          <dgm:constr type="h" for="des" forName="compNode" op="equ"/>
-          <dgm:constr type="h" for="des" forName="textRect" op="equ"/>
-        </dgm:constrLst>
-      </dgm:if>
-      <dgm:else name="Name6">
-        <dgm:constrLst>
-          <dgm:constr type="h" for="ch" forName="compNode" refType="h" fact="0.4"/>
-          <dgm:constr type="w" for="ch" forName="compNode" refType="w"/>
-          <dgm:constr type="w" for="ch" forName="sibTrans" refType="w" refFor="ch" refForName="compNode" fact="0.175"/>
-          <dgm:constr type="sp" refType="w" refFor="ch" refForName="compNode" op="equ" fact="0.25"/>
-          <dgm:constr type="primFontSz" for="des" ptType="node" op="equ" val="24"/>
-          <dgm:constr type="h" for="des" forName="compNode" op="equ"/>
-          <dgm:constr type="h" for="des" forName="textRect" op="equ"/>
-        </dgm:constrLst>
-      </dgm:else>
-    </dgm:choose>
-    <dgm:ruleLst>
-      <dgm:rule type="w" for="ch" forName="compNode" val="50" fact="NaN" max="NaN"/>
-    </dgm:ruleLst>
-    <dgm:forEach name="Name7" axis="ch" ptType="node">
-      <dgm:layoutNode name="compNode">
-        <dgm:alg type="composite"/>
-        <dgm:shape xmlns:r="http://schemas.openxmlformats.org/officeDocument/2006/relationships" r:blip="">
-          <dgm:adjLst/>
-        </dgm:shape>
-        <dgm:presOf axis="self"/>
-        <dgm:constrLst>
-          <dgm:constr type="w" for="ch" forName="iconRect" refType="w" fact="0.45"/>
-          <dgm:constr type="h" for="ch" forName="iconRect" refType="w" refFor="ch" refForName="iconRect"/>
-          <dgm:constr type="ctrX" for="ch" forName="iconRect" refType="w" fact="0.5"/>
-          <dgm:constr type="t" for="ch" forName="iconRect"/>
-          <dgm:constr type="h" for="ch" forName="spaceRect" refType="h" fact="0.15"/>
-          <dgm:constr type="w" for="ch" forName="spaceRect" refType="w"/>
-          <dgm:constr type="l" for="ch" forName="spaceRect"/>
-          <dgm:constr type="t" for="ch" forName="spaceRect" refType="b" refFor="ch" refForName="iconRect"/>
-          <dgm:constr type="h" for="ch" forName="textRect" val="20"/>
-          <dgm:constr type="w" for="ch" forName="textRect" refType="w"/>
-          <dgm:constr type="l" for="ch" forName="textRect"/>
-          <dgm:constr type="t" for="ch" forName="textRect" refType="b" refFor="ch" refForName="spaceRect"/>
-        </dgm:constrLst>
-        <dgm:ruleLst>
-          <dgm:rule type="h" val="INF" fact="NaN" max="NaN"/>
-        </dgm:ruleLst>
-        <dgm:layoutNode name="iconRect" styleLbl="node1">
-          <dgm:alg type="sp"/>
-          <dgm:shape xmlns:r="http://schemas.openxmlformats.org/officeDocument/2006/relationships" type="rect" r:blip="" blipPhldr="1">
-            <dgm:adjLst/>
-          </dgm:shape>
-          <dgm:presOf/>
-          <dgm:constrLst/>
-          <dgm:ruleLst/>
-        </dgm:layoutNode>
-        <dgm:layoutNode name="spaceRect">
-          <dgm:alg type="sp"/>
-          <dgm:shape xmlns:r="http://schemas.openxmlformats.org/officeDocument/2006/relationships" r:blip="">
-            <dgm:adjLst/>
-          </dgm:shape>
-          <dgm:presOf/>
-          <dgm:constrLst/>
-          <dgm:ruleLst/>
-        </dgm:layoutNode>
-        <dgm:layoutNode name="textRect" styleLbl="revTx">
-          <dgm:varLst>
-            <dgm:chMax val="1"/>
-            <dgm:chPref val="1"/>
-          </dgm:varLst>
-          <dgm:alg type="tx">
-            <dgm:param type="txAnchorVert" val="t"/>
-          </dgm:alg>
-          <dgm:shape xmlns:r="http://schemas.openxmlformats.org/officeDocument/2006/relationships" type="rect" r:blip="">
-            <dgm:adjLst/>
-          </dgm:shape>
-          <dgm:presOf axis="self" ptType="node"/>
-          <dgm:constrLst>
-            <dgm:constr type="lMarg"/>
-            <dgm:constr type="rMarg"/>
-            <dgm:constr type="tMarg"/>
-            <dgm:constr type="bMarg"/>
-          </dgm:constrLst>
-          <dgm:ruleLst>
-            <dgm:rule type="primFontSz" val="11" fact="NaN" max="NaN"/>
-            <dgm:rule type="h" val="INF" fact="NaN" max="NaN"/>
-          </dgm:ruleLst>
-        </dgm:layoutNode>
-      </dgm:layoutNode>
-      <dgm:forEach name="Name8" axis="followSib" ptType="sibTrans" cnt="1">
-        <dgm:layoutNode name="sibTrans">
-          <dgm:alg type="sp"/>
-          <dgm:shape xmlns:r="http://schemas.openxmlformats.org/officeDocument/2006/relationships" r:blip="">
-            <dgm:adjLst/>
-          </dgm:shape>
-          <dgm:presOf axis="self"/>
-          <dgm:constrLst/>
-          <dgm:ruleLst/>
-        </dgm:layoutNode>
-      </dgm:forEach>
-    </dgm:forEach>
-  </dgm:layoutNode>
-  <dgm:extLst>
-    <a:ext uri="{68A01E43-0DF5-4B5B-8FA6-DAF915123BFB}">
-      <dgm1612:lstStyle xmlns:dgm1612="http://schemas.microsoft.com/office/drawing/2016/12/diagram">
-        <a:lvl1pPr>
-          <a:lnSpc>
-            <a:spcPct val="100000"/>
-          </a:lnSpc>
-        </a:lvl1pPr>
-      </dgm1612:lstStyle>
-    </a:ext>
-  </dgm:extLst>
-</dgm:layoutDef>
-</file>
-
-<file path=ppt/diagrams/quickStyle1.xml><?xml version="1.0" encoding="utf-8"?>
-<dgm:styleDef xmlns:dgm="http://schemas.openxmlformats.org/drawingml/2006/diagram" xmlns:a="http://schemas.openxmlformats.org/drawingml/2006/main" uniqueId="urn:microsoft.com/office/officeart/2005/8/quickstyle/simple4">
-  <dgm:title val=""/>
-  <dgm:desc val=""/>
-  <dgm:catLst>
-    <dgm:cat type="simple" pri="10400"/>
-  </dgm:catLst>
-  <dgm:scene3d>
-    <a:camera prst="orthographicFront"/>
-    <a:lightRig rig="threePt" dir="t"/>
-  </dgm:scene3d>
-  <dgm:styleLbl name="node0">
-    <dgm:scene3d>
-      <a:camera prst="orthographicFront"/>
-      <a:lightRig rig="threePt" dir="t"/>
-    </dgm:scene3d>
-    <dgm:sp3d/>
-    <dgm:txPr/>
-    <dgm:style>
-      <a:lnRef idx="0">
-        <a:scrgbClr r="0" g="0" b="0"/>
-      </a:lnRef>
-      <a:fillRef idx="3">
-        <a:scrgbClr r="0" g="0" b="0"/>
-      </a:fillRef>
-      <a:effectRef idx="2">
-        <a:scrgbClr r="0" g="0" b="0"/>
-      </a:effectRef>
-      <a:fontRef idx="minor">
-        <a:schemeClr val="lt1"/>
-      </a:fontRef>
-    </dgm:style>
-  </dgm:styleLbl>
-  <dgm:styleLbl name="lnNode1">
-    <dgm:scene3d>
-      <a:camera prst="orthographicFront"/>
-      <a:lightRig rig="threePt" dir="t"/>
-    </dgm:scene3d>
-    <dgm:sp3d/>
-    <dgm:txPr/>
-    <dgm:style>
-      <a:lnRef idx="1">
-        <a:scrgbClr r="0" g="0" b="0"/>
-      </a:lnRef>
-      <a:fillRef idx="3">
-        <a:scrgbClr r="0" g="0" b="0"/>
-      </a:fillRef>
-      <a:effectRef idx="2">
-        <a:scrgbClr r="0" g="0" b="0"/>
-      </a:effectRef>
-      <a:fontRef idx="minor">
-        <a:schemeClr val="lt1"/>
-      </a:fontRef>
-    </dgm:style>
-  </dgm:styleLbl>
-  <dgm:styleLbl name="vennNode1">
-    <dgm:scene3d>
-      <a:camera prst="orthographicFront"/>
-      <a:lightRig rig="threePt" dir="t"/>
-    </dgm:scene3d>
-    <dgm:sp3d/>
-    <dgm:txPr/>
-    <dgm:style>
-      <a:lnRef idx="0">
-        <a:scrgbClr r="0" g="0" b="0"/>
-      </a:lnRef>
-      <a:fillRef idx="3">
-        <a:scrgbClr r="0" g="0" b="0"/>
-      </a:fillRef>
-      <a:effectRef idx="0">
-        <a:scrgbClr r="0" g="0" b="0"/>
-      </a:effectRef>
-      <a:fontRef idx="minor">
-        <a:schemeClr val="tx1"/>
-      </a:fontRef>
-    </dgm:style>
-  </dgm:styleLbl>
-  <dgm:styleLbl name="alignNode1">
-    <dgm:scene3d>
-      <a:camera prst="orthographicFront"/>
-      <a:lightRig rig="threePt" dir="t"/>
-    </dgm:scene3d>
-    <dgm:sp3d/>
-    <dgm:txPr/>
-    <dgm:style>
-      <a:lnRef idx="1">
-        <a:scrgbClr r="0" g="0" b="0"/>
-      </a:lnRef>
-      <a:fillRef idx="3">
-        <a:scrgbClr r="0" g="0" b="0"/>
-      </a:fillRef>
-      <a:effectRef idx="2">
-        <a:scrgbClr r="0" g="0" b="0"/>
-      </a:effectRef>
-      <a:fontRef idx="minor">
-        <a:schemeClr val="lt1"/>
-      </a:fontRef>
-    </dgm:style>
-  </dgm:styleLbl>
-  <dgm:styleLbl name="node1">
-    <dgm:scene3d>
-      <a:camera prst="orthographicFront"/>
-      <a:lightRig rig="threePt" dir="t"/>
-    </dgm:scene3d>
-    <dgm:sp3d/>
-    <dgm:txPr/>
-    <dgm:style>
-      <a:lnRef idx="0">
-        <a:scrgbClr r="0" g="0" b="0"/>
-      </a:lnRef>
-      <a:fillRef idx="3">
-        <a:scrgbClr r="0" g="0" b="0"/>
-      </a:fillRef>
-      <a:effectRef idx="2">
-        <a:scrgbClr r="0" g="0" b="0"/>
-      </a:effectRef>
-      <a:fontRef idx="minor">
-        <a:schemeClr val="lt1"/>
-      </a:fontRef>
-    </dgm:style>
-  </dgm:styleLbl>
-  <dgm:styleLbl name="node2">
-    <dgm:scene3d>
-      <a:camera prst="orthographicFront"/>
-      <a:lightRig rig="threePt" dir="t"/>
-    </dgm:scene3d>
-    <dgm:sp3d/>
-    <dgm:txPr/>
-    <dgm:style>
-      <a:lnRef idx="0">
-        <a:scrgbClr r="0" g="0" b="0"/>
-      </a:lnRef>
-      <a:fillRef idx="3">
-        <a:scrgbClr r="0" g="0" b="0"/>
-      </a:fillRef>
-      <a:effectRef idx="2">
-        <a:scrgbClr r="0" g="0" b="0"/>
-      </a:effectRef>
-      <a:fontRef idx="minor">
-        <a:schemeClr val="lt1"/>
-      </a:fontRef>
-    </dgm:style>
-  </dgm:styleLbl>
-  <dgm:styleLbl name="node3">
-    <dgm:scene3d>
-      <a:camera prst="orthographicFront"/>
-      <a:lightRig rig="threePt" dir="t"/>
-    </dgm:scene3d>
-    <dgm:sp3d/>
-    <dgm:txPr/>
-    <dgm:style>
-      <a:lnRef idx="0">
-        <a:scrgbClr r="0" g="0" b="0"/>
-      </a:lnRef>
-      <a:fillRef idx="3">
-        <a:scrgbClr r="0" g="0" b="0"/>
-      </a:fillRef>
-      <a:effectRef idx="2">
-        <a:scrgbClr r="0" g="0" b="0"/>
-      </a:effectRef>
-      <a:fontRef idx="minor">
-        <a:schemeClr val="lt1"/>
-      </a:fontRef>
-    </dgm:style>
-  </dgm:styleLbl>
-  <dgm:styleLbl name="node4">
-    <dgm:scene3d>
-      <a:camera prst="orthographicFront"/>
-      <a:lightRig rig="threePt" dir="t"/>
-    </dgm:scene3d>
-    <dgm:sp3d/>
-    <dgm:txPr/>
-    <dgm:style>
-      <a:lnRef idx="0">
-        <a:scrgbClr r="0" g="0" b="0"/>
-      </a:lnRef>
-      <a:fillRef idx="3">
-        <a:scrgbClr r="0" g="0" b="0"/>
-      </a:fillRef>
-      <a:effectRef idx="2">
-        <a:scrgbClr r="0" g="0" b="0"/>
-      </a:effectRef>
-      <a:fontRef idx="minor">
-        <a:schemeClr val="lt1"/>
-      </a:fontRef>
-    </dgm:style>
-  </dgm:styleLbl>
-  <dgm:styleLbl name="fgImgPlace1">
-    <dgm:scene3d>
-      <a:camera prst="orthographicFront"/>
-      <a:lightRig rig="threePt" dir="t"/>
-    </dgm:scene3d>
-    <dgm:sp3d/>
-    <dgm:txPr/>
-    <dgm:style>
-      <a:lnRef idx="0">
-        <a:scrgbClr r="0" g="0" b="0"/>
-      </a:lnRef>
-      <a:fillRef idx="1">
-        <a:scrgbClr r="0" g="0" b="0"/>
-      </a:fillRef>
-      <a:effectRef idx="2">
-        <a:scrgbClr r="0" g="0" b="0"/>
-      </a:effectRef>
-      <a:fontRef idx="minor"/>
-    </dgm:style>
-  </dgm:styleLbl>
-  <dgm:styleLbl name="alignImgPlace1">
-    <dgm:scene3d>
-      <a:camera prst="orthographicFront"/>
-      <a:lightRig rig="threePt" dir="t"/>
-    </dgm:scene3d>
-    <dgm:sp3d/>
-    <dgm:txPr/>
-    <dgm:style>
-      <a:lnRef idx="0">
-        <a:scrgbClr r="0" g="0" b="0"/>
-      </a:lnRef>
-      <a:fillRef idx="1">
-        <a:scrgbClr r="0" g="0" b="0"/>
-      </a:fillRef>
-      <a:effectRef idx="2">
-        <a:scrgbClr r="0" g="0" b="0"/>
-      </a:effectRef>
-      <a:fontRef idx="minor"/>
-    </dgm:style>
-  </dgm:styleLbl>
-  <dgm:styleLbl name="bgImgPlace1">
-    <dgm:scene3d>
-      <a:camera prst="orthographicFront"/>
-      <a:lightRig rig="threePt" dir="t"/>
-    </dgm:scene3d>
-    <dgm:sp3d/>
-    <dgm:txPr/>
-    <dgm:style>
-      <a:lnRef idx="0">
-        <a:scrgbClr r="0" g="0" b="0"/>
-      </a:lnRef>
-      <a:fillRef idx="1">
-        <a:scrgbClr r="0" g="0" b="0"/>
-      </a:fillRef>
-      <a:effectRef idx="2">
-        <a:scrgbClr r="0" g="0" b="0"/>
-      </a:effectRef>
-      <a:fontRef idx="minor"/>
-    </dgm:style>
-  </dgm:styleLbl>
-  <dgm:styleLbl name="sibTrans2D1">
-    <dgm:scene3d>
-      <a:camera prst="orthographicFront"/>
-      <a:lightRig rig="threePt" dir="t"/>
-    </dgm:scene3d>
-    <dgm:sp3d/>
-    <dgm:txPr/>
-    <dgm:style>
-      <a:lnRef idx="0">
-        <a:scrgbClr r="0" g="0" b="0"/>
-      </a:lnRef>
-      <a:fillRef idx="3">
-        <a:scrgbClr r="0" g="0" b="0"/>
-      </a:fillRef>
-      <a:effectRef idx="2">
-        <a:scrgbClr r="0" g="0" b="0"/>
-      </a:effectRef>
-      <a:fontRef idx="minor">
-        <a:schemeClr val="lt1"/>
-      </a:fontRef>
-    </dgm:style>
-  </dgm:styleLbl>
-  <dgm:styleLbl name="fgSibTrans2D1">
-    <dgm:scene3d>
-      <a:camera prst="orthographicFront"/>
-      <a:lightRig rig="threePt" dir="t"/>
-    </dgm:scene3d>
-    <dgm:sp3d/>
-    <dgm:txPr/>
-    <dgm:style>
-      <a:lnRef idx="0">
-        <a:scrgbClr r="0" g="0" b="0"/>
-      </a:lnRef>
-      <a:fillRef idx="3">
-        <a:scrgbClr r="0" g="0" b="0"/>
-      </a:fillRef>
-      <a:effectRef idx="2">
-        <a:scrgbClr r="0" g="0" b="0"/>
-      </a:effectRef>
-      <a:fontRef idx="minor">
-        <a:schemeClr val="lt1"/>
-      </a:fontRef>
-    </dgm:style>
-  </dgm:styleLbl>
-  <dgm:styleLbl name="bgSibTrans2D1">
-    <dgm:scene3d>
-      <a:camera prst="orthographicFront"/>
-      <a:lightRig rig="threePt" dir="t"/>
-    </dgm:scene3d>
-    <dgm:sp3d/>
-    <dgm:txPr/>
-    <dgm:style>
-      <a:lnRef idx="0">
-        <a:scrgbClr r="0" g="0" b="0"/>
-      </a:lnRef>
-      <a:fillRef idx="3">
-        <a:scrgbClr r="0" g="0" b="0"/>
-      </a:fillRef>
-      <a:effectRef idx="2">
-        <a:scrgbClr r="0" g="0" b="0"/>
-      </a:effectRef>
-      <a:fontRef idx="minor">
-        <a:schemeClr val="lt1"/>
-      </a:fontRef>
-    </dgm:style>
-  </dgm:styleLbl>
-  <dgm:styleLbl name="sibTrans1D1">
-    <dgm:scene3d>
-      <a:camera prst="orthographicFront"/>
-      <a:lightRig rig="threePt" dir="t"/>
-    </dgm:scene3d>
-    <dgm:sp3d/>
-    <dgm:txPr/>
-    <dgm:style>
-      <a:lnRef idx="1">
-        <a:scrgbClr r="0" g="0" b="0"/>
-      </a:lnRef>
-      <a:fillRef idx="0">
-        <a:scrgbClr r="0" g="0" b="0"/>
-      </a:fillRef>
-      <a:effectRef idx="0">
-        <a:scrgbClr r="0" g="0" b="0"/>
-      </a:effectRef>
-      <a:fontRef idx="minor"/>
-    </dgm:style>
-  </dgm:styleLbl>
-  <dgm:styleLbl name="callout">
-    <dgm:scene3d>
-      <a:camera prst="orthographicFront"/>
-      <a:lightRig rig="threePt" dir="t"/>
-    </dgm:scene3d>
-    <dgm:sp3d/>
-    <dgm:txPr/>
-    <dgm:style>
-      <a:lnRef idx="2">
-        <a:scrgbClr r="0" g="0" b="0"/>
-      </a:lnRef>
-      <a:fillRef idx="1">
-        <a:scrgbClr r="0" g="0" b="0"/>
-      </a:fillRef>
-      <a:effectRef idx="1">
-        <a:scrgbClr r="0" g="0" b="0"/>
-      </a:effectRef>
-      <a:fontRef idx="minor"/>
-    </dgm:style>
-  </dgm:styleLbl>
-  <dgm:styleLbl name="asst0">
-    <dgm:scene3d>
-      <a:camera prst="orthographicFront"/>
-      <a:lightRig rig="threePt" dir="t"/>
-    </dgm:scene3d>
-    <dgm:sp3d/>
-    <dgm:txPr/>
-    <dgm:style>
-      <a:lnRef idx="0">
-        <a:scrgbClr r="0" g="0" b="0"/>
-      </a:lnRef>
-      <a:fillRef idx="3">
-        <a:scrgbClr r="0" g="0" b="0"/>
-      </a:fillRef>
-      <a:effectRef idx="2">
-        <a:scrgbClr r="0" g="0" b="0"/>
-      </a:effectRef>
-      <a:fontRef idx="minor">
-        <a:schemeClr val="lt1"/>
-      </a:fontRef>
-    </dgm:style>
-  </dgm:styleLbl>
-  <dgm:styleLbl name="asst1">
-    <dgm:scene3d>
-      <a:camera prst="orthographicFront"/>
-      <a:lightRig rig="threePt" dir="t"/>
-    </dgm:scene3d>
-    <dgm:sp3d/>
-    <dgm:txPr/>
-    <dgm:style>
-      <a:lnRef idx="0">
-        <a:scrgbClr r="0" g="0" b="0"/>
-      </a:lnRef>
-      <a:fillRef idx="3">
-        <a:scrgbClr r="0" g="0" b="0"/>
-      </a:fillRef>
-      <a:effectRef idx="2">
-        <a:scrgbClr r="0" g="0" b="0"/>
-      </a:effectRef>
-      <a:fontRef idx="minor">
-        <a:schemeClr val="lt1"/>
-      </a:fontRef>
-    </dgm:style>
-  </dgm:styleLbl>
-  <dgm:styleLbl name="asst2">
-    <dgm:scene3d>
-      <a:camera prst="orthographicFront"/>
-      <a:lightRig rig="threePt" dir="t"/>
-    </dgm:scene3d>
-    <dgm:sp3d/>
-    <dgm:txPr/>
-    <dgm:style>
-      <a:lnRef idx="0">
-        <a:scrgbClr r="0" g="0" b="0"/>
-      </a:lnRef>
-      <a:fillRef idx="3">
-        <a:scrgbClr r="0" g="0" b="0"/>
-      </a:fillRef>
-      <a:effectRef idx="2">
-        <a:scrgbClr r="0" g="0" b="0"/>
-      </a:effectRef>
-      <a:fontRef idx="minor">
-        <a:schemeClr val="lt1"/>
-      </a:fontRef>
-    </dgm:style>
-  </dgm:styleLbl>
-  <dgm:styleLbl name="asst3">
-    <dgm:scene3d>
-      <a:camera prst="orthographicFront"/>
-      <a:lightRig rig="threePt" dir="t"/>
-    </dgm:scene3d>
-    <dgm:sp3d/>
-    <dgm:txPr/>
-    <dgm:style>
-      <a:lnRef idx="0">
-        <a:scrgbClr r="0" g="0" b="0"/>
-      </a:lnRef>
-      <a:fillRef idx="3">
-        <a:scrgbClr r="0" g="0" b="0"/>
-      </a:fillRef>
-      <a:effectRef idx="2">
-        <a:scrgbClr r="0" g="0" b="0"/>
-      </a:effectRef>
-      <a:fontRef idx="minor">
-        <a:schemeClr val="lt1"/>
-      </a:fontRef>
-    </dgm:style>
-  </dgm:styleLbl>
-  <dgm:styleLbl name="asst4">
-    <dgm:scene3d>
-      <a:camera prst="orthographicFront"/>
-      <a:lightRig rig="threePt" dir="t"/>
-    </dgm:scene3d>
-    <dgm:sp3d/>
-    <dgm:txPr/>
-    <dgm:style>
-      <a:lnRef idx="0">
-        <a:scrgbClr r="0" g="0" b="0"/>
-      </a:lnRef>
-      <a:fillRef idx="3">
-        <a:scrgbClr r="0" g="0" b="0"/>
-      </a:fillRef>
-      <a:effectRef idx="2">
-        <a:scrgbClr r="0" g="0" b="0"/>
-      </a:effectRef>
-      <a:fontRef idx="minor">
-        <a:schemeClr val="lt1"/>
-      </a:fontRef>
-    </dgm:style>
-  </dgm:styleLbl>
-  <dgm:styleLbl name="parChTrans2D1">
-    <dgm:scene3d>
-      <a:camera prst="orthographicFront"/>
-      <a:lightRig rig="threePt" dir="t"/>
-    </dgm:scene3d>
-    <dgm:sp3d/>
-    <dgm:txPr/>
-    <dgm:style>
-      <a:lnRef idx="0">
-        <a:scrgbClr r="0" g="0" b="0"/>
-      </a:lnRef>
-      <a:fillRef idx="3">
-        <a:scrgbClr r="0" g="0" b="0"/>
-      </a:fillRef>
-      <a:effectRef idx="2">
-        <a:scrgbClr r="0" g="0" b="0"/>
-      </a:effectRef>
-      <a:fontRef idx="minor">
-        <a:schemeClr val="lt1"/>
-      </a:fontRef>
-    </dgm:style>
-  </dgm:styleLbl>
-  <dgm:styleLbl name="parChTrans2D2">
-    <dgm:scene3d>
-      <a:camera prst="orthographicFront"/>
-      <a:lightRig rig="threePt" dir="t"/>
-    </dgm:scene3d>
-    <dgm:sp3d/>
-    <dgm:txPr/>
-    <dgm:style>
-      <a:lnRef idx="0">
-        <a:scrgbClr r="0" g="0" b="0"/>
-      </a:lnRef>
-      <a:fillRef idx="3">
-        <a:scrgbClr r="0" g="0" b="0"/>
-      </a:fillRef>
-      <a:effectRef idx="2">
-        <a:scrgbClr r="0" g="0" b="0"/>
-      </a:effectRef>
-      <a:fontRef idx="minor">
-        <a:schemeClr val="lt1"/>
-      </a:fontRef>
-    </dgm:style>
-  </dgm:styleLbl>
-  <dgm:styleLbl name="parChTrans2D3">
-    <dgm:scene3d>
-      <a:camera prst="orthographicFront"/>
-      <a:lightRig rig="threePt" dir="t"/>
-    </dgm:scene3d>
-    <dgm:sp3d/>
-    <dgm:txPr/>
-    <dgm:style>
-      <a:lnRef idx="1">
-        <a:scrgbClr r="0" g="0" b="0"/>
-      </a:lnRef>
-      <a:fillRef idx="3">
-        <a:scrgbClr r="0" g="0" b="0"/>
-      </a:fillRef>
-      <a:effectRef idx="2">
-        <a:scrgbClr r="0" g="0" b="0"/>
-      </a:effectRef>
-      <a:fontRef idx="minor">
-        <a:schemeClr val="lt1"/>
-      </a:fontRef>
-    </dgm:style>
-  </dgm:styleLbl>
-  <dgm:styleLbl name="parChTrans2D4">
-    <dgm:scene3d>
-      <a:camera prst="orthographicFront"/>
-      <a:lightRig rig="threePt" dir="t"/>
-    </dgm:scene3d>
-    <dgm:sp3d/>
-    <dgm:txPr/>
-    <dgm:style>
-      <a:lnRef idx="1">
-        <a:scrgbClr r="0" g="0" b="0"/>
-      </a:lnRef>
-      <a:fillRef idx="3">
-        <a:scrgbClr r="0" g="0" b="0"/>
-      </a:fillRef>
-      <a:effectRef idx="2">
-        <a:scrgbClr r="0" g="0" b="0"/>
-      </a:effectRef>
-      <a:fontRef idx="minor">
-        <a:schemeClr val="lt1"/>
-      </a:fontRef>
-    </dgm:style>
-  </dgm:styleLbl>
-  <dgm:styleLbl name="parChTrans1D1">
-    <dgm:scene3d>
-      <a:camera prst="orthographicFront"/>
-      <a:lightRig rig="threePt" dir="t"/>
-    </dgm:scene3d>
-    <dgm:sp3d/>
-    <dgm:txPr/>
-    <dgm:style>
-      <a:lnRef idx="1">
-        <a:scrgbClr r="0" g="0" b="0"/>
-      </a:lnRef>
-      <a:fillRef idx="0">
-        <a:scrgbClr r="0" g="0" b="0"/>
-      </a:fillRef>
-      <a:effectRef idx="0">
-        <a:scrgbClr r="0" g="0" b="0"/>
-      </a:effectRef>
-      <a:fontRef idx="minor"/>
-    </dgm:style>
-  </dgm:styleLbl>
-  <dgm:styleLbl name="parChTrans1D2">
-    <dgm:scene3d>
-      <a:camera prst="orthographicFront"/>
-      <a:lightRig rig="threePt" dir="t"/>
-    </dgm:scene3d>
-    <dgm:sp3d/>
-    <dgm:txPr/>
-    <dgm:style>
-      <a:lnRef idx="1">
-        <a:scrgbClr r="0" g="0" b="0"/>
-      </a:lnRef>
-      <a:fillRef idx="0">
-        <a:scrgbClr r="0" g="0" b="0"/>
-      </a:fillRef>
-      <a:effectRef idx="0">
-        <a:scrgbClr r="0" g="0" b="0"/>
-      </a:effectRef>
-      <a:fontRef idx="minor"/>
-    </dgm:style>
-  </dgm:styleLbl>
-  <dgm:styleLbl name="parChTrans1D3">
-    <dgm:scene3d>
-      <a:camera prst="orthographicFront"/>
-      <a:lightRig rig="threePt" dir="t"/>
-    </dgm:scene3d>
-    <dgm:sp3d/>
-    <dgm:txPr/>
-    <dgm:style>
-      <a:lnRef idx="1">
-        <a:scrgbClr r="0" g="0" b="0"/>
-      </a:lnRef>
-      <a:fillRef idx="0">
-        <a:scrgbClr r="0" g="0" b="0"/>
-      </a:fillRef>
-      <a:effectRef idx="0">
-        <a:scrgbClr r="0" g="0" b="0"/>
-      </a:effectRef>
-      <a:fontRef idx="minor"/>
-    </dgm:style>
-  </dgm:styleLbl>
-  <dgm:styleLbl name="parChTrans1D4">
-    <dgm:scene3d>
-      <a:camera prst="orthographicFront"/>
-      <a:lightRig rig="threePt" dir="t"/>
-    </dgm:scene3d>
-    <dgm:sp3d/>
-    <dgm:txPr/>
-    <dgm:style>
-      <a:lnRef idx="1">
-        <a:scrgbClr r="0" g="0" b="0"/>
-      </a:lnRef>
-      <a:fillRef idx="0">
-        <a:scrgbClr r="0" g="0" b="0"/>
-      </a:fillRef>
-      <a:effectRef idx="0">
-        <a:scrgbClr r="0" g="0" b="0"/>
-      </a:effectRef>
-      <a:fontRef idx="minor"/>
-    </dgm:style>
-  </dgm:styleLbl>
-  <dgm:styleLbl name="fgAcc1">
-    <dgm:scene3d>
-      <a:camera prst="orthographicFront"/>
-      <a:lightRig rig="threePt" dir="t"/>
-    </dgm:scene3d>
-    <dgm:sp3d/>
-    <dgm:txPr/>
-    <dgm:style>
-      <a:lnRef idx="1">
-        <a:scrgbClr r="0" g="0" b="0"/>
-      </a:lnRef>
-      <a:fillRef idx="1">
-        <a:scrgbClr r="0" g="0" b="0"/>
-      </a:fillRef>
-      <a:effectRef idx="0">
-        <a:scrgbClr r="0" g="0" b="0"/>
-      </a:effectRef>
-      <a:fontRef idx="minor"/>
-    </dgm:style>
-  </dgm:styleLbl>
-  <dgm:styleLbl name="conFgAcc1">
-    <dgm:scene3d>
-      <a:camera prst="orthographicFront"/>
-      <a:lightRig rig="threePt" dir="t"/>
-    </dgm:scene3d>
-    <dgm:sp3d/>
-    <dgm:txPr/>
-    <dgm:style>
-      <a:lnRef idx="1">
-        <a:scrgbClr r="0" g="0" b="0"/>
-      </a:lnRef>
-      <a:fillRef idx="1">
-        <a:scrgbClr r="0" g="0" b="0"/>
-      </a:fillRef>
-      <a:effectRef idx="0">
-        <a:scrgbClr r="0" g="0" b="0"/>
-      </a:effectRef>
-      <a:fontRef idx="minor"/>
-    </dgm:style>
-  </dgm:styleLbl>
-  <dgm:styleLbl name="alignAcc1">
-    <dgm:scene3d>
-      <a:camera prst="orthographicFront"/>
-      <a:lightRig rig="threePt" dir="t"/>
-    </dgm:scene3d>
-    <dgm:sp3d/>
-    <dgm:txPr/>
-    <dgm:style>
-      <a:lnRef idx="1">
-        <a:scrgbClr r="0" g="0" b="0"/>
-      </a:lnRef>
-      <a:fillRef idx="1">
-        <a:scrgbClr r="0" g="0" b="0"/>
-      </a:fillRef>
-      <a:effectRef idx="0">
-        <a:scrgbClr r="0" g="0" b="0"/>
-      </a:effectRef>
-      <a:fontRef idx="minor"/>
-    </dgm:style>
-  </dgm:styleLbl>
-  <dgm:styleLbl name="trAlignAcc1">
-    <dgm:scene3d>
-      <a:camera prst="orthographicFront"/>
-      <a:lightRig rig="threePt" dir="t"/>
-    </dgm:scene3d>
-    <dgm:sp3d/>
-    <dgm:txPr/>
-    <dgm:style>
-      <a:lnRef idx="1">
-        <a:scrgbClr r="0" g="0" b="0"/>
-      </a:lnRef>
-      <a:fillRef idx="1">
-        <a:scrgbClr r="0" g="0" b="0"/>
-      </a:fillRef>
-      <a:effectRef idx="0">
-        <a:scrgbClr r="0" g="0" b="0"/>
-      </a:effectRef>
-      <a:fontRef idx="minor"/>
-    </dgm:style>
-  </dgm:styleLbl>
-  <dgm:styleLbl name="bgAcc1">
-    <dgm:scene3d>
-      <a:camera prst="orthographicFront"/>
-      <a:lightRig rig="threePt" dir="t"/>
-    </dgm:scene3d>
-    <dgm:sp3d/>
-    <dgm:txPr/>
-    <dgm:style>
-      <a:lnRef idx="1">
-        <a:scrgbClr r="0" g="0" b="0"/>
-      </a:lnRef>
-      <a:fillRef idx="1">
-        <a:scrgbClr r="0" g="0" b="0"/>
-      </a:fillRef>
-      <a:effectRef idx="0">
-        <a:scrgbClr r="0" g="0" b="0"/>
-      </a:effectRef>
-      <a:fontRef idx="minor"/>
-    </dgm:style>
-  </dgm:styleLbl>
-  <dgm:styleLbl name="solidFgAcc1">
-    <dgm:scene3d>
-      <a:camera prst="orthographicFront"/>
-      <a:lightRig rig="threePt" dir="t"/>
-    </dgm:scene3d>
-    <dgm:sp3d/>
-    <dgm:txPr/>
-    <dgm:style>
-      <a:lnRef idx="1">
-        <a:scrgbClr r="0" g="0" b="0"/>
-      </a:lnRef>
-      <a:fillRef idx="1">
-        <a:scrgbClr r="0" g="0" b="0"/>
-      </a:fillRef>
-      <a:effectRef idx="0">
-        <a:scrgbClr r="0" g="0" b="0"/>
-      </a:effectRef>
-      <a:fontRef idx="minor"/>
-    </dgm:style>
-  </dgm:styleLbl>
-  <dgm:styleLbl name="solidAlignAcc1">
-    <dgm:scene3d>
-      <a:camera prst="orthographicFront"/>
-      <a:lightRig rig="threePt" dir="t"/>
-    </dgm:scene3d>
-    <dgm:sp3d/>
-    <dgm:txPr/>
-    <dgm:style>
-      <a:lnRef idx="1">
-        <a:scrgbClr r="0" g="0" b="0"/>
-      </a:lnRef>
-      <a:fillRef idx="1">
-        <a:scrgbClr r="0" g="0" b="0"/>
-      </a:fillRef>
-      <a:effectRef idx="0">
-        <a:scrgbClr r="0" g="0" b="0"/>
-      </a:effectRef>
-      <a:fontRef idx="minor"/>
-    </dgm:style>
-  </dgm:styleLbl>
-  <dgm:styleLbl name="solidBgAcc1">
-    <dgm:scene3d>
-      <a:camera prst="orthographicFront"/>
-      <a:lightRig rig="threePt" dir="t"/>
-    </dgm:scene3d>
-    <dgm:sp3d/>
-    <dgm:txPr/>
-    <dgm:style>
-      <a:lnRef idx="1">
-        <a:scrgbClr r="0" g="0" b="0"/>
-      </a:lnRef>
-      <a:fillRef idx="1">
-        <a:scrgbClr r="0" g="0" b="0"/>
-      </a:fillRef>
-      <a:effectRef idx="0">
-        <a:scrgbClr r="0" g="0" b="0"/>
-      </a:effectRef>
-      <a:fontRef idx="minor"/>
-    </dgm:style>
-  </dgm:styleLbl>
-  <dgm:styleLbl name="fgAccFollowNode1">
-    <dgm:scene3d>
-      <a:camera prst="orthographicFront"/>
-      <a:lightRig rig="threePt" dir="t"/>
-    </dgm:scene3d>
-    <dgm:sp3d/>
-    <dgm:txPr/>
-    <dgm:style>
-      <a:lnRef idx="1">
-        <a:scrgbClr r="0" g="0" b="0"/>
-      </a:lnRef>
-      <a:fillRef idx="1">
-        <a:scrgbClr r="0" g="0" b="0"/>
-      </a:fillRef>
-      <a:effectRef idx="0">
-        <a:scrgbClr r="0" g="0" b="0"/>
-      </a:effectRef>
-      <a:fontRef idx="minor"/>
-    </dgm:style>
-  </dgm:styleLbl>
-  <dgm:styleLbl name="alignAccFollowNode1">
-    <dgm:scene3d>
-      <a:camera prst="orthographicFront"/>
-      <a:lightRig rig="threePt" dir="t"/>
-    </dgm:scene3d>
-    <dgm:sp3d/>
-    <dgm:txPr/>
-    <dgm:style>
-      <a:lnRef idx="1">
-        <a:scrgbClr r="0" g="0" b="0"/>
-      </a:lnRef>
-      <a:fillRef idx="1">
-        <a:scrgbClr r="0" g="0" b="0"/>
-      </a:fillRef>
-      <a:effectRef idx="0">
-        <a:scrgbClr r="0" g="0" b="0"/>
-      </a:effectRef>
-      <a:fontRef idx="minor"/>
-    </dgm:style>
-  </dgm:styleLbl>
-  <dgm:styleLbl name="bgAccFollowNode1">
-    <dgm:scene3d>
-      <a:camera prst="orthographicFront"/>
-      <a:lightRig rig="threePt" dir="t"/>
-    </dgm:scene3d>
-    <dgm:sp3d/>
-    <dgm:txPr/>
-    <dgm:style>
-      <a:lnRef idx="1">
-        <a:scrgbClr r="0" g="0" b="0"/>
-      </a:lnRef>
-      <a:fillRef idx="1">
-        <a:scrgbClr r="0" g="0" b="0"/>
-      </a:fillRef>
-      <a:effectRef idx="0">
-        <a:scrgbClr r="0" g="0" b="0"/>
-      </a:effectRef>
-      <a:fontRef idx="minor"/>
-    </dgm:style>
-  </dgm:styleLbl>
-  <dgm:styleLbl name="fgAcc0">
-    <dgm:scene3d>
-      <a:camera prst="orthographicFront"/>
-      <a:lightRig rig="threePt" dir="t"/>
-    </dgm:scene3d>
-    <dgm:sp3d/>
-    <dgm:txPr/>
-    <dgm:style>
-      <a:lnRef idx="1">
-        <a:scrgbClr r="0" g="0" b="0"/>
-      </a:lnRef>
-      <a:fillRef idx="1">
-        <a:scrgbClr r="0" g="0" b="0"/>
-      </a:fillRef>
-      <a:effectRef idx="0">
-        <a:scrgbClr r="0" g="0" b="0"/>
-      </a:effectRef>
-      <a:fontRef idx="minor"/>
-    </dgm:style>
-  </dgm:styleLbl>
-  <dgm:styleLbl name="fgAcc2">
-    <dgm:scene3d>
-      <a:camera prst="orthographicFront"/>
-      <a:lightRig rig="threePt" dir="t"/>
-    </dgm:scene3d>
-    <dgm:sp3d/>
-    <dgm:txPr/>
-    <dgm:style>
-      <a:lnRef idx="1">
-        <a:scrgbClr r="0" g="0" b="0"/>
-      </a:lnRef>
-      <a:fillRef idx="1">
-        <a:scrgbClr r="0" g="0" b="0"/>
-      </a:fillRef>
-      <a:effectRef idx="0">
-        <a:scrgbClr r="0" g="0" b="0"/>
-      </a:effectRef>
-      <a:fontRef idx="minor"/>
-    </dgm:style>
-  </dgm:styleLbl>
-  <dgm:styleLbl name="fgAcc3">
-    <dgm:scene3d>
-      <a:camera prst="orthographicFront"/>
-      <a:lightRig rig="threePt" dir="t"/>
-    </dgm:scene3d>
-    <dgm:sp3d/>
-    <dgm:txPr/>
-    <dgm:style>
-      <a:lnRef idx="1">
-        <a:scrgbClr r="0" g="0" b="0"/>
-      </a:lnRef>
-      <a:fillRef idx="1">
-        <a:scrgbClr r="0" g="0" b="0"/>
-      </a:fillRef>
-      <a:effectRef idx="0">
-        <a:scrgbClr r="0" g="0" b="0"/>
-      </a:effectRef>
-      <a:fontRef idx="minor"/>
-    </dgm:style>
-  </dgm:styleLbl>
-  <dgm:styleLbl name="fgAcc4">
-    <dgm:scene3d>
-      <a:camera prst="orthographicFront"/>
-      <a:lightRig rig="threePt" dir="t"/>
-    </dgm:scene3d>
-    <dgm:sp3d/>
-    <dgm:txPr/>
-    <dgm:style>
-      <a:lnRef idx="1">
-        <a:scrgbClr r="0" g="0" b="0"/>
-      </a:lnRef>
-      <a:fillRef idx="1">
-        <a:scrgbClr r="0" g="0" b="0"/>
-      </a:fillRef>
-      <a:effectRef idx="0">
-        <a:scrgbClr r="0" g="0" b="0"/>
-      </a:effectRef>
-      <a:fontRef idx="minor"/>
-    </dgm:style>
-  </dgm:styleLbl>
-  <dgm:styleLbl name="bgShp">
-    <dgm:scene3d>
-      <a:camera prst="orthographicFront"/>
-      <a:lightRig rig="threePt" dir="t"/>
-    </dgm:scene3d>
-    <dgm:sp3d/>
-    <dgm:txPr/>
-    <dgm:style>
-      <a:lnRef idx="0">
-        <a:scrgbClr r="0" g="0" b="0"/>
-      </a:lnRef>
-      <a:fillRef idx="1">
-        <a:scrgbClr r="0" g="0" b="0"/>
-      </a:fillRef>
-      <a:effectRef idx="2">
-        <a:scrgbClr r="0" g="0" b="0"/>
-      </a:effectRef>
-      <a:fontRef idx="minor"/>
-    </dgm:style>
-  </dgm:styleLbl>
-  <dgm:styleLbl name="dkBgShp">
-    <dgm:scene3d>
-      <a:camera prst="orthographicFront"/>
-      <a:lightRig rig="threePt" dir="t"/>
-    </dgm:scene3d>
-    <dgm:sp3d/>
-    <dgm:txPr/>
-    <dgm:style>
-      <a:lnRef idx="0">
-        <a:scrgbClr r="0" g="0" b="0"/>
-      </a:lnRef>
-      <a:fillRef idx="1">
-        <a:scrgbClr r="0" g="0" b="0"/>
-      </a:fillRef>
-      <a:effectRef idx="2">
-        <a:scrgbClr r="0" g="0" b="0"/>
-      </a:effectRef>
-      <a:fontRef idx="minor"/>
-    </dgm:style>
-  </dgm:styleLbl>
-  <dgm:styleLbl name="trBgShp">
-    <dgm:scene3d>
-      <a:camera prst="orthographicFront"/>
-      <a:lightRig rig="threePt" dir="t"/>
-    </dgm:scene3d>
-    <dgm:sp3d/>
-    <dgm:txPr/>
-    <dgm:style>
-      <a:lnRef idx="0">
-        <a:scrgbClr r="0" g="0" b="0"/>
-      </a:lnRef>
-      <a:fillRef idx="1">
-        <a:scrgbClr r="0" g="0" b="0"/>
-      </a:fillRef>
-      <a:effectRef idx="0">
-        <a:scrgbClr r="0" g="0" b="0"/>
-      </a:effectRef>
-      <a:fontRef idx="minor"/>
-    </dgm:style>
-  </dgm:styleLbl>
-  <dgm:styleLbl name="fgShp">
-    <dgm:scene3d>
-      <a:camera prst="orthographicFront"/>
-      <a:lightRig rig="threePt" dir="t"/>
-    </dgm:scene3d>
-    <dgm:sp3d/>
-    <dgm:txPr/>
-    <dgm:style>
-      <a:lnRef idx="0">
-        <a:scrgbClr r="0" g="0" b="0"/>
-      </a:lnRef>
-      <a:fillRef idx="3">
-        <a:scrgbClr r="0" g="0" b="0"/>
-      </a:fillRef>
-      <a:effectRef idx="2">
-        <a:scrgbClr r="0" g="0" b="0"/>
-      </a:effectRef>
-      <a:fontRef idx="minor"/>
-    </dgm:style>
-  </dgm:styleLbl>
-  <dgm:styleLbl name="revTx">
-    <dgm:scene3d>
-      <a:camera prst="orthographicFront"/>
-      <a:lightRig rig="threePt" dir="t"/>
-    </dgm:scene3d>
-    <dgm:sp3d/>
-    <dgm:txPr/>
-    <dgm:style>
-      <a:lnRef idx="0">
-        <a:scrgbClr r="0" g="0" b="0"/>
-      </a:lnRef>
-      <a:fillRef idx="0">
-        <a:scrgbClr r="0" g="0" b="0"/>
-      </a:fillRef>
-      <a:effectRef idx="0">
-        <a:scrgbClr r="0" g="0" b="0"/>
-      </a:effectRef>
-      <a:fontRef idx="minor"/>
-    </dgm:style>
-  </dgm:styleLbl>
-</dgm:styleDef>
 </file>
 
 <file path=ppt/handoutMasters/handoutMaster1.xml><?xml version="1.0" encoding="utf-8"?>
@@ -3622,7 +836,7 @@
           <a:bodyPr/>
           <a:lstStyle/>
           <a:p>
-            <a:endParaRPr lang="es-ES"/>
+            <a:endParaRPr lang="es-ES" dirty="0"/>
           </a:p>
         </p:txBody>
       </p:sp>
@@ -7795,57 +5009,6 @@
           </a:p>
         </p:txBody>
       </p:sp>
-      <p:pic>
-        <p:nvPicPr>
-          <p:cNvPr id="7" name="Imagen 6" descr="Conexiones digitales">
-            <a:extLst>
-              <a:ext uri="{FF2B5EF4-FFF2-40B4-BE49-F238E27FC236}">
-                <a16:creationId xmlns:a16="http://schemas.microsoft.com/office/drawing/2014/main" id="{3840F91C-EDD0-4D4E-A4AB-E6C77856C88C}"/>
-              </a:ext>
-            </a:extLst>
-          </p:cNvPr>
-          <p:cNvPicPr>
-            <a:picLocks noChangeAspect="1"/>
-          </p:cNvPicPr>
-          <p:nvPr/>
-        </p:nvPicPr>
-        <p:blipFill rotWithShape="1">
-          <a:blip r:embed="rId3" cstate="screen">
-            <a:extLst>
-              <a:ext uri="{28A0092B-C50C-407E-A947-70E740481C1C}">
-                <a14:useLocalDpi xmlns:a14="http://schemas.microsoft.com/office/drawing/2010/main"/>
-              </a:ext>
-            </a:extLst>
-          </a:blip>
-          <a:srcRect l="13265" t="9091" r="3502" b="-1"/>
-          <a:stretch/>
-        </p:blipFill>
-        <p:spPr>
-          <a:xfrm>
-            <a:off x="20" y="10"/>
-            <a:ext cx="12191980" cy="6857990"/>
-          </a:xfrm>
-          <a:prstGeom prst="round2DiagRect">
-            <a:avLst>
-              <a:gd name="adj1" fmla="val 16667"/>
-              <a:gd name="adj2" fmla="val 0"/>
-            </a:avLst>
-          </a:prstGeom>
-          <a:ln w="88900" cap="sq">
-            <a:solidFill>
-              <a:srgbClr val="FFFFFF"/>
-            </a:solidFill>
-            <a:miter lim="800000"/>
-          </a:ln>
-          <a:effectLst>
-            <a:outerShdw blurRad="254000" algn="tl" rotWithShape="0">
-              <a:srgbClr val="000000">
-                <a:alpha val="43000"/>
-              </a:srgbClr>
-            </a:outerShdw>
-          </a:effectLst>
-        </p:spPr>
-      </p:pic>
       <p:grpSp>
         <p:nvGrpSpPr>
           <p:cNvPr id="17" name="Grupo 16">
@@ -8092,62 +5255,6 @@
       </p:sp>
       <p:sp>
         <p:nvSpPr>
-          <p:cNvPr id="2" name="Título 1">
-            <a:extLst>
-              <a:ext uri="{FF2B5EF4-FFF2-40B4-BE49-F238E27FC236}">
-                <a16:creationId xmlns:a16="http://schemas.microsoft.com/office/drawing/2014/main" id="{C02C5318-1A1E-49D0-B2E2-A4B0FA9E8A40}"/>
-              </a:ext>
-            </a:extLst>
-          </p:cNvPr>
-          <p:cNvSpPr>
-            <a:spLocks noGrp="1"/>
-          </p:cNvSpPr>
-          <p:nvPr>
-            <p:ph type="ctrTitle"/>
-          </p:nvPr>
-        </p:nvSpPr>
-        <p:spPr>
-          <a:xfrm>
-            <a:off x="581191" y="4572000"/>
-            <a:ext cx="10993549" cy="895244"/>
-          </a:xfrm>
-        </p:spPr>
-        <p:txBody>
-          <a:bodyPr rtlCol="0">
-            <a:noAutofit/>
-          </a:bodyPr>
-          <a:lstStyle/>
-          <a:p>
-            <a:pPr rtl="0"/>
-            <a:r>
-              <a:rPr lang="es-ES" sz="4500" dirty="0">
-                <a:solidFill>
-                  <a:schemeClr val="bg1"/>
-                </a:solidFill>
-              </a:rPr>
-              <a:t>Diseño </a:t>
-            </a:r>
-            <a:r>
-              <a:rPr lang="es-ES" sz="4800" dirty="0">
-                <a:solidFill>
-                  <a:schemeClr val="bg1"/>
-                </a:solidFill>
-              </a:rPr>
-              <a:t>Dividendo</a:t>
-            </a:r>
-            <a:r>
-              <a:rPr lang="es-ES" sz="4500" dirty="0">
-                <a:solidFill>
-                  <a:schemeClr val="bg1"/>
-                </a:solidFill>
-              </a:rPr>
-              <a:t> para tecnología</a:t>
-            </a:r>
-          </a:p>
-        </p:txBody>
-      </p:sp>
-      <p:sp>
-        <p:nvSpPr>
           <p:cNvPr id="3" name="Subtítulo 2">
             <a:extLst>
               <a:ext uri="{FF2B5EF4-FFF2-40B4-BE49-F238E27FC236}">
@@ -8164,8 +5271,8 @@
         </p:nvSpPr>
         <p:spPr>
           <a:xfrm>
-            <a:off x="581194" y="5467246"/>
-            <a:ext cx="10993546" cy="484822"/>
+            <a:off x="581194" y="4536224"/>
+            <a:ext cx="6194360" cy="1854340"/>
           </a:xfrm>
         </p:spPr>
         <p:txBody>
@@ -8175,9 +5282,124 @@
           <a:lstStyle/>
           <a:p>
             <a:pPr rtl="0"/>
-            <a:endParaRPr lang="es-ES">
+            <a:r>
+              <a:rPr lang="es-ES" dirty="0">
+                <a:solidFill>
+                  <a:schemeClr val="bg1"/>
+                </a:solidFill>
+              </a:rPr>
+              <a:t>Alumno: Emilio Vitali Padilla Socconini</a:t>
+            </a:r>
+          </a:p>
+          <a:p>
+            <a:r>
+              <a:rPr lang="es-MX" dirty="0">
+                <a:solidFill>
+                  <a:schemeClr val="bg1"/>
+                </a:solidFill>
+              </a:rPr>
+              <a:t>Director: Dra. Eunice Ponce de León Sentí</a:t>
+            </a:r>
+            <a:endParaRPr lang="es-ES" dirty="0">
               <a:solidFill>
-                <a:srgbClr val="7CEBFF"/>
+                <a:schemeClr val="bg1"/>
+              </a:solidFill>
+            </a:endParaRPr>
+          </a:p>
+        </p:txBody>
+      </p:sp>
+      <p:sp>
+        <p:nvSpPr>
+          <p:cNvPr id="4" name="CuadroTexto 3">
+            <a:extLst>
+              <a:ext uri="{FF2B5EF4-FFF2-40B4-BE49-F238E27FC236}">
+                <a16:creationId xmlns:a16="http://schemas.microsoft.com/office/drawing/2014/main" id="{E1102C60-3014-424D-8D1E-1B91FBF8DD6E}"/>
+              </a:ext>
+            </a:extLst>
+          </p:cNvPr>
+          <p:cNvSpPr txBox="1"/>
+          <p:nvPr/>
+        </p:nvSpPr>
+        <p:spPr>
+          <a:xfrm>
+            <a:off x="9554937" y="4536224"/>
+            <a:ext cx="3201324" cy="369332"/>
+          </a:xfrm>
+          <a:prstGeom prst="rect">
+            <a:avLst/>
+          </a:prstGeom>
+          <a:noFill/>
+        </p:spPr>
+        <p:txBody>
+          <a:bodyPr wrap="square" rtlCol="0">
+            <a:spAutoFit/>
+          </a:bodyPr>
+          <a:lstStyle/>
+          <a:p>
+            <a:r>
+              <a:rPr lang="es-MX" dirty="0">
+                <a:solidFill>
+                  <a:schemeClr val="bg1"/>
+                </a:solidFill>
+              </a:rPr>
+              <a:t>16 de Abril de 2020</a:t>
+            </a:r>
+          </a:p>
+        </p:txBody>
+      </p:sp>
+      <p:sp>
+        <p:nvSpPr>
+          <p:cNvPr id="6" name="Rectángulo: esquinas diagonales cortadas 5">
+            <a:extLst>
+              <a:ext uri="{FF2B5EF4-FFF2-40B4-BE49-F238E27FC236}">
+                <a16:creationId xmlns:a16="http://schemas.microsoft.com/office/drawing/2014/main" id="{4CCFD8AE-D5AF-4896-B9C5-926109B712F4}"/>
+              </a:ext>
+            </a:extLst>
+          </p:cNvPr>
+          <p:cNvSpPr/>
+          <p:nvPr/>
+        </p:nvSpPr>
+        <p:spPr>
+          <a:xfrm>
+            <a:off x="446533" y="1005840"/>
+            <a:ext cx="11260667" cy="3026514"/>
+          </a:xfrm>
+          <a:prstGeom prst="snip2DiagRect">
+            <a:avLst/>
+          </a:prstGeom>
+        </p:spPr>
+        <p:style>
+          <a:lnRef idx="2">
+            <a:schemeClr val="accent1">
+              <a:shade val="50000"/>
+            </a:schemeClr>
+          </a:lnRef>
+          <a:fillRef idx="1">
+            <a:schemeClr val="accent1"/>
+          </a:fillRef>
+          <a:effectRef idx="0">
+            <a:schemeClr val="accent1"/>
+          </a:effectRef>
+          <a:fontRef idx="minor">
+            <a:schemeClr val="lt1"/>
+          </a:fontRef>
+        </p:style>
+        <p:txBody>
+          <a:bodyPr rtlCol="0" anchor="ctr"/>
+          <a:lstStyle/>
+          <a:p>
+            <a:pPr algn="ctr"/>
+            <a:r>
+              <a:rPr lang="es-MX" sz="4400" b="1" dirty="0">
+                <a:solidFill>
+                  <a:schemeClr val="bg1"/>
+                </a:solidFill>
+              </a:rPr>
+              <a:t>Algoritmo para el cálculo de distancias entre arboles filogenéticos, un enfoque con los mejores aciertos bidireccionales.</a:t>
+            </a:r>
+            <a:endParaRPr lang="es-MX" sz="4400" dirty="0">
+              <a:solidFill>
+                <a:schemeClr val="bg1"/>
               </a:solidFill>
             </a:endParaRPr>
           </a:p>
@@ -8370,42 +5592,62 @@
                   <a:srgbClr val="FFFEFF"/>
                 </a:solidFill>
               </a:rPr>
-              <a:t>Requisitos de tecnología</a:t>
-            </a:r>
-          </a:p>
-        </p:txBody>
-      </p:sp>
-      <p:graphicFrame>
-        <p:nvGraphicFramePr>
-          <p:cNvPr id="4" name="Marcador de posición de contenido 3" descr="Gráfico de SmartArt, icono">
+              <a:t>Planteamiento del problema de investigación</a:t>
+            </a:r>
+          </a:p>
+        </p:txBody>
+      </p:sp>
+      <p:sp>
+        <p:nvSpPr>
+          <p:cNvPr id="6" name="CuadroTexto 5">
             <a:extLst>
               <a:ext uri="{FF2B5EF4-FFF2-40B4-BE49-F238E27FC236}">
-                <a16:creationId xmlns:a16="http://schemas.microsoft.com/office/drawing/2014/main" id="{81E592E1-99DF-4294-A2E9-EF46299BD3F4}"/>
+                <a16:creationId xmlns:a16="http://schemas.microsoft.com/office/drawing/2014/main" id="{7FEA9528-9856-4AA9-8901-D657431FB483}"/>
               </a:ext>
             </a:extLst>
           </p:cNvPr>
-          <p:cNvGraphicFramePr>
-            <a:graphicFrameLocks noGrp="1"/>
-          </p:cNvGraphicFramePr>
-          <p:nvPr>
-            <p:ph idx="1"/>
-            <p:extLst>
-              <p:ext uri="{D42A27DB-BD31-4B8C-83A1-F6EECF244321}">
-                <p14:modId xmlns:p14="http://schemas.microsoft.com/office/powerpoint/2010/main" val="731982156"/>
-              </p:ext>
-            </p:extLst>
-          </p:nvPr>
-        </p:nvGraphicFramePr>
-        <p:xfrm>
-          <a:off x="642938" y="858445"/>
-          <a:ext cx="10906125" cy="3961205"/>
-        </p:xfrm>
-        <a:graphic>
-          <a:graphicData uri="http://schemas.openxmlformats.org/drawingml/2006/diagram">
-            <dgm:relIds xmlns:dgm="http://schemas.openxmlformats.org/drawingml/2006/diagram" xmlns:r="http://schemas.openxmlformats.org/officeDocument/2006/relationships" r:dm="rId3" r:lo="rId4" r:qs="rId5" r:cs="rId6"/>
-          </a:graphicData>
-        </a:graphic>
-      </p:graphicFrame>
+          <p:cNvSpPr txBox="1"/>
+          <p:nvPr/>
+        </p:nvSpPr>
+        <p:spPr>
+          <a:xfrm>
+            <a:off x="730528" y="1315849"/>
+            <a:ext cx="10725437" cy="3046988"/>
+          </a:xfrm>
+          <a:prstGeom prst="rect">
+            <a:avLst/>
+          </a:prstGeom>
+          <a:noFill/>
+        </p:spPr>
+        <p:txBody>
+          <a:bodyPr wrap="square" rtlCol="0">
+            <a:spAutoFit/>
+          </a:bodyPr>
+          <a:lstStyle/>
+          <a:p>
+            <a:r>
+              <a:rPr lang="es-MX" sz="3200" dirty="0"/>
+              <a:t>Consiste en analizar una sucesión de árboles filogenomicos construidos a partir del e-</a:t>
+            </a:r>
+            <a:r>
+              <a:rPr lang="es-MX" sz="3200" dirty="0" err="1"/>
+              <a:t>value</a:t>
+            </a:r>
+            <a:r>
+              <a:rPr lang="es-MX" sz="3200" dirty="0"/>
+              <a:t> del software </a:t>
+            </a:r>
+            <a:r>
+              <a:rPr lang="es-MX" sz="3200" dirty="0" err="1"/>
+              <a:t>blast</a:t>
+            </a:r>
+            <a:r>
+              <a:rPr lang="es-MX" sz="3200" dirty="0"/>
+              <a:t> referente a la exigencia de calidad de los mejores aciertos bidireccionales entre parejas de proteínas de organismos en estudio, mediante la implementación de una distancia entre árboles que nos permita hallar un árbol limite.</a:t>
+            </a:r>
+          </a:p>
+        </p:txBody>
+      </p:sp>
     </p:spTree>
     <p:extLst>
       <p:ext uri="{BB962C8B-B14F-4D97-AF65-F5344CB8AC3E}">
@@ -8467,77 +5709,307 @@
           <a:p>
             <a:pPr rtl="0"/>
             <a:r>
-              <a:rPr lang="es-ES"/>
-              <a:t>Panorama competitivo</a:t>
-            </a:r>
-          </a:p>
-        </p:txBody>
-      </p:sp>
-      <p:pic>
-        <p:nvPicPr>
-          <p:cNvPr id="11" name="Marcador de posición de contenido 4" descr="Gráficos">
+              <a:rPr lang="es-ES" dirty="0"/>
+              <a:t>Objetivos</a:t>
+            </a:r>
+          </a:p>
+        </p:txBody>
+      </p:sp>
+      <p:sp>
+        <p:nvSpPr>
+          <p:cNvPr id="7" name="Rectángulo 6">
             <a:extLst>
               <a:ext uri="{FF2B5EF4-FFF2-40B4-BE49-F238E27FC236}">
-                <a16:creationId xmlns:a16="http://schemas.microsoft.com/office/drawing/2014/main" id="{47D9BE16-119C-43B2-9AE6-18C4A150C0EF}"/>
+                <a16:creationId xmlns:a16="http://schemas.microsoft.com/office/drawing/2014/main" id="{89597A2D-CCA7-48B6-9C74-422508439B0B}"/>
               </a:ext>
             </a:extLst>
           </p:cNvPr>
-          <p:cNvPicPr>
-            <a:picLocks noGrp="1" noChangeAspect="1"/>
-          </p:cNvPicPr>
-          <p:nvPr>
-            <p:ph sz="half" idx="1"/>
-          </p:nvPr>
-        </p:nvPicPr>
-        <p:blipFill rotWithShape="1">
-          <a:blip r:embed="rId3" cstate="screen">
-            <a:extLst>
-              <a:ext uri="{28A0092B-C50C-407E-A947-70E740481C1C}">
-                <a14:useLocalDpi xmlns:a14="http://schemas.microsoft.com/office/drawing/2010/main"/>
-              </a:ext>
-            </a:extLst>
-          </a:blip>
-          <a:stretch/>
-        </p:blipFill>
+          <p:cNvSpPr/>
+          <p:nvPr/>
+        </p:nvSpPr>
         <p:spPr>
           <a:xfrm>
-            <a:off x="581025" y="2231480"/>
-            <a:ext cx="5422900" cy="3625353"/>
-          </a:xfrm>
-        </p:spPr>
-      </p:pic>
-      <p:pic>
-        <p:nvPicPr>
-          <p:cNvPr id="18" name="Marcador de contenido 17">
-            <a:extLst>
-              <a:ext uri="{FF2B5EF4-FFF2-40B4-BE49-F238E27FC236}">
-                <a16:creationId xmlns:a16="http://schemas.microsoft.com/office/drawing/2014/main" id="{BFEA8EC1-23A4-4843-A9C3-AE771D73392A}"/>
-              </a:ext>
-            </a:extLst>
-          </p:cNvPr>
-          <p:cNvPicPr>
-            <a:picLocks noGrp="1" noChangeAspect="1"/>
-          </p:cNvPicPr>
-          <p:nvPr>
-            <p:ph sz="half" idx="2"/>
-          </p:nvPr>
-        </p:nvPicPr>
-        <p:blipFill>
-          <a:blip r:embed="rId4"/>
-          <a:stretch>
-            <a:fillRect/>
-          </a:stretch>
-        </p:blipFill>
-        <p:spPr>
-          <a:xfrm>
-            <a:off x="6201812" y="2571845"/>
-            <a:ext cx="5395426" cy="2944623"/>
+            <a:off x="928914" y="1959427"/>
+            <a:ext cx="10334172" cy="4789003"/>
           </a:xfrm>
           <a:prstGeom prst="rect">
             <a:avLst/>
           </a:prstGeom>
         </p:spPr>
-      </p:pic>
+        <p:txBody>
+          <a:bodyPr wrap="square">
+            <a:spAutoFit/>
+          </a:bodyPr>
+          <a:lstStyle/>
+          <a:p>
+            <a:pPr marL="6350" marR="35560" indent="-6350" algn="just">
+              <a:lnSpc>
+                <a:spcPct val="103000"/>
+              </a:lnSpc>
+              <a:spcBef>
+                <a:spcPts val="200"/>
+              </a:spcBef>
+              <a:spcAft>
+                <a:spcPts val="0"/>
+              </a:spcAft>
+            </a:pPr>
+            <a:r>
+              <a:rPr lang="es-MX" sz="2400" b="1" dirty="0">
+                <a:solidFill>
+                  <a:srgbClr val="2F5496"/>
+                </a:solidFill>
+                <a:latin typeface="Calibri Light" panose="020F0302020204030204" pitchFamily="34" charset="0"/>
+                <a:ea typeface="Times New Roman" panose="02020603050405020304" pitchFamily="18" charset="0"/>
+                <a:cs typeface="Times New Roman" panose="02020603050405020304" pitchFamily="18" charset="0"/>
+              </a:rPr>
+              <a:t>	</a:t>
+            </a:r>
+            <a:r>
+              <a:rPr lang="es-MX" sz="2800" b="1" dirty="0">
+                <a:solidFill>
+                  <a:srgbClr val="2F5496"/>
+                </a:solidFill>
+                <a:latin typeface="Calibri Light" panose="020F0302020204030204" pitchFamily="34" charset="0"/>
+                <a:ea typeface="Times New Roman" panose="02020603050405020304" pitchFamily="18" charset="0"/>
+                <a:cs typeface="Times New Roman" panose="02020603050405020304" pitchFamily="18" charset="0"/>
+              </a:rPr>
+              <a:t>Objetivo General</a:t>
+            </a:r>
+          </a:p>
+          <a:p>
+            <a:pPr marL="285750" marR="35560" indent="-285750" algn="just">
+              <a:lnSpc>
+                <a:spcPct val="103000"/>
+              </a:lnSpc>
+              <a:spcAft>
+                <a:spcPts val="830"/>
+              </a:spcAft>
+              <a:buFont typeface="Wingdings" panose="05000000000000000000" pitchFamily="2" charset="2"/>
+              <a:buChar char="Ø"/>
+            </a:pPr>
+            <a:r>
+              <a:rPr lang="es-MX" sz="2000" dirty="0">
+                <a:solidFill>
+                  <a:srgbClr val="000000"/>
+                </a:solidFill>
+                <a:latin typeface="Calibri" panose="020F0502020204030204" pitchFamily="34" charset="0"/>
+                <a:ea typeface="Calibri" panose="020F0502020204030204" pitchFamily="34" charset="0"/>
+              </a:rPr>
+              <a:t>Analizar una sucesión de árboles filogenomicos construida a través de los e-</a:t>
+            </a:r>
+            <a:r>
+              <a:rPr lang="es-MX" sz="2000" dirty="0" err="1">
+                <a:solidFill>
+                  <a:srgbClr val="000000"/>
+                </a:solidFill>
+                <a:latin typeface="Calibri" panose="020F0502020204030204" pitchFamily="34" charset="0"/>
+                <a:ea typeface="Calibri" panose="020F0502020204030204" pitchFamily="34" charset="0"/>
+              </a:rPr>
+              <a:t>values</a:t>
+            </a:r>
+            <a:r>
+              <a:rPr lang="es-MX" sz="2000" dirty="0">
+                <a:solidFill>
+                  <a:srgbClr val="000000"/>
+                </a:solidFill>
+                <a:latin typeface="Calibri" panose="020F0502020204030204" pitchFamily="34" charset="0"/>
+                <a:ea typeface="Calibri" panose="020F0502020204030204" pitchFamily="34" charset="0"/>
+              </a:rPr>
+              <a:t> del programa </a:t>
+            </a:r>
+            <a:r>
+              <a:rPr lang="es-MX" sz="2000" dirty="0" err="1">
+                <a:solidFill>
+                  <a:srgbClr val="000000"/>
+                </a:solidFill>
+                <a:latin typeface="Calibri" panose="020F0502020204030204" pitchFamily="34" charset="0"/>
+                <a:ea typeface="Calibri" panose="020F0502020204030204" pitchFamily="34" charset="0"/>
+              </a:rPr>
+              <a:t>blast</a:t>
+            </a:r>
+            <a:r>
+              <a:rPr lang="es-MX" sz="2000" dirty="0">
+                <a:solidFill>
+                  <a:srgbClr val="000000"/>
+                </a:solidFill>
+                <a:latin typeface="Calibri" panose="020F0502020204030204" pitchFamily="34" charset="0"/>
+                <a:ea typeface="Calibri" panose="020F0502020204030204" pitchFamily="34" charset="0"/>
+              </a:rPr>
+              <a:t> utilizando una distancia del tipo diferencia simétrica que nos permita definir en esa sucesión un árbol límite. </a:t>
+            </a:r>
+          </a:p>
+          <a:p>
+            <a:pPr marL="6350" marR="35560" indent="-6350" algn="just">
+              <a:lnSpc>
+                <a:spcPct val="103000"/>
+              </a:lnSpc>
+              <a:spcBef>
+                <a:spcPts val="200"/>
+              </a:spcBef>
+              <a:spcAft>
+                <a:spcPts val="0"/>
+              </a:spcAft>
+            </a:pPr>
+            <a:r>
+              <a:rPr lang="es-MX" sz="2800" b="1" dirty="0">
+                <a:solidFill>
+                  <a:srgbClr val="2F5496"/>
+                </a:solidFill>
+                <a:latin typeface="Calibri Light" panose="020F0302020204030204" pitchFamily="34" charset="0"/>
+                <a:ea typeface="Times New Roman" panose="02020603050405020304" pitchFamily="18" charset="0"/>
+                <a:cs typeface="Times New Roman" panose="02020603050405020304" pitchFamily="18" charset="0"/>
+              </a:rPr>
+              <a:t>Objetivos específicos</a:t>
+            </a:r>
+          </a:p>
+          <a:p>
+            <a:pPr marL="285750" marR="35560" indent="-285750" algn="just">
+              <a:lnSpc>
+                <a:spcPct val="103000"/>
+              </a:lnSpc>
+              <a:spcAft>
+                <a:spcPts val="830"/>
+              </a:spcAft>
+              <a:buFont typeface="Wingdings" panose="05000000000000000000" pitchFamily="2" charset="2"/>
+              <a:buChar char="Ø"/>
+            </a:pPr>
+            <a:r>
+              <a:rPr lang="es-MX" sz="2000" dirty="0">
+                <a:solidFill>
+                  <a:srgbClr val="000000"/>
+                </a:solidFill>
+                <a:latin typeface="Calibri" panose="020F0502020204030204" pitchFamily="34" charset="0"/>
+                <a:ea typeface="Calibri" panose="020F0502020204030204" pitchFamily="34" charset="0"/>
+              </a:rPr>
+              <a:t>Seleccionar una distancia del tipo diferencia simétrica adecuada para detectar las diferencias entre árboles.</a:t>
+            </a:r>
+          </a:p>
+          <a:p>
+            <a:pPr marL="285750" marR="35560" indent="-285750" algn="just">
+              <a:lnSpc>
+                <a:spcPct val="103000"/>
+              </a:lnSpc>
+              <a:spcAft>
+                <a:spcPts val="830"/>
+              </a:spcAft>
+              <a:buFont typeface="Wingdings" panose="05000000000000000000" pitchFamily="2" charset="2"/>
+              <a:buChar char="Ø"/>
+            </a:pPr>
+            <a:r>
+              <a:rPr lang="es-MX" sz="2000" dirty="0">
+                <a:solidFill>
+                  <a:srgbClr val="000000"/>
+                </a:solidFill>
+                <a:latin typeface="Calibri" panose="020F0502020204030204" pitchFamily="34" charset="0"/>
+                <a:ea typeface="Calibri" panose="020F0502020204030204" pitchFamily="34" charset="0"/>
+              </a:rPr>
+              <a:t>Implementar un algoritmo que calcule esa distancia entre dos árboles usando el formato </a:t>
+            </a:r>
+            <a:r>
+              <a:rPr lang="es-MX" sz="2000" dirty="0" err="1">
+                <a:solidFill>
+                  <a:srgbClr val="000000"/>
+                </a:solidFill>
+                <a:latin typeface="Calibri" panose="020F0502020204030204" pitchFamily="34" charset="0"/>
+                <a:ea typeface="Calibri" panose="020F0502020204030204" pitchFamily="34" charset="0"/>
+              </a:rPr>
+              <a:t>Newick</a:t>
+            </a:r>
+            <a:r>
+              <a:rPr lang="es-MX" sz="2000" dirty="0">
+                <a:solidFill>
+                  <a:srgbClr val="000000"/>
+                </a:solidFill>
+                <a:latin typeface="Calibri" panose="020F0502020204030204" pitchFamily="34" charset="0"/>
+                <a:ea typeface="Calibri" panose="020F0502020204030204" pitchFamily="34" charset="0"/>
+              </a:rPr>
+              <a:t> para cada par de árboles consecutivos en la sucesión de árboles basada en el e-</a:t>
+            </a:r>
+            <a:r>
+              <a:rPr lang="es-MX" sz="2000" dirty="0" err="1">
+                <a:solidFill>
+                  <a:srgbClr val="000000"/>
+                </a:solidFill>
+                <a:latin typeface="Calibri" panose="020F0502020204030204" pitchFamily="34" charset="0"/>
+                <a:ea typeface="Calibri" panose="020F0502020204030204" pitchFamily="34" charset="0"/>
+              </a:rPr>
+              <a:t>value</a:t>
+            </a:r>
+            <a:r>
+              <a:rPr lang="es-MX" sz="2000" dirty="0">
+                <a:solidFill>
+                  <a:srgbClr val="000000"/>
+                </a:solidFill>
+                <a:latin typeface="Calibri" panose="020F0502020204030204" pitchFamily="34" charset="0"/>
+                <a:ea typeface="Calibri" panose="020F0502020204030204" pitchFamily="34" charset="0"/>
+              </a:rPr>
+              <a:t> de </a:t>
+            </a:r>
+            <a:r>
+              <a:rPr lang="es-MX" sz="2000" dirty="0" err="1">
+                <a:solidFill>
+                  <a:srgbClr val="000000"/>
+                </a:solidFill>
+                <a:latin typeface="Calibri" panose="020F0502020204030204" pitchFamily="34" charset="0"/>
+                <a:ea typeface="Calibri" panose="020F0502020204030204" pitchFamily="34" charset="0"/>
+              </a:rPr>
+              <a:t>blast</a:t>
+            </a:r>
+            <a:r>
+              <a:rPr lang="es-MX" sz="2000" dirty="0">
+                <a:solidFill>
+                  <a:srgbClr val="000000"/>
+                </a:solidFill>
+                <a:latin typeface="Calibri" panose="020F0502020204030204" pitchFamily="34" charset="0"/>
+                <a:ea typeface="Calibri" panose="020F0502020204030204" pitchFamily="34" charset="0"/>
+              </a:rPr>
+              <a:t>.</a:t>
+            </a:r>
+          </a:p>
+          <a:p>
+            <a:pPr marL="285750" marR="35560" indent="-285750" algn="just">
+              <a:lnSpc>
+                <a:spcPct val="103000"/>
+              </a:lnSpc>
+              <a:spcAft>
+                <a:spcPts val="830"/>
+              </a:spcAft>
+              <a:buFont typeface="Wingdings" panose="05000000000000000000" pitchFamily="2" charset="2"/>
+              <a:buChar char="Ø"/>
+            </a:pPr>
+            <a:r>
+              <a:rPr lang="es-MX" sz="2000" dirty="0">
+                <a:solidFill>
+                  <a:srgbClr val="000000"/>
+                </a:solidFill>
+                <a:latin typeface="Calibri" panose="020F0502020204030204" pitchFamily="34" charset="0"/>
+                <a:ea typeface="Calibri" panose="020F0502020204030204" pitchFamily="34" charset="0"/>
+              </a:rPr>
+              <a:t>Encontrar el árbol limite, entendiéndose por aquel que a partir de un e-</a:t>
+            </a:r>
+            <a:r>
+              <a:rPr lang="es-MX" sz="2000" dirty="0" err="1">
+                <a:solidFill>
+                  <a:srgbClr val="000000"/>
+                </a:solidFill>
+                <a:latin typeface="Calibri" panose="020F0502020204030204" pitchFamily="34" charset="0"/>
+                <a:ea typeface="Calibri" panose="020F0502020204030204" pitchFamily="34" charset="0"/>
+              </a:rPr>
+              <a:t>value</a:t>
+            </a:r>
+            <a:r>
+              <a:rPr lang="es-MX" sz="2000" dirty="0">
+                <a:solidFill>
+                  <a:srgbClr val="000000"/>
+                </a:solidFill>
+                <a:latin typeface="Calibri" panose="020F0502020204030204" pitchFamily="34" charset="0"/>
+                <a:ea typeface="Calibri" panose="020F0502020204030204" pitchFamily="34" charset="0"/>
+              </a:rPr>
+              <a:t> de exigencia de los mejores aciertos bidireccionales entre parejas de proteínas de organismos en estudio, la distancia entre árboles cercanos al árbol limite tiende a cero.</a:t>
+            </a:r>
+          </a:p>
+        </p:txBody>
+      </p:sp>
     </p:spTree>
     <p:extLst>
       <p:ext uri="{BB962C8B-B14F-4D97-AF65-F5344CB8AC3E}">
@@ -8589,60 +6061,88 @@
           <a:bodyPr/>
           <a:lstStyle/>
           <a:p>
-            <a:endParaRPr lang="es-MX"/>
-          </a:p>
-        </p:txBody>
-      </p:sp>
-      <p:sp>
-        <p:nvSpPr>
-          <p:cNvPr id="3" name="Marcador de contenido 2">
+            <a:r>
+              <a:rPr lang="es-MX" dirty="0"/>
+              <a:t>Pasos metodológicos de la investigación</a:t>
+            </a:r>
+          </a:p>
+        </p:txBody>
+      </p:sp>
+      <p:sp>
+        <p:nvSpPr>
+          <p:cNvPr id="5" name="AutoShape 2">
             <a:extLst>
               <a:ext uri="{FF2B5EF4-FFF2-40B4-BE49-F238E27FC236}">
-                <a16:creationId xmlns:a16="http://schemas.microsoft.com/office/drawing/2014/main" id="{FC330D5C-7C13-4595-8557-2905BD02926A}"/>
+                <a16:creationId xmlns:a16="http://schemas.microsoft.com/office/drawing/2014/main" id="{F6CF4ED8-3953-4428-BDBE-A69027FFFF9A}"/>
               </a:ext>
             </a:extLst>
           </p:cNvPr>
           <p:cNvSpPr>
-            <a:spLocks noGrp="1"/>
-          </p:cNvSpPr>
-          <p:nvPr>
-            <p:ph sz="half" idx="1"/>
-          </p:nvPr>
-        </p:nvSpPr>
-        <p:spPr/>
-        <p:txBody>
-          <a:bodyPr/>
+            <a:spLocks noChangeAspect="1" noChangeArrowheads="1"/>
+          </p:cNvSpPr>
+          <p:nvPr/>
+        </p:nvSpPr>
+        <p:spPr bwMode="auto">
+          <a:xfrm>
+            <a:off x="5943600" y="3276600"/>
+            <a:ext cx="304800" cy="304800"/>
+          </a:xfrm>
+          <a:prstGeom prst="rect">
+            <a:avLst/>
+          </a:prstGeom>
+          <a:noFill/>
+          <a:extLst>
+            <a:ext uri="{909E8E84-426E-40DD-AFC4-6F175D3DCCD1}">
+              <a14:hiddenFill xmlns:a14="http://schemas.microsoft.com/office/drawing/2010/main">
+                <a:solidFill>
+                  <a:srgbClr val="FFFFFF"/>
+                </a:solidFill>
+              </a14:hiddenFill>
+            </a:ext>
+          </a:extLst>
+        </p:spPr>
+        <p:txBody>
+          <a:bodyPr vert="horz" wrap="square" lIns="91440" tIns="45720" rIns="91440" bIns="45720" numCol="1" anchor="t" anchorCtr="0" compatLnSpc="1">
+            <a:prstTxWarp prst="textNoShape">
+              <a:avLst/>
+            </a:prstTxWarp>
+          </a:bodyPr>
           <a:lstStyle/>
           <a:p>
             <a:endParaRPr lang="es-MX"/>
           </a:p>
         </p:txBody>
       </p:sp>
-      <p:sp>
-        <p:nvSpPr>
-          <p:cNvPr id="4" name="Marcador de contenido 3">
+      <p:pic>
+        <p:nvPicPr>
+          <p:cNvPr id="7" name="Imagen 6" descr="Imagen que contiene texto, pizarrón&#10;&#10;Descripción generada automáticamente">
             <a:extLst>
               <a:ext uri="{FF2B5EF4-FFF2-40B4-BE49-F238E27FC236}">
-                <a16:creationId xmlns:a16="http://schemas.microsoft.com/office/drawing/2014/main" id="{2A9F780E-B872-4C93-B7B3-1B8A52688FFB}"/>
+                <a16:creationId xmlns:a16="http://schemas.microsoft.com/office/drawing/2014/main" id="{C952F92F-12B5-446B-B0A1-6D9B8A631D32}"/>
               </a:ext>
             </a:extLst>
           </p:cNvPr>
-          <p:cNvSpPr>
-            <a:spLocks noGrp="1"/>
-          </p:cNvSpPr>
-          <p:nvPr>
-            <p:ph sz="half" idx="2"/>
-          </p:nvPr>
-        </p:nvSpPr>
-        <p:spPr/>
-        <p:txBody>
-          <a:bodyPr/>
-          <a:lstStyle/>
-          <a:p>
-            <a:endParaRPr lang="es-MX"/>
-          </a:p>
-        </p:txBody>
-      </p:sp>
+          <p:cNvPicPr>
+            <a:picLocks noChangeAspect="1"/>
+          </p:cNvPicPr>
+          <p:nvPr/>
+        </p:nvPicPr>
+        <p:blipFill>
+          <a:blip r:embed="rId2"/>
+          <a:stretch>
+            <a:fillRect/>
+          </a:stretch>
+        </p:blipFill>
+        <p:spPr>
+          <a:xfrm>
+            <a:off x="1175657" y="2008414"/>
+            <a:ext cx="9535886" cy="4419601"/>
+          </a:xfrm>
+          <a:prstGeom prst="rect">
+            <a:avLst/>
+          </a:prstGeom>
+        </p:spPr>
+      </p:pic>
     </p:spTree>
     <p:extLst>
       <p:ext uri="{BB962C8B-B14F-4D97-AF65-F5344CB8AC3E}">
@@ -9077,62 +6577,6 @@
               </a:rPr>
               <a:t>Gracias</a:t>
             </a:r>
-          </a:p>
-        </p:txBody>
-      </p:sp>
-      <p:sp>
-        <p:nvSpPr>
-          <p:cNvPr id="3" name="Subtítulo 2">
-            <a:extLst>
-              <a:ext uri="{FF2B5EF4-FFF2-40B4-BE49-F238E27FC236}">
-                <a16:creationId xmlns:a16="http://schemas.microsoft.com/office/drawing/2014/main" id="{A9CB511D-EA45-4336-847C-1252667143B5}"/>
-              </a:ext>
-            </a:extLst>
-          </p:cNvPr>
-          <p:cNvSpPr>
-            <a:spLocks noGrp="1"/>
-          </p:cNvSpPr>
-          <p:nvPr>
-            <p:ph type="subTitle" idx="1"/>
-          </p:nvPr>
-        </p:nvSpPr>
-        <p:spPr>
-          <a:xfrm>
-            <a:off x="8296275" y="3505095"/>
-            <a:ext cx="3081576" cy="2629006"/>
-          </a:xfrm>
-        </p:spPr>
-        <p:txBody>
-          <a:bodyPr rtlCol="0">
-            <a:normAutofit/>
-          </a:bodyPr>
-          <a:lstStyle/>
-          <a:p>
-            <a:pPr rtl="0"/>
-            <a:r>
-              <a:rPr lang="es-ES">
-                <a:solidFill>
-                  <a:schemeClr val="bg2"/>
-                </a:solidFill>
-              </a:rPr>
-              <a:t>alguien@ejemplo.com</a:t>
-            </a:r>
-          </a:p>
-          <a:p>
-            <a:pPr rtl="0"/>
-            <a:endParaRPr lang="es-ES">
-              <a:solidFill>
-                <a:schemeClr val="bg2"/>
-              </a:solidFill>
-            </a:endParaRPr>
-          </a:p>
-          <a:p>
-            <a:pPr rtl="0"/>
-            <a:endParaRPr lang="es-ES">
-              <a:solidFill>
-                <a:schemeClr val="bg2"/>
-              </a:solidFill>
-            </a:endParaRPr>
           </a:p>
         </p:txBody>
       </p:sp>
@@ -9324,6 +6768,31 @@
           </p:style>
         </p:sp>
       </p:grpSp>
+      <p:sp>
+        <p:nvSpPr>
+          <p:cNvPr id="6" name="Subtítulo 5">
+            <a:extLst>
+              <a:ext uri="{FF2B5EF4-FFF2-40B4-BE49-F238E27FC236}">
+                <a16:creationId xmlns:a16="http://schemas.microsoft.com/office/drawing/2014/main" id="{61B95A3A-6FF1-4B65-9A39-8D0798347C5E}"/>
+              </a:ext>
+            </a:extLst>
+          </p:cNvPr>
+          <p:cNvSpPr>
+            <a:spLocks noGrp="1"/>
+          </p:cNvSpPr>
+          <p:nvPr>
+            <p:ph type="subTitle" idx="1"/>
+          </p:nvPr>
+        </p:nvSpPr>
+        <p:spPr/>
+        <p:txBody>
+          <a:bodyPr/>
+          <a:lstStyle/>
+          <a:p>
+            <a:endParaRPr lang="es-MX"/>
+          </a:p>
+        </p:txBody>
+      </p:sp>
     </p:spTree>
     <p:extLst>
       <p:ext uri="{BB962C8B-B14F-4D97-AF65-F5344CB8AC3E}">
@@ -10197,6 +7666,23 @@
 </file>
 
 <file path=customXml/item1.xml><?xml version="1.0" encoding="utf-8"?>
+<p:properties xmlns:p="http://schemas.microsoft.com/office/2006/metadata/properties" xmlns:xsi="http://www.w3.org/2001/XMLSchema-instance" xmlns:pc="http://schemas.microsoft.com/office/infopath/2007/PartnerControls">
+  <documentManagement>
+    <MediaServiceKeyPoints xmlns="71af3243-3dd4-4a8d-8c0d-dd76da1f02a5" xsi:nil="true"/>
+  </documentManagement>
+</p:properties>
+</file>
+
+<file path=customXml/item2.xml><?xml version="1.0" encoding="utf-8"?>
+<?mso-contentType ?>
+<FormTemplates xmlns="http://schemas.microsoft.com/sharepoint/v3/contenttype/forms">
+  <Display>DocumentLibraryForm</Display>
+  <Edit>DocumentLibraryForm</Edit>
+  <New>DocumentLibraryForm</New>
+</FormTemplates>
+</file>
+
+<file path=customXml/item3.xml><?xml version="1.0" encoding="utf-8"?>
 <ct:contentTypeSchema xmlns:ct="http://schemas.microsoft.com/office/2006/metadata/contentType" xmlns:ma="http://schemas.microsoft.com/office/2006/metadata/properties/metaAttributes" ct:_="" ma:_="" ma:contentTypeName="Document" ma:contentTypeID="0x01010079F111ED35F8CC479449609E8A0923A6" ma:contentTypeVersion="11" ma:contentTypeDescription="Create a new document." ma:contentTypeScope="" ma:versionID="1c2eb7a32e66fb6e4260f3771546a5e2">
   <xsd:schema xmlns:xsd="http://www.w3.org/2001/XMLSchema" xmlns:xs="http://www.w3.org/2001/XMLSchema" xmlns:p="http://schemas.microsoft.com/office/2006/metadata/properties" xmlns:ns2="71af3243-3dd4-4a8d-8c0d-dd76da1f02a5" xmlns:ns3="16c05727-aa75-4e4a-9b5f-8a80a1165891" targetNamespace="http://schemas.microsoft.com/office/2006/metadata/properties" ma:root="true" ma:fieldsID="04e1f6479c48b08974ba73b5ca973489" ns2:_="" ns3:_="">
     <xsd:import namespace="71af3243-3dd4-4a8d-8c0d-dd76da1f02a5"/>
@@ -10407,24 +7893,25 @@
 </ct:contentTypeSchema>
 </file>
 
-<file path=customXml/item2.xml><?xml version="1.0" encoding="utf-8"?>
-<?mso-contentType ?>
-<FormTemplates xmlns="http://schemas.microsoft.com/sharepoint/v3/contenttype/forms">
-  <Display>DocumentLibraryForm</Display>
-  <Edit>DocumentLibraryForm</Edit>
-  <New>DocumentLibraryForm</New>
-</FormTemplates>
+<file path=customXml/itemProps1.xml><?xml version="1.0" encoding="utf-8"?>
+<ds:datastoreItem xmlns:ds="http://schemas.openxmlformats.org/officeDocument/2006/customXml" ds:itemID="{1EBC12AA-1C15-4500-BC9C-8EE83A441DE9}">
+  <ds:schemaRefs>
+    <ds:schemaRef ds:uri="http://schemas.microsoft.com/office/2006/metadata/properties"/>
+    <ds:schemaRef ds:uri="http://schemas.microsoft.com/office/infopath/2007/PartnerControls"/>
+    <ds:schemaRef ds:uri="71af3243-3dd4-4a8d-8c0d-dd76da1f02a5"/>
+  </ds:schemaRefs>
+</ds:datastoreItem>
 </file>
 
-<file path=customXml/item3.xml><?xml version="1.0" encoding="utf-8"?>
-<p:properties xmlns:p="http://schemas.microsoft.com/office/2006/metadata/properties" xmlns:xsi="http://www.w3.org/2001/XMLSchema-instance" xmlns:pc="http://schemas.microsoft.com/office/infopath/2007/PartnerControls">
-  <documentManagement>
-    <MediaServiceKeyPoints xmlns="71af3243-3dd4-4a8d-8c0d-dd76da1f02a5" xsi:nil="true"/>
-  </documentManagement>
-</p:properties>
+<file path=customXml/itemProps2.xml><?xml version="1.0" encoding="utf-8"?>
+<ds:datastoreItem xmlns:ds="http://schemas.openxmlformats.org/officeDocument/2006/customXml" ds:itemID="{BA0CF3B2-1F0F-4FC5-8002-3E4869ABAD55}">
+  <ds:schemaRefs>
+    <ds:schemaRef ds:uri="http://schemas.microsoft.com/sharepoint/v3/contenttype/forms"/>
+  </ds:schemaRefs>
+</ds:datastoreItem>
 </file>
 
-<file path=customXml/itemProps1.xml><?xml version="1.0" encoding="utf-8"?>
+<file path=customXml/itemProps3.xml><?xml version="1.0" encoding="utf-8"?>
 <ds:datastoreItem xmlns:ds="http://schemas.openxmlformats.org/officeDocument/2006/customXml" ds:itemID="{1F69AFF4-BB30-4BA0-AD22-82CC3C43276B}">
   <ds:schemaRefs>
     <ds:schemaRef ds:uri="http://schemas.microsoft.com/office/2006/metadata/contentType"/>
@@ -10441,22 +7928,4 @@
     <ds:schemaRef ds:uri="http://schemas.microsoft.com/internal/obd"/>
   </ds:schemaRefs>
 </ds:datastoreItem>
-</file>
-
-<file path=customXml/itemProps2.xml><?xml version="1.0" encoding="utf-8"?>
-<ds:datastoreItem xmlns:ds="http://schemas.openxmlformats.org/officeDocument/2006/customXml" ds:itemID="{BA0CF3B2-1F0F-4FC5-8002-3E4869ABAD55}">
-  <ds:schemaRefs>
-    <ds:schemaRef ds:uri="http://schemas.microsoft.com/sharepoint/v3/contenttype/forms"/>
-  </ds:schemaRefs>
-</ds:datastoreItem>
-</file>
-
-<file path=customXml/itemProps3.xml><?xml version="1.0" encoding="utf-8"?>
-<ds:datastoreItem xmlns:ds="http://schemas.openxmlformats.org/officeDocument/2006/customXml" ds:itemID="{1EBC12AA-1C15-4500-BC9C-8EE83A441DE9}">
-  <ds:schemaRefs>
-    <ds:schemaRef ds:uri="http://schemas.microsoft.com/office/2006/metadata/properties"/>
-    <ds:schemaRef ds:uri="http://schemas.microsoft.com/office/infopath/2007/PartnerControls"/>
-    <ds:schemaRef ds:uri="71af3243-3dd4-4a8d-8c0d-dd76da1f02a5"/>
-  </ds:schemaRefs>
-</ds:datastoreItem>
 </file>
</xml_diff>

<commit_message>
Se añadieron datos a la presentación
</commit_message>
<xml_diff>
--- a/DocumentosTesina/Presentación.pptx
+++ b/DocumentosTesina/Presentación.pptx
@@ -5,10 +5,10 @@
     <p:sldMasterId id="2147483672" r:id="rId4"/>
   </p:sldMasterIdLst>
   <p:notesMasterIdLst>
-    <p:notesMasterId r:id="rId12"/>
+    <p:notesMasterId r:id="rId15"/>
   </p:notesMasterIdLst>
   <p:handoutMasterIdLst>
-    <p:handoutMasterId r:id="rId13"/>
+    <p:handoutMasterId r:id="rId16"/>
   </p:handoutMasterIdLst>
   <p:sldIdLst>
     <p:sldId id="256" r:id="rId5"/>
@@ -16,8 +16,11 @@
     <p:sldId id="258" r:id="rId7"/>
     <p:sldId id="262" r:id="rId8"/>
     <p:sldId id="264" r:id="rId9"/>
-    <p:sldId id="263" r:id="rId10"/>
-    <p:sldId id="260" r:id="rId11"/>
+    <p:sldId id="265" r:id="rId10"/>
+    <p:sldId id="266" r:id="rId11"/>
+    <p:sldId id="267" r:id="rId12"/>
+    <p:sldId id="263" r:id="rId13"/>
+    <p:sldId id="260" r:id="rId14"/>
   </p:sldIdLst>
   <p:sldSz cx="12192000" cy="6858000"/>
   <p:notesSz cx="6858000" cy="9144000"/>
@@ -129,7 +132,7 @@
 
 <file path=ppt/commentAuthors.xml><?xml version="1.0" encoding="utf-8"?>
 <p:cmAuthorLst xmlns:a="http://schemas.openxmlformats.org/drawingml/2006/main" xmlns:r="http://schemas.openxmlformats.org/officeDocument/2006/relationships" xmlns:p="http://schemas.openxmlformats.org/presentationml/2006/main">
-  <p:cmAuthor id="2" name="Autor" initials="A" lastIdx="9" clrIdx="1"/>
+  <p:cmAuthor id="2" name="Autor" initials="A" lastIdx="11" clrIdx="1"/>
 </p:cmAuthorLst>
 </file>
 
@@ -169,6 +172,15 @@
       </p:ext>
     </p:extLst>
   </p:cm>
+  <p:cm authorId="2" dt="2020-04-16T17:47:15.426" idx="10">
+    <p:pos x="146" y="146"/>
+    <p:text/>
+    <p:extLst>
+      <p:ext uri="{C676402C-5697-4E1C-873F-D02D1690AC5C}">
+        <p15:threadingInfo xmlns:p15="http://schemas.microsoft.com/office/powerpoint/2012/main" timeZoneBias="300"/>
+      </p:ext>
+    </p:extLst>
+  </p:cm>
 </p:cmLst>
 </file>
 
@@ -201,7 +213,16 @@
   <p:cm authorId="2" dt="2020-04-16T16:34:44.842" idx="4">
     <p:pos x="10" y="10"/>
     <p:text>Diapositiva #4
-Pasos metodológicos de la investigación: utilice para explicar un diagrama, ubique en qué paso metodológico</p:text>
+Pasos metodológicos de la investigación: utilice para explicar un diagrama, ubique en qué paso metodológico se encuentra.</p:text>
+    <p:extLst>
+      <p:ext uri="{C676402C-5697-4E1C-873F-D02D1690AC5C}">
+        <p15:threadingInfo xmlns:p15="http://schemas.microsoft.com/office/powerpoint/2012/main" timeZoneBias="300"/>
+      </p:ext>
+    </p:extLst>
+  </p:cm>
+  <p:cm authorId="2" dt="2020-04-16T18:18:40.731" idx="11">
+    <p:pos x="146" y="146"/>
+    <p:text>Agregar diagrama</p:text>
     <p:extLst>
       <p:ext uri="{C676402C-5697-4E1C-873F-D02D1690AC5C}">
         <p15:threadingInfo xmlns:p15="http://schemas.microsoft.com/office/powerpoint/2012/main" timeZoneBias="300"/>
@@ -1109,7 +1130,7 @@
           <a:p>
             <a:fld id="{5B6CC092-CABA-48D0-B3F7-B535EA5228F9}" type="slidenum">
               <a:rPr lang="es-ES" smtClean="0"/>
-              <a:t>7</a:t>
+              <a:t>10</a:t>
             </a:fld>
             <a:endParaRPr lang="es-ES"/>
           </a:p>
@@ -5271,8 +5292,8 @@
         </p:nvSpPr>
         <p:spPr>
           <a:xfrm>
-            <a:off x="581194" y="4536224"/>
-            <a:ext cx="6194360" cy="1854340"/>
+            <a:off x="804713" y="4952630"/>
+            <a:ext cx="4725097" cy="783921"/>
           </a:xfrm>
         </p:spPr>
         <p:txBody>
@@ -5322,7 +5343,7 @@
         </p:nvSpPr>
         <p:spPr>
           <a:xfrm>
-            <a:off x="9554937" y="4536224"/>
+            <a:off x="9554356" y="6021232"/>
             <a:ext cx="3201324" cy="369332"/>
           </a:xfrm>
           <a:prstGeom prst="rect">
@@ -5405,6 +5426,117 @@
           </a:p>
         </p:txBody>
       </p:sp>
+      <p:sp>
+        <p:nvSpPr>
+          <p:cNvPr id="2" name="CuadroTexto 1">
+            <a:extLst>
+              <a:ext uri="{FF2B5EF4-FFF2-40B4-BE49-F238E27FC236}">
+                <a16:creationId xmlns:a16="http://schemas.microsoft.com/office/drawing/2014/main" id="{3266DBBF-4A5D-4F26-BBC3-400295B5082E}"/>
+              </a:ext>
+            </a:extLst>
+          </p:cNvPr>
+          <p:cNvSpPr txBox="1"/>
+          <p:nvPr/>
+        </p:nvSpPr>
+        <p:spPr>
+          <a:xfrm>
+            <a:off x="6093490" y="4744427"/>
+            <a:ext cx="4725097" cy="1200329"/>
+          </a:xfrm>
+          <a:prstGeom prst="rect">
+            <a:avLst/>
+          </a:prstGeom>
+          <a:noFill/>
+        </p:spPr>
+        <p:txBody>
+          <a:bodyPr wrap="square" rtlCol="0">
+            <a:spAutoFit/>
+          </a:bodyPr>
+          <a:lstStyle/>
+          <a:p>
+            <a:r>
+              <a:rPr lang="es-MX" dirty="0">
+                <a:solidFill>
+                  <a:schemeClr val="bg1">
+                    <a:lumMod val="95000"/>
+                  </a:schemeClr>
+                </a:solidFill>
+              </a:rPr>
+              <a:t>Comité </a:t>
+            </a:r>
+            <a:r>
+              <a:rPr lang="es-MX" dirty="0" err="1">
+                <a:solidFill>
+                  <a:schemeClr val="bg1">
+                    <a:lumMod val="95000"/>
+                  </a:schemeClr>
+                </a:solidFill>
+              </a:rPr>
+              <a:t>tutoral</a:t>
+            </a:r>
+            <a:r>
+              <a:rPr lang="es-MX" dirty="0">
+                <a:solidFill>
+                  <a:schemeClr val="bg1">
+                    <a:lumMod val="95000"/>
+                  </a:schemeClr>
+                </a:solidFill>
+              </a:rPr>
+              <a:t>:</a:t>
+            </a:r>
+            <a:br>
+              <a:rPr lang="es-MX" dirty="0">
+                <a:solidFill>
+                  <a:schemeClr val="bg1">
+                    <a:lumMod val="95000"/>
+                  </a:schemeClr>
+                </a:solidFill>
+              </a:rPr>
+            </a:br>
+            <a:r>
+              <a:rPr lang="es-MX" dirty="0">
+                <a:solidFill>
+                  <a:schemeClr val="bg1">
+                    <a:lumMod val="95000"/>
+                  </a:schemeClr>
+                </a:solidFill>
+              </a:rPr>
+              <a:t>Dra. Aurora Torres Soto</a:t>
+            </a:r>
+            <a:br>
+              <a:rPr lang="es-MX" dirty="0">
+                <a:solidFill>
+                  <a:schemeClr val="bg1">
+                    <a:lumMod val="95000"/>
+                  </a:schemeClr>
+                </a:solidFill>
+              </a:rPr>
+            </a:br>
+            <a:r>
+              <a:rPr lang="es-MX" dirty="0">
+                <a:solidFill>
+                  <a:schemeClr val="bg1">
+                    <a:lumMod val="95000"/>
+                  </a:schemeClr>
+                </a:solidFill>
+              </a:rPr>
+              <a:t>Dr.  Francisco Javier Álvarez Rodríguez</a:t>
+            </a:r>
+          </a:p>
+          <a:p>
+            <a:r>
+              <a:rPr lang="es-MX" dirty="0">
+                <a:solidFill>
+                  <a:schemeClr val="bg1">
+                    <a:lumMod val="95000"/>
+                  </a:schemeClr>
+                </a:solidFill>
+              </a:rPr>
+              <a:t>M.C. Eduardo Mauricio Martin Álvarez Tostado</a:t>
+            </a:r>
+          </a:p>
+        </p:txBody>
+      </p:sp>
     </p:spTree>
     <p:extLst>
       <p:ext uri="{BB962C8B-B14F-4D97-AF65-F5344CB8AC3E}">
@@ -5418,955 +5550,7 @@
 </p:sld>
 </file>
 
-<file path=ppt/slides/slide2.xml><?xml version="1.0" encoding="utf-8"?>
-<p:sld xmlns:a="http://schemas.openxmlformats.org/drawingml/2006/main" xmlns:r="http://schemas.openxmlformats.org/officeDocument/2006/relationships" xmlns:p="http://schemas.openxmlformats.org/presentationml/2006/main">
-  <p:cSld>
-    <p:bg>
-      <p:bgPr>
-        <a:solidFill>
-          <a:schemeClr val="bg1"/>
-        </a:solidFill>
-        <a:effectLst/>
-      </p:bgPr>
-    </p:bg>
-    <p:spTree>
-      <p:nvGrpSpPr>
-        <p:cNvPr id="1" name=""/>
-        <p:cNvGrpSpPr/>
-        <p:nvPr/>
-      </p:nvGrpSpPr>
-      <p:grpSpPr>
-        <a:xfrm>
-          <a:off x="0" y="0"/>
-          <a:ext cx="0" cy="0"/>
-          <a:chOff x="0" y="0"/>
-          <a:chExt cx="0" cy="0"/>
-        </a:xfrm>
-      </p:grpSpPr>
-      <p:sp useBgFill="1">
-        <p:nvSpPr>
-          <p:cNvPr id="22" name="Rectángulo 21">
-            <a:extLst>
-              <a:ext uri="{FF2B5EF4-FFF2-40B4-BE49-F238E27FC236}">
-                <a16:creationId xmlns:a16="http://schemas.microsoft.com/office/drawing/2014/main" id="{BFDA9692-ECDC-4B59-86B2-8C90FDE1A055}"/>
-              </a:ext>
-              <a:ext uri="{C183D7F6-B498-43B3-948B-1728B52AA6E4}">
-                <adec:decorative xmlns:adec="http://schemas.microsoft.com/office/drawing/2017/decorative" val="1"/>
-              </a:ext>
-            </a:extLst>
-          </p:cNvPr>
-          <p:cNvSpPr>
-            <a:spLocks noGrp="1" noRot="1" noChangeAspect="1" noMove="1" noResize="1" noEditPoints="1" noAdjustHandles="1" noChangeArrowheads="1" noChangeShapeType="1" noTextEdit="1"/>
-          </p:cNvSpPr>
-          <p:nvPr>
-            <p:extLst>
-              <p:ext uri="{386F3935-93C4-4BCD-93E2-E3B085C9AB24}">
-                <p16:designElem xmlns:p16="http://schemas.microsoft.com/office/powerpoint/2015/main" val="1"/>
-              </p:ext>
-            </p:extLst>
-          </p:nvPr>
-        </p:nvSpPr>
-        <p:spPr>
-          <a:xfrm>
-            <a:off x="0" y="536712"/>
-            <a:ext cx="12192000" cy="6321287"/>
-          </a:xfrm>
-          <a:prstGeom prst="rect">
-            <a:avLst/>
-          </a:prstGeom>
-          <a:ln>
-            <a:noFill/>
-          </a:ln>
-        </p:spPr>
-        <p:style>
-          <a:lnRef idx="2">
-            <a:schemeClr val="accent1">
-              <a:shade val="50000"/>
-            </a:schemeClr>
-          </a:lnRef>
-          <a:fillRef idx="1">
-            <a:schemeClr val="accent1"/>
-          </a:fillRef>
-          <a:effectRef idx="0">
-            <a:schemeClr val="accent1"/>
-          </a:effectRef>
-          <a:fontRef idx="minor">
-            <a:schemeClr val="lt1"/>
-          </a:fontRef>
-        </p:style>
-        <p:txBody>
-          <a:bodyPr rtlCol="0" anchor="ctr"/>
-          <a:lstStyle/>
-          <a:p>
-            <a:pPr algn="ctr" rtl="0"/>
-            <a:endParaRPr lang="es-ES" dirty="0"/>
-          </a:p>
-        </p:txBody>
-      </p:sp>
-      <p:sp>
-        <p:nvSpPr>
-          <p:cNvPr id="24" name="Rectángulo 23">
-            <a:extLst>
-              <a:ext uri="{FF2B5EF4-FFF2-40B4-BE49-F238E27FC236}">
-                <a16:creationId xmlns:a16="http://schemas.microsoft.com/office/drawing/2014/main" id="{12C05506-42A1-49C0-9D87-081CCD9023D6}"/>
-              </a:ext>
-              <a:ext uri="{C183D7F6-B498-43B3-948B-1728B52AA6E4}">
-                <adec:decorative xmlns:adec="http://schemas.microsoft.com/office/drawing/2017/decorative" val="1"/>
-              </a:ext>
-            </a:extLst>
-          </p:cNvPr>
-          <p:cNvSpPr>
-            <a:spLocks noGrp="1" noRot="1" noChangeAspect="1" noMove="1" noResize="1" noEditPoints="1" noAdjustHandles="1" noChangeArrowheads="1" noChangeShapeType="1" noTextEdit="1"/>
-          </p:cNvSpPr>
-          <p:nvPr>
-            <p:extLst>
-              <p:ext uri="{386F3935-93C4-4BCD-93E2-E3B085C9AB24}">
-                <p16:designElem xmlns:p16="http://schemas.microsoft.com/office/powerpoint/2015/main" val="1"/>
-              </p:ext>
-            </p:extLst>
-          </p:nvPr>
-        </p:nvSpPr>
-        <p:spPr>
-          <a:xfrm>
-            <a:off x="447817" y="5141974"/>
-            <a:ext cx="11290860" cy="1258827"/>
-          </a:xfrm>
-          <a:prstGeom prst="rect">
-            <a:avLst/>
-          </a:prstGeom>
-          <a:solidFill>
-            <a:schemeClr val="accent1"/>
-          </a:solidFill>
-          <a:ln>
-            <a:noFill/>
-          </a:ln>
-          <a:effectLst/>
-        </p:spPr>
-        <p:style>
-          <a:lnRef idx="1">
-            <a:schemeClr val="accent1"/>
-          </a:lnRef>
-          <a:fillRef idx="3">
-            <a:schemeClr val="accent1"/>
-          </a:fillRef>
-          <a:effectRef idx="2">
-            <a:schemeClr val="accent1"/>
-          </a:effectRef>
-          <a:fontRef idx="minor">
-            <a:schemeClr val="lt1"/>
-          </a:fontRef>
-        </p:style>
-      </p:sp>
-      <p:sp>
-        <p:nvSpPr>
-          <p:cNvPr id="2" name="Título 1">
-            <a:extLst>
-              <a:ext uri="{FF2B5EF4-FFF2-40B4-BE49-F238E27FC236}">
-                <a16:creationId xmlns:a16="http://schemas.microsoft.com/office/drawing/2014/main" id="{5B040558-A365-4CCE-92FA-5A48CD98F9C9}"/>
-              </a:ext>
-            </a:extLst>
-          </p:cNvPr>
-          <p:cNvSpPr>
-            <a:spLocks noGrp="1"/>
-          </p:cNvSpPr>
-          <p:nvPr>
-            <p:ph type="title"/>
-          </p:nvPr>
-        </p:nvSpPr>
-        <p:spPr>
-          <a:xfrm>
-            <a:off x="581192" y="5264487"/>
-            <a:ext cx="11029616" cy="718870"/>
-          </a:xfrm>
-        </p:spPr>
-        <p:txBody>
-          <a:bodyPr rtlCol="0">
-            <a:normAutofit/>
-          </a:bodyPr>
-          <a:lstStyle/>
-          <a:p>
-            <a:pPr rtl="0"/>
-            <a:r>
-              <a:rPr lang="es-ES" dirty="0">
-                <a:solidFill>
-                  <a:srgbClr val="FFFEFF"/>
-                </a:solidFill>
-              </a:rPr>
-              <a:t>Planteamiento del problema de investigación</a:t>
-            </a:r>
-          </a:p>
-        </p:txBody>
-      </p:sp>
-      <p:sp>
-        <p:nvSpPr>
-          <p:cNvPr id="6" name="CuadroTexto 5">
-            <a:extLst>
-              <a:ext uri="{FF2B5EF4-FFF2-40B4-BE49-F238E27FC236}">
-                <a16:creationId xmlns:a16="http://schemas.microsoft.com/office/drawing/2014/main" id="{7FEA9528-9856-4AA9-8901-D657431FB483}"/>
-              </a:ext>
-            </a:extLst>
-          </p:cNvPr>
-          <p:cNvSpPr txBox="1"/>
-          <p:nvPr/>
-        </p:nvSpPr>
-        <p:spPr>
-          <a:xfrm>
-            <a:off x="730528" y="1315849"/>
-            <a:ext cx="10725437" cy="3046988"/>
-          </a:xfrm>
-          <a:prstGeom prst="rect">
-            <a:avLst/>
-          </a:prstGeom>
-          <a:noFill/>
-        </p:spPr>
-        <p:txBody>
-          <a:bodyPr wrap="square" rtlCol="0">
-            <a:spAutoFit/>
-          </a:bodyPr>
-          <a:lstStyle/>
-          <a:p>
-            <a:r>
-              <a:rPr lang="es-MX" sz="3200" dirty="0"/>
-              <a:t>Consiste en analizar una sucesión de árboles filogenomicos construidos a partir del e-</a:t>
-            </a:r>
-            <a:r>
-              <a:rPr lang="es-MX" sz="3200" dirty="0" err="1"/>
-              <a:t>value</a:t>
-            </a:r>
-            <a:r>
-              <a:rPr lang="es-MX" sz="3200" dirty="0"/>
-              <a:t> del software </a:t>
-            </a:r>
-            <a:r>
-              <a:rPr lang="es-MX" sz="3200" dirty="0" err="1"/>
-              <a:t>blast</a:t>
-            </a:r>
-            <a:r>
-              <a:rPr lang="es-MX" sz="3200" dirty="0"/>
-              <a:t> referente a la exigencia de calidad de los mejores aciertos bidireccionales entre parejas de proteínas de organismos en estudio, mediante la implementación de una distancia entre árboles que nos permita hallar un árbol limite.</a:t>
-            </a:r>
-          </a:p>
-        </p:txBody>
-      </p:sp>
-    </p:spTree>
-    <p:extLst>
-      <p:ext uri="{BB962C8B-B14F-4D97-AF65-F5344CB8AC3E}">
-        <p14:creationId xmlns:p14="http://schemas.microsoft.com/office/powerpoint/2010/main" val="1703342593"/>
-      </p:ext>
-    </p:extLst>
-  </p:cSld>
-  <p:clrMapOvr>
-    <a:masterClrMapping/>
-  </p:clrMapOvr>
-</p:sld>
-</file>
-
-<file path=ppt/slides/slide3.xml><?xml version="1.0" encoding="utf-8"?>
-<p:sld xmlns:a="http://schemas.openxmlformats.org/drawingml/2006/main" xmlns:r="http://schemas.openxmlformats.org/officeDocument/2006/relationships" xmlns:p="http://schemas.openxmlformats.org/presentationml/2006/main">
-  <p:cSld>
-    <p:bg>
-      <p:bgPr>
-        <a:solidFill>
-          <a:schemeClr val="bg1"/>
-        </a:solidFill>
-        <a:effectLst/>
-      </p:bgPr>
-    </p:bg>
-    <p:spTree>
-      <p:nvGrpSpPr>
-        <p:cNvPr id="1" name=""/>
-        <p:cNvGrpSpPr/>
-        <p:nvPr/>
-      </p:nvGrpSpPr>
-      <p:grpSpPr>
-        <a:xfrm>
-          <a:off x="0" y="0"/>
-          <a:ext cx="0" cy="0"/>
-          <a:chOff x="0" y="0"/>
-          <a:chExt cx="0" cy="0"/>
-        </a:xfrm>
-      </p:grpSpPr>
-      <p:sp>
-        <p:nvSpPr>
-          <p:cNvPr id="2" name="Título 1">
-            <a:extLst>
-              <a:ext uri="{FF2B5EF4-FFF2-40B4-BE49-F238E27FC236}">
-                <a16:creationId xmlns:a16="http://schemas.microsoft.com/office/drawing/2014/main" id="{921633EB-7DCB-4DDC-80AF-C885A3EE1245}"/>
-              </a:ext>
-            </a:extLst>
-          </p:cNvPr>
-          <p:cNvSpPr>
-            <a:spLocks noGrp="1"/>
-          </p:cNvSpPr>
-          <p:nvPr>
-            <p:ph type="title"/>
-          </p:nvPr>
-        </p:nvSpPr>
-        <p:spPr/>
-        <p:txBody>
-          <a:bodyPr rtlCol="0"/>
-          <a:lstStyle/>
-          <a:p>
-            <a:pPr rtl="0"/>
-            <a:r>
-              <a:rPr lang="es-ES" dirty="0"/>
-              <a:t>Objetivos</a:t>
-            </a:r>
-          </a:p>
-        </p:txBody>
-      </p:sp>
-      <p:sp>
-        <p:nvSpPr>
-          <p:cNvPr id="7" name="Rectángulo 6">
-            <a:extLst>
-              <a:ext uri="{FF2B5EF4-FFF2-40B4-BE49-F238E27FC236}">
-                <a16:creationId xmlns:a16="http://schemas.microsoft.com/office/drawing/2014/main" id="{89597A2D-CCA7-48B6-9C74-422508439B0B}"/>
-              </a:ext>
-            </a:extLst>
-          </p:cNvPr>
-          <p:cNvSpPr/>
-          <p:nvPr/>
-        </p:nvSpPr>
-        <p:spPr>
-          <a:xfrm>
-            <a:off x="928914" y="1959427"/>
-            <a:ext cx="10334172" cy="4789003"/>
-          </a:xfrm>
-          <a:prstGeom prst="rect">
-            <a:avLst/>
-          </a:prstGeom>
-        </p:spPr>
-        <p:txBody>
-          <a:bodyPr wrap="square">
-            <a:spAutoFit/>
-          </a:bodyPr>
-          <a:lstStyle/>
-          <a:p>
-            <a:pPr marL="6350" marR="35560" indent="-6350" algn="just">
-              <a:lnSpc>
-                <a:spcPct val="103000"/>
-              </a:lnSpc>
-              <a:spcBef>
-                <a:spcPts val="200"/>
-              </a:spcBef>
-              <a:spcAft>
-                <a:spcPts val="0"/>
-              </a:spcAft>
-            </a:pPr>
-            <a:r>
-              <a:rPr lang="es-MX" sz="2400" b="1" dirty="0">
-                <a:solidFill>
-                  <a:srgbClr val="2F5496"/>
-                </a:solidFill>
-                <a:latin typeface="Calibri Light" panose="020F0302020204030204" pitchFamily="34" charset="0"/>
-                <a:ea typeface="Times New Roman" panose="02020603050405020304" pitchFamily="18" charset="0"/>
-                <a:cs typeface="Times New Roman" panose="02020603050405020304" pitchFamily="18" charset="0"/>
-              </a:rPr>
-              <a:t>	</a:t>
-            </a:r>
-            <a:r>
-              <a:rPr lang="es-MX" sz="2800" b="1" dirty="0">
-                <a:solidFill>
-                  <a:srgbClr val="2F5496"/>
-                </a:solidFill>
-                <a:latin typeface="Calibri Light" panose="020F0302020204030204" pitchFamily="34" charset="0"/>
-                <a:ea typeface="Times New Roman" panose="02020603050405020304" pitchFamily="18" charset="0"/>
-                <a:cs typeface="Times New Roman" panose="02020603050405020304" pitchFamily="18" charset="0"/>
-              </a:rPr>
-              <a:t>Objetivo General</a:t>
-            </a:r>
-          </a:p>
-          <a:p>
-            <a:pPr marL="285750" marR="35560" indent="-285750" algn="just">
-              <a:lnSpc>
-                <a:spcPct val="103000"/>
-              </a:lnSpc>
-              <a:spcAft>
-                <a:spcPts val="830"/>
-              </a:spcAft>
-              <a:buFont typeface="Wingdings" panose="05000000000000000000" pitchFamily="2" charset="2"/>
-              <a:buChar char="Ø"/>
-            </a:pPr>
-            <a:r>
-              <a:rPr lang="es-MX" sz="2000" dirty="0">
-                <a:solidFill>
-                  <a:srgbClr val="000000"/>
-                </a:solidFill>
-                <a:latin typeface="Calibri" panose="020F0502020204030204" pitchFamily="34" charset="0"/>
-                <a:ea typeface="Calibri" panose="020F0502020204030204" pitchFamily="34" charset="0"/>
-              </a:rPr>
-              <a:t>Analizar una sucesión de árboles filogenomicos construida a través de los e-</a:t>
-            </a:r>
-            <a:r>
-              <a:rPr lang="es-MX" sz="2000" dirty="0" err="1">
-                <a:solidFill>
-                  <a:srgbClr val="000000"/>
-                </a:solidFill>
-                <a:latin typeface="Calibri" panose="020F0502020204030204" pitchFamily="34" charset="0"/>
-                <a:ea typeface="Calibri" panose="020F0502020204030204" pitchFamily="34" charset="0"/>
-              </a:rPr>
-              <a:t>values</a:t>
-            </a:r>
-            <a:r>
-              <a:rPr lang="es-MX" sz="2000" dirty="0">
-                <a:solidFill>
-                  <a:srgbClr val="000000"/>
-                </a:solidFill>
-                <a:latin typeface="Calibri" panose="020F0502020204030204" pitchFamily="34" charset="0"/>
-                <a:ea typeface="Calibri" panose="020F0502020204030204" pitchFamily="34" charset="0"/>
-              </a:rPr>
-              <a:t> del programa </a:t>
-            </a:r>
-            <a:r>
-              <a:rPr lang="es-MX" sz="2000" dirty="0" err="1">
-                <a:solidFill>
-                  <a:srgbClr val="000000"/>
-                </a:solidFill>
-                <a:latin typeface="Calibri" panose="020F0502020204030204" pitchFamily="34" charset="0"/>
-                <a:ea typeface="Calibri" panose="020F0502020204030204" pitchFamily="34" charset="0"/>
-              </a:rPr>
-              <a:t>blast</a:t>
-            </a:r>
-            <a:r>
-              <a:rPr lang="es-MX" sz="2000" dirty="0">
-                <a:solidFill>
-                  <a:srgbClr val="000000"/>
-                </a:solidFill>
-                <a:latin typeface="Calibri" panose="020F0502020204030204" pitchFamily="34" charset="0"/>
-                <a:ea typeface="Calibri" panose="020F0502020204030204" pitchFamily="34" charset="0"/>
-              </a:rPr>
-              <a:t> utilizando una distancia del tipo diferencia simétrica que nos permita definir en esa sucesión un árbol límite. </a:t>
-            </a:r>
-          </a:p>
-          <a:p>
-            <a:pPr marL="6350" marR="35560" indent="-6350" algn="just">
-              <a:lnSpc>
-                <a:spcPct val="103000"/>
-              </a:lnSpc>
-              <a:spcBef>
-                <a:spcPts val="200"/>
-              </a:spcBef>
-              <a:spcAft>
-                <a:spcPts val="0"/>
-              </a:spcAft>
-            </a:pPr>
-            <a:r>
-              <a:rPr lang="es-MX" sz="2800" b="1" dirty="0">
-                <a:solidFill>
-                  <a:srgbClr val="2F5496"/>
-                </a:solidFill>
-                <a:latin typeface="Calibri Light" panose="020F0302020204030204" pitchFamily="34" charset="0"/>
-                <a:ea typeface="Times New Roman" panose="02020603050405020304" pitchFamily="18" charset="0"/>
-                <a:cs typeface="Times New Roman" panose="02020603050405020304" pitchFamily="18" charset="0"/>
-              </a:rPr>
-              <a:t>Objetivos específicos</a:t>
-            </a:r>
-          </a:p>
-          <a:p>
-            <a:pPr marL="285750" marR="35560" indent="-285750" algn="just">
-              <a:lnSpc>
-                <a:spcPct val="103000"/>
-              </a:lnSpc>
-              <a:spcAft>
-                <a:spcPts val="830"/>
-              </a:spcAft>
-              <a:buFont typeface="Wingdings" panose="05000000000000000000" pitchFamily="2" charset="2"/>
-              <a:buChar char="Ø"/>
-            </a:pPr>
-            <a:r>
-              <a:rPr lang="es-MX" sz="2000" dirty="0">
-                <a:solidFill>
-                  <a:srgbClr val="000000"/>
-                </a:solidFill>
-                <a:latin typeface="Calibri" panose="020F0502020204030204" pitchFamily="34" charset="0"/>
-                <a:ea typeface="Calibri" panose="020F0502020204030204" pitchFamily="34" charset="0"/>
-              </a:rPr>
-              <a:t>Seleccionar una distancia del tipo diferencia simétrica adecuada para detectar las diferencias entre árboles.</a:t>
-            </a:r>
-          </a:p>
-          <a:p>
-            <a:pPr marL="285750" marR="35560" indent="-285750" algn="just">
-              <a:lnSpc>
-                <a:spcPct val="103000"/>
-              </a:lnSpc>
-              <a:spcAft>
-                <a:spcPts val="830"/>
-              </a:spcAft>
-              <a:buFont typeface="Wingdings" panose="05000000000000000000" pitchFamily="2" charset="2"/>
-              <a:buChar char="Ø"/>
-            </a:pPr>
-            <a:r>
-              <a:rPr lang="es-MX" sz="2000" dirty="0">
-                <a:solidFill>
-                  <a:srgbClr val="000000"/>
-                </a:solidFill>
-                <a:latin typeface="Calibri" panose="020F0502020204030204" pitchFamily="34" charset="0"/>
-                <a:ea typeface="Calibri" panose="020F0502020204030204" pitchFamily="34" charset="0"/>
-              </a:rPr>
-              <a:t>Implementar un algoritmo que calcule esa distancia entre dos árboles usando el formato </a:t>
-            </a:r>
-            <a:r>
-              <a:rPr lang="es-MX" sz="2000" dirty="0" err="1">
-                <a:solidFill>
-                  <a:srgbClr val="000000"/>
-                </a:solidFill>
-                <a:latin typeface="Calibri" panose="020F0502020204030204" pitchFamily="34" charset="0"/>
-                <a:ea typeface="Calibri" panose="020F0502020204030204" pitchFamily="34" charset="0"/>
-              </a:rPr>
-              <a:t>Newick</a:t>
-            </a:r>
-            <a:r>
-              <a:rPr lang="es-MX" sz="2000" dirty="0">
-                <a:solidFill>
-                  <a:srgbClr val="000000"/>
-                </a:solidFill>
-                <a:latin typeface="Calibri" panose="020F0502020204030204" pitchFamily="34" charset="0"/>
-                <a:ea typeface="Calibri" panose="020F0502020204030204" pitchFamily="34" charset="0"/>
-              </a:rPr>
-              <a:t> para cada par de árboles consecutivos en la sucesión de árboles basada en el e-</a:t>
-            </a:r>
-            <a:r>
-              <a:rPr lang="es-MX" sz="2000" dirty="0" err="1">
-                <a:solidFill>
-                  <a:srgbClr val="000000"/>
-                </a:solidFill>
-                <a:latin typeface="Calibri" panose="020F0502020204030204" pitchFamily="34" charset="0"/>
-                <a:ea typeface="Calibri" panose="020F0502020204030204" pitchFamily="34" charset="0"/>
-              </a:rPr>
-              <a:t>value</a:t>
-            </a:r>
-            <a:r>
-              <a:rPr lang="es-MX" sz="2000" dirty="0">
-                <a:solidFill>
-                  <a:srgbClr val="000000"/>
-                </a:solidFill>
-                <a:latin typeface="Calibri" panose="020F0502020204030204" pitchFamily="34" charset="0"/>
-                <a:ea typeface="Calibri" panose="020F0502020204030204" pitchFamily="34" charset="0"/>
-              </a:rPr>
-              <a:t> de </a:t>
-            </a:r>
-            <a:r>
-              <a:rPr lang="es-MX" sz="2000" dirty="0" err="1">
-                <a:solidFill>
-                  <a:srgbClr val="000000"/>
-                </a:solidFill>
-                <a:latin typeface="Calibri" panose="020F0502020204030204" pitchFamily="34" charset="0"/>
-                <a:ea typeface="Calibri" panose="020F0502020204030204" pitchFamily="34" charset="0"/>
-              </a:rPr>
-              <a:t>blast</a:t>
-            </a:r>
-            <a:r>
-              <a:rPr lang="es-MX" sz="2000" dirty="0">
-                <a:solidFill>
-                  <a:srgbClr val="000000"/>
-                </a:solidFill>
-                <a:latin typeface="Calibri" panose="020F0502020204030204" pitchFamily="34" charset="0"/>
-                <a:ea typeface="Calibri" panose="020F0502020204030204" pitchFamily="34" charset="0"/>
-              </a:rPr>
-              <a:t>.</a:t>
-            </a:r>
-          </a:p>
-          <a:p>
-            <a:pPr marL="285750" marR="35560" indent="-285750" algn="just">
-              <a:lnSpc>
-                <a:spcPct val="103000"/>
-              </a:lnSpc>
-              <a:spcAft>
-                <a:spcPts val="830"/>
-              </a:spcAft>
-              <a:buFont typeface="Wingdings" panose="05000000000000000000" pitchFamily="2" charset="2"/>
-              <a:buChar char="Ø"/>
-            </a:pPr>
-            <a:r>
-              <a:rPr lang="es-MX" sz="2000" dirty="0">
-                <a:solidFill>
-                  <a:srgbClr val="000000"/>
-                </a:solidFill>
-                <a:latin typeface="Calibri" panose="020F0502020204030204" pitchFamily="34" charset="0"/>
-                <a:ea typeface="Calibri" panose="020F0502020204030204" pitchFamily="34" charset="0"/>
-              </a:rPr>
-              <a:t>Encontrar el árbol limite, entendiéndose por aquel que a partir de un e-</a:t>
-            </a:r>
-            <a:r>
-              <a:rPr lang="es-MX" sz="2000" dirty="0" err="1">
-                <a:solidFill>
-                  <a:srgbClr val="000000"/>
-                </a:solidFill>
-                <a:latin typeface="Calibri" panose="020F0502020204030204" pitchFamily="34" charset="0"/>
-                <a:ea typeface="Calibri" panose="020F0502020204030204" pitchFamily="34" charset="0"/>
-              </a:rPr>
-              <a:t>value</a:t>
-            </a:r>
-            <a:r>
-              <a:rPr lang="es-MX" sz="2000" dirty="0">
-                <a:solidFill>
-                  <a:srgbClr val="000000"/>
-                </a:solidFill>
-                <a:latin typeface="Calibri" panose="020F0502020204030204" pitchFamily="34" charset="0"/>
-                <a:ea typeface="Calibri" panose="020F0502020204030204" pitchFamily="34" charset="0"/>
-              </a:rPr>
-              <a:t> de exigencia de los mejores aciertos bidireccionales entre parejas de proteínas de organismos en estudio, la distancia entre árboles cercanos al árbol limite tiende a cero.</a:t>
-            </a:r>
-          </a:p>
-        </p:txBody>
-      </p:sp>
-    </p:spTree>
-    <p:extLst>
-      <p:ext uri="{BB962C8B-B14F-4D97-AF65-F5344CB8AC3E}">
-        <p14:creationId xmlns:p14="http://schemas.microsoft.com/office/powerpoint/2010/main" val="497607547"/>
-      </p:ext>
-    </p:extLst>
-  </p:cSld>
-  <p:clrMapOvr>
-    <a:masterClrMapping/>
-  </p:clrMapOvr>
-</p:sld>
-</file>
-
-<file path=ppt/slides/slide4.xml><?xml version="1.0" encoding="utf-8"?>
-<p:sld xmlns:a="http://schemas.openxmlformats.org/drawingml/2006/main" xmlns:r="http://schemas.openxmlformats.org/officeDocument/2006/relationships" xmlns:p="http://schemas.openxmlformats.org/presentationml/2006/main">
-  <p:cSld>
-    <p:spTree>
-      <p:nvGrpSpPr>
-        <p:cNvPr id="1" name=""/>
-        <p:cNvGrpSpPr/>
-        <p:nvPr/>
-      </p:nvGrpSpPr>
-      <p:grpSpPr>
-        <a:xfrm>
-          <a:off x="0" y="0"/>
-          <a:ext cx="0" cy="0"/>
-          <a:chOff x="0" y="0"/>
-          <a:chExt cx="0" cy="0"/>
-        </a:xfrm>
-      </p:grpSpPr>
-      <p:sp>
-        <p:nvSpPr>
-          <p:cNvPr id="2" name="Título 1">
-            <a:extLst>
-              <a:ext uri="{FF2B5EF4-FFF2-40B4-BE49-F238E27FC236}">
-                <a16:creationId xmlns:a16="http://schemas.microsoft.com/office/drawing/2014/main" id="{A3A2BF2F-30E1-44EF-BCBB-B8ED22C94F45}"/>
-              </a:ext>
-            </a:extLst>
-          </p:cNvPr>
-          <p:cNvSpPr>
-            <a:spLocks noGrp="1"/>
-          </p:cNvSpPr>
-          <p:nvPr>
-            <p:ph type="title"/>
-          </p:nvPr>
-        </p:nvSpPr>
-        <p:spPr/>
-        <p:txBody>
-          <a:bodyPr/>
-          <a:lstStyle/>
-          <a:p>
-            <a:r>
-              <a:rPr lang="es-MX" dirty="0"/>
-              <a:t>Pasos metodológicos de la investigación</a:t>
-            </a:r>
-          </a:p>
-        </p:txBody>
-      </p:sp>
-      <p:sp>
-        <p:nvSpPr>
-          <p:cNvPr id="5" name="AutoShape 2">
-            <a:extLst>
-              <a:ext uri="{FF2B5EF4-FFF2-40B4-BE49-F238E27FC236}">
-                <a16:creationId xmlns:a16="http://schemas.microsoft.com/office/drawing/2014/main" id="{F6CF4ED8-3953-4428-BDBE-A69027FFFF9A}"/>
-              </a:ext>
-            </a:extLst>
-          </p:cNvPr>
-          <p:cNvSpPr>
-            <a:spLocks noChangeAspect="1" noChangeArrowheads="1"/>
-          </p:cNvSpPr>
-          <p:nvPr/>
-        </p:nvSpPr>
-        <p:spPr bwMode="auto">
-          <a:xfrm>
-            <a:off x="5943600" y="3276600"/>
-            <a:ext cx="304800" cy="304800"/>
-          </a:xfrm>
-          <a:prstGeom prst="rect">
-            <a:avLst/>
-          </a:prstGeom>
-          <a:noFill/>
-          <a:extLst>
-            <a:ext uri="{909E8E84-426E-40DD-AFC4-6F175D3DCCD1}">
-              <a14:hiddenFill xmlns:a14="http://schemas.microsoft.com/office/drawing/2010/main">
-                <a:solidFill>
-                  <a:srgbClr val="FFFFFF"/>
-                </a:solidFill>
-              </a14:hiddenFill>
-            </a:ext>
-          </a:extLst>
-        </p:spPr>
-        <p:txBody>
-          <a:bodyPr vert="horz" wrap="square" lIns="91440" tIns="45720" rIns="91440" bIns="45720" numCol="1" anchor="t" anchorCtr="0" compatLnSpc="1">
-            <a:prstTxWarp prst="textNoShape">
-              <a:avLst/>
-            </a:prstTxWarp>
-          </a:bodyPr>
-          <a:lstStyle/>
-          <a:p>
-            <a:endParaRPr lang="es-MX"/>
-          </a:p>
-        </p:txBody>
-      </p:sp>
-      <p:pic>
-        <p:nvPicPr>
-          <p:cNvPr id="7" name="Imagen 6" descr="Imagen que contiene texto, pizarrón&#10;&#10;Descripción generada automáticamente">
-            <a:extLst>
-              <a:ext uri="{FF2B5EF4-FFF2-40B4-BE49-F238E27FC236}">
-                <a16:creationId xmlns:a16="http://schemas.microsoft.com/office/drawing/2014/main" id="{C952F92F-12B5-446B-B0A1-6D9B8A631D32}"/>
-              </a:ext>
-            </a:extLst>
-          </p:cNvPr>
-          <p:cNvPicPr>
-            <a:picLocks noChangeAspect="1"/>
-          </p:cNvPicPr>
-          <p:nvPr/>
-        </p:nvPicPr>
-        <p:blipFill>
-          <a:blip r:embed="rId2"/>
-          <a:stretch>
-            <a:fillRect/>
-          </a:stretch>
-        </p:blipFill>
-        <p:spPr>
-          <a:xfrm>
-            <a:off x="1175657" y="2008414"/>
-            <a:ext cx="9535886" cy="4419601"/>
-          </a:xfrm>
-          <a:prstGeom prst="rect">
-            <a:avLst/>
-          </a:prstGeom>
-        </p:spPr>
-      </p:pic>
-    </p:spTree>
-    <p:extLst>
-      <p:ext uri="{BB962C8B-B14F-4D97-AF65-F5344CB8AC3E}">
-        <p14:creationId xmlns:p14="http://schemas.microsoft.com/office/powerpoint/2010/main" val="292639315"/>
-      </p:ext>
-    </p:extLst>
-  </p:cSld>
-  <p:clrMapOvr>
-    <a:masterClrMapping/>
-  </p:clrMapOvr>
-</p:sld>
-</file>
-
-<file path=ppt/slides/slide5.xml><?xml version="1.0" encoding="utf-8"?>
-<p:sld xmlns:a="http://schemas.openxmlformats.org/drawingml/2006/main" xmlns:r="http://schemas.openxmlformats.org/officeDocument/2006/relationships" xmlns:p="http://schemas.openxmlformats.org/presentationml/2006/main">
-  <p:cSld>
-    <p:spTree>
-      <p:nvGrpSpPr>
-        <p:cNvPr id="1" name=""/>
-        <p:cNvGrpSpPr/>
-        <p:nvPr/>
-      </p:nvGrpSpPr>
-      <p:grpSpPr>
-        <a:xfrm>
-          <a:off x="0" y="0"/>
-          <a:ext cx="0" cy="0"/>
-          <a:chOff x="0" y="0"/>
-          <a:chExt cx="0" cy="0"/>
-        </a:xfrm>
-      </p:grpSpPr>
-      <p:sp>
-        <p:nvSpPr>
-          <p:cNvPr id="2" name="Título 1">
-            <a:extLst>
-              <a:ext uri="{FF2B5EF4-FFF2-40B4-BE49-F238E27FC236}">
-                <a16:creationId xmlns:a16="http://schemas.microsoft.com/office/drawing/2014/main" id="{14426178-E9D4-4B09-AB71-88BC30D23B98}"/>
-              </a:ext>
-            </a:extLst>
-          </p:cNvPr>
-          <p:cNvSpPr>
-            <a:spLocks noGrp="1"/>
-          </p:cNvSpPr>
-          <p:nvPr>
-            <p:ph type="title"/>
-          </p:nvPr>
-        </p:nvSpPr>
-        <p:spPr/>
-        <p:txBody>
-          <a:bodyPr/>
-          <a:lstStyle/>
-          <a:p>
-            <a:endParaRPr lang="es-MX"/>
-          </a:p>
-        </p:txBody>
-      </p:sp>
-      <p:sp>
-        <p:nvSpPr>
-          <p:cNvPr id="3" name="Marcador de contenido 2">
-            <a:extLst>
-              <a:ext uri="{FF2B5EF4-FFF2-40B4-BE49-F238E27FC236}">
-                <a16:creationId xmlns:a16="http://schemas.microsoft.com/office/drawing/2014/main" id="{C0A1C0CA-2B67-41E9-B18A-2D164ACB402D}"/>
-              </a:ext>
-            </a:extLst>
-          </p:cNvPr>
-          <p:cNvSpPr>
-            <a:spLocks noGrp="1"/>
-          </p:cNvSpPr>
-          <p:nvPr>
-            <p:ph sz="half" idx="1"/>
-          </p:nvPr>
-        </p:nvSpPr>
-        <p:spPr/>
-        <p:txBody>
-          <a:bodyPr/>
-          <a:lstStyle/>
-          <a:p>
-            <a:endParaRPr lang="es-MX"/>
-          </a:p>
-        </p:txBody>
-      </p:sp>
-      <p:sp>
-        <p:nvSpPr>
-          <p:cNvPr id="4" name="Marcador de contenido 3">
-            <a:extLst>
-              <a:ext uri="{FF2B5EF4-FFF2-40B4-BE49-F238E27FC236}">
-                <a16:creationId xmlns:a16="http://schemas.microsoft.com/office/drawing/2014/main" id="{FC5F3B0D-FB28-4FED-B115-24E89380C56C}"/>
-              </a:ext>
-            </a:extLst>
-          </p:cNvPr>
-          <p:cNvSpPr>
-            <a:spLocks noGrp="1"/>
-          </p:cNvSpPr>
-          <p:nvPr>
-            <p:ph sz="half" idx="2"/>
-          </p:nvPr>
-        </p:nvSpPr>
-        <p:spPr/>
-        <p:txBody>
-          <a:bodyPr/>
-          <a:lstStyle/>
-          <a:p>
-            <a:endParaRPr lang="es-MX"/>
-          </a:p>
-        </p:txBody>
-      </p:sp>
-    </p:spTree>
-    <p:extLst>
-      <p:ext uri="{BB962C8B-B14F-4D97-AF65-F5344CB8AC3E}">
-        <p14:creationId xmlns:p14="http://schemas.microsoft.com/office/powerpoint/2010/main" val="455625261"/>
-      </p:ext>
-    </p:extLst>
-  </p:cSld>
-  <p:clrMapOvr>
-    <a:masterClrMapping/>
-  </p:clrMapOvr>
-</p:sld>
-</file>
-
-<file path=ppt/slides/slide6.xml><?xml version="1.0" encoding="utf-8"?>
-<p:sld xmlns:a="http://schemas.openxmlformats.org/drawingml/2006/main" xmlns:r="http://schemas.openxmlformats.org/officeDocument/2006/relationships" xmlns:p="http://schemas.openxmlformats.org/presentationml/2006/main">
-  <p:cSld>
-    <p:spTree>
-      <p:nvGrpSpPr>
-        <p:cNvPr id="1" name=""/>
-        <p:cNvGrpSpPr/>
-        <p:nvPr/>
-      </p:nvGrpSpPr>
-      <p:grpSpPr>
-        <a:xfrm>
-          <a:off x="0" y="0"/>
-          <a:ext cx="0" cy="0"/>
-          <a:chOff x="0" y="0"/>
-          <a:chExt cx="0" cy="0"/>
-        </a:xfrm>
-      </p:grpSpPr>
-      <p:sp>
-        <p:nvSpPr>
-          <p:cNvPr id="2" name="Título 1">
-            <a:extLst>
-              <a:ext uri="{FF2B5EF4-FFF2-40B4-BE49-F238E27FC236}">
-                <a16:creationId xmlns:a16="http://schemas.microsoft.com/office/drawing/2014/main" id="{091DFB34-8747-43E1-A195-CC339B9EC136}"/>
-              </a:ext>
-            </a:extLst>
-          </p:cNvPr>
-          <p:cNvSpPr>
-            <a:spLocks noGrp="1"/>
-          </p:cNvSpPr>
-          <p:nvPr>
-            <p:ph type="title"/>
-          </p:nvPr>
-        </p:nvSpPr>
-        <p:spPr/>
-        <p:txBody>
-          <a:bodyPr/>
-          <a:lstStyle/>
-          <a:p>
-            <a:endParaRPr lang="es-MX"/>
-          </a:p>
-        </p:txBody>
-      </p:sp>
-      <p:sp>
-        <p:nvSpPr>
-          <p:cNvPr id="3" name="Marcador de contenido 2">
-            <a:extLst>
-              <a:ext uri="{FF2B5EF4-FFF2-40B4-BE49-F238E27FC236}">
-                <a16:creationId xmlns:a16="http://schemas.microsoft.com/office/drawing/2014/main" id="{F42EAECB-9235-4152-9301-C84064E6AB10}"/>
-              </a:ext>
-            </a:extLst>
-          </p:cNvPr>
-          <p:cNvSpPr>
-            <a:spLocks noGrp="1"/>
-          </p:cNvSpPr>
-          <p:nvPr>
-            <p:ph sz="half" idx="1"/>
-          </p:nvPr>
-        </p:nvSpPr>
-        <p:spPr/>
-        <p:txBody>
-          <a:bodyPr/>
-          <a:lstStyle/>
-          <a:p>
-            <a:endParaRPr lang="es-MX"/>
-          </a:p>
-        </p:txBody>
-      </p:sp>
-      <p:sp>
-        <p:nvSpPr>
-          <p:cNvPr id="4" name="Marcador de contenido 3">
-            <a:extLst>
-              <a:ext uri="{FF2B5EF4-FFF2-40B4-BE49-F238E27FC236}">
-                <a16:creationId xmlns:a16="http://schemas.microsoft.com/office/drawing/2014/main" id="{A96DAF49-9286-40AC-B670-F36EC73C7BD1}"/>
-              </a:ext>
-            </a:extLst>
-          </p:cNvPr>
-          <p:cNvSpPr>
-            <a:spLocks noGrp="1"/>
-          </p:cNvSpPr>
-          <p:nvPr>
-            <p:ph sz="half" idx="2"/>
-          </p:nvPr>
-        </p:nvSpPr>
-        <p:spPr/>
-        <p:txBody>
-          <a:bodyPr/>
-          <a:lstStyle/>
-          <a:p>
-            <a:endParaRPr lang="es-MX"/>
-          </a:p>
-        </p:txBody>
-      </p:sp>
-    </p:spTree>
-    <p:extLst>
-      <p:ext uri="{BB962C8B-B14F-4D97-AF65-F5344CB8AC3E}">
-        <p14:creationId xmlns:p14="http://schemas.microsoft.com/office/powerpoint/2010/main" val="4218348571"/>
-      </p:ext>
-    </p:extLst>
-  </p:cSld>
-  <p:clrMapOvr>
-    <a:masterClrMapping/>
-  </p:clrMapOvr>
-</p:sld>
-</file>
-
-<file path=ppt/slides/slide7.xml><?xml version="1.0" encoding="utf-8"?>
+<file path=ppt/slides/slide10.xml><?xml version="1.0" encoding="utf-8"?>
 <p:sld xmlns:a="http://schemas.openxmlformats.org/drawingml/2006/main" xmlns:r="http://schemas.openxmlformats.org/officeDocument/2006/relationships" xmlns:p="http://schemas.openxmlformats.org/presentationml/2006/main">
   <p:cSld>
     <p:bg>
@@ -6797,6 +5981,1330 @@
     <p:extLst>
       <p:ext uri="{BB962C8B-B14F-4D97-AF65-F5344CB8AC3E}">
         <p14:creationId xmlns:p14="http://schemas.microsoft.com/office/powerpoint/2010/main" val="3501347425"/>
+      </p:ext>
+    </p:extLst>
+  </p:cSld>
+  <p:clrMapOvr>
+    <a:masterClrMapping/>
+  </p:clrMapOvr>
+</p:sld>
+</file>
+
+<file path=ppt/slides/slide2.xml><?xml version="1.0" encoding="utf-8"?>
+<p:sld xmlns:a="http://schemas.openxmlformats.org/drawingml/2006/main" xmlns:r="http://schemas.openxmlformats.org/officeDocument/2006/relationships" xmlns:p="http://schemas.openxmlformats.org/presentationml/2006/main">
+  <p:cSld>
+    <p:bg>
+      <p:bgPr>
+        <a:solidFill>
+          <a:schemeClr val="bg1"/>
+        </a:solidFill>
+        <a:effectLst/>
+      </p:bgPr>
+    </p:bg>
+    <p:spTree>
+      <p:nvGrpSpPr>
+        <p:cNvPr id="1" name=""/>
+        <p:cNvGrpSpPr/>
+        <p:nvPr/>
+      </p:nvGrpSpPr>
+      <p:grpSpPr>
+        <a:xfrm>
+          <a:off x="0" y="0"/>
+          <a:ext cx="0" cy="0"/>
+          <a:chOff x="0" y="0"/>
+          <a:chExt cx="0" cy="0"/>
+        </a:xfrm>
+      </p:grpSpPr>
+      <p:sp useBgFill="1">
+        <p:nvSpPr>
+          <p:cNvPr id="22" name="Rectángulo 21">
+            <a:extLst>
+              <a:ext uri="{FF2B5EF4-FFF2-40B4-BE49-F238E27FC236}">
+                <a16:creationId xmlns:a16="http://schemas.microsoft.com/office/drawing/2014/main" id="{BFDA9692-ECDC-4B59-86B2-8C90FDE1A055}"/>
+              </a:ext>
+              <a:ext uri="{C183D7F6-B498-43B3-948B-1728B52AA6E4}">
+                <adec:decorative xmlns:adec="http://schemas.microsoft.com/office/drawing/2017/decorative" val="1"/>
+              </a:ext>
+            </a:extLst>
+          </p:cNvPr>
+          <p:cNvSpPr>
+            <a:spLocks noGrp="1" noRot="1" noChangeAspect="1" noMove="1" noResize="1" noEditPoints="1" noAdjustHandles="1" noChangeArrowheads="1" noChangeShapeType="1" noTextEdit="1"/>
+          </p:cNvSpPr>
+          <p:nvPr>
+            <p:extLst>
+              <p:ext uri="{386F3935-93C4-4BCD-93E2-E3B085C9AB24}">
+                <p16:designElem xmlns:p16="http://schemas.microsoft.com/office/powerpoint/2015/main" val="1"/>
+              </p:ext>
+            </p:extLst>
+          </p:nvPr>
+        </p:nvSpPr>
+        <p:spPr>
+          <a:xfrm>
+            <a:off x="0" y="536712"/>
+            <a:ext cx="12192000" cy="6321287"/>
+          </a:xfrm>
+          <a:prstGeom prst="rect">
+            <a:avLst/>
+          </a:prstGeom>
+          <a:ln>
+            <a:noFill/>
+          </a:ln>
+        </p:spPr>
+        <p:style>
+          <a:lnRef idx="2">
+            <a:schemeClr val="accent1">
+              <a:shade val="50000"/>
+            </a:schemeClr>
+          </a:lnRef>
+          <a:fillRef idx="1">
+            <a:schemeClr val="accent1"/>
+          </a:fillRef>
+          <a:effectRef idx="0">
+            <a:schemeClr val="accent1"/>
+          </a:effectRef>
+          <a:fontRef idx="minor">
+            <a:schemeClr val="lt1"/>
+          </a:fontRef>
+        </p:style>
+        <p:txBody>
+          <a:bodyPr rtlCol="0" anchor="ctr"/>
+          <a:lstStyle/>
+          <a:p>
+            <a:pPr algn="ctr" rtl="0"/>
+            <a:endParaRPr lang="es-ES" dirty="0"/>
+          </a:p>
+        </p:txBody>
+      </p:sp>
+      <p:sp>
+        <p:nvSpPr>
+          <p:cNvPr id="24" name="Rectángulo 23">
+            <a:extLst>
+              <a:ext uri="{FF2B5EF4-FFF2-40B4-BE49-F238E27FC236}">
+                <a16:creationId xmlns:a16="http://schemas.microsoft.com/office/drawing/2014/main" id="{12C05506-42A1-49C0-9D87-081CCD9023D6}"/>
+              </a:ext>
+              <a:ext uri="{C183D7F6-B498-43B3-948B-1728B52AA6E4}">
+                <adec:decorative xmlns:adec="http://schemas.microsoft.com/office/drawing/2017/decorative" val="1"/>
+              </a:ext>
+            </a:extLst>
+          </p:cNvPr>
+          <p:cNvSpPr>
+            <a:spLocks noGrp="1" noRot="1" noChangeAspect="1" noMove="1" noResize="1" noEditPoints="1" noAdjustHandles="1" noChangeArrowheads="1" noChangeShapeType="1" noTextEdit="1"/>
+          </p:cNvSpPr>
+          <p:nvPr>
+            <p:extLst>
+              <p:ext uri="{386F3935-93C4-4BCD-93E2-E3B085C9AB24}">
+                <p16:designElem xmlns:p16="http://schemas.microsoft.com/office/powerpoint/2015/main" val="1"/>
+              </p:ext>
+            </p:extLst>
+          </p:nvPr>
+        </p:nvSpPr>
+        <p:spPr>
+          <a:xfrm>
+            <a:off x="447817" y="5141974"/>
+            <a:ext cx="11290860" cy="1258827"/>
+          </a:xfrm>
+          <a:prstGeom prst="rect">
+            <a:avLst/>
+          </a:prstGeom>
+          <a:solidFill>
+            <a:schemeClr val="accent1"/>
+          </a:solidFill>
+          <a:ln>
+            <a:noFill/>
+          </a:ln>
+          <a:effectLst/>
+        </p:spPr>
+        <p:style>
+          <a:lnRef idx="1">
+            <a:schemeClr val="accent1"/>
+          </a:lnRef>
+          <a:fillRef idx="3">
+            <a:schemeClr val="accent1"/>
+          </a:fillRef>
+          <a:effectRef idx="2">
+            <a:schemeClr val="accent1"/>
+          </a:effectRef>
+          <a:fontRef idx="minor">
+            <a:schemeClr val="lt1"/>
+          </a:fontRef>
+        </p:style>
+      </p:sp>
+      <p:sp>
+        <p:nvSpPr>
+          <p:cNvPr id="2" name="Título 1">
+            <a:extLst>
+              <a:ext uri="{FF2B5EF4-FFF2-40B4-BE49-F238E27FC236}">
+                <a16:creationId xmlns:a16="http://schemas.microsoft.com/office/drawing/2014/main" id="{5B040558-A365-4CCE-92FA-5A48CD98F9C9}"/>
+              </a:ext>
+            </a:extLst>
+          </p:cNvPr>
+          <p:cNvSpPr>
+            <a:spLocks noGrp="1"/>
+          </p:cNvSpPr>
+          <p:nvPr>
+            <p:ph type="title"/>
+          </p:nvPr>
+        </p:nvSpPr>
+        <p:spPr>
+          <a:xfrm>
+            <a:off x="581192" y="5264487"/>
+            <a:ext cx="11029616" cy="718870"/>
+          </a:xfrm>
+        </p:spPr>
+        <p:txBody>
+          <a:bodyPr rtlCol="0">
+            <a:normAutofit/>
+          </a:bodyPr>
+          <a:lstStyle/>
+          <a:p>
+            <a:pPr rtl="0"/>
+            <a:r>
+              <a:rPr lang="es-ES" dirty="0">
+                <a:solidFill>
+                  <a:srgbClr val="FFFEFF"/>
+                </a:solidFill>
+              </a:rPr>
+              <a:t>Planteamiento del problema de investigación</a:t>
+            </a:r>
+          </a:p>
+        </p:txBody>
+      </p:sp>
+      <p:sp>
+        <p:nvSpPr>
+          <p:cNvPr id="6" name="CuadroTexto 5">
+            <a:extLst>
+              <a:ext uri="{FF2B5EF4-FFF2-40B4-BE49-F238E27FC236}">
+                <a16:creationId xmlns:a16="http://schemas.microsoft.com/office/drawing/2014/main" id="{7FEA9528-9856-4AA9-8901-D657431FB483}"/>
+              </a:ext>
+            </a:extLst>
+          </p:cNvPr>
+          <p:cNvSpPr txBox="1"/>
+          <p:nvPr/>
+        </p:nvSpPr>
+        <p:spPr>
+          <a:xfrm>
+            <a:off x="885371" y="1018912"/>
+            <a:ext cx="10725437" cy="4031873"/>
+          </a:xfrm>
+          <a:prstGeom prst="rect">
+            <a:avLst/>
+          </a:prstGeom>
+          <a:noFill/>
+        </p:spPr>
+        <p:txBody>
+          <a:bodyPr wrap="square" rtlCol="0">
+            <a:spAutoFit/>
+          </a:bodyPr>
+          <a:lstStyle/>
+          <a:p>
+            <a:r>
+              <a:rPr lang="es-MX" sz="3200" dirty="0"/>
+              <a:t>Consiste en analizar, una sucesión de árboles </a:t>
+            </a:r>
+            <a:r>
+              <a:rPr lang="es-MX" sz="3200" dirty="0" err="1"/>
+              <a:t>filogenómicos</a:t>
+            </a:r>
+            <a:r>
+              <a:rPr lang="es-MX" sz="3200" dirty="0"/>
+              <a:t> construidos a partir de diferentes valores de e-</a:t>
+            </a:r>
+            <a:r>
+              <a:rPr lang="es-MX" sz="3200" dirty="0" err="1"/>
+              <a:t>value</a:t>
+            </a:r>
+            <a:r>
+              <a:rPr lang="es-MX" sz="3200" dirty="0"/>
+              <a:t> del software BLAST,  que establecen diferentes valores de calidad de los mejores aciertos bidireccionales entre parejas de proteínas de organismos en estudio, mediante la implementación de una distancia entre árboles que nos permita hallar un árbol </a:t>
+            </a:r>
+            <a:r>
+              <a:rPr lang="es-MX" sz="3200" dirty="0" err="1"/>
+              <a:t>filogenómico</a:t>
+            </a:r>
+            <a:r>
+              <a:rPr lang="es-MX" sz="3200" dirty="0"/>
+              <a:t> límite en la sucesión antes mencionada.</a:t>
+            </a:r>
+          </a:p>
+        </p:txBody>
+      </p:sp>
+    </p:spTree>
+    <p:extLst>
+      <p:ext uri="{BB962C8B-B14F-4D97-AF65-F5344CB8AC3E}">
+        <p14:creationId xmlns:p14="http://schemas.microsoft.com/office/powerpoint/2010/main" val="1703342593"/>
+      </p:ext>
+    </p:extLst>
+  </p:cSld>
+  <p:clrMapOvr>
+    <a:masterClrMapping/>
+  </p:clrMapOvr>
+</p:sld>
+</file>
+
+<file path=ppt/slides/slide3.xml><?xml version="1.0" encoding="utf-8"?>
+<p:sld xmlns:a="http://schemas.openxmlformats.org/drawingml/2006/main" xmlns:r="http://schemas.openxmlformats.org/officeDocument/2006/relationships" xmlns:p="http://schemas.openxmlformats.org/presentationml/2006/main">
+  <p:cSld>
+    <p:bg>
+      <p:bgPr>
+        <a:solidFill>
+          <a:schemeClr val="bg1"/>
+        </a:solidFill>
+        <a:effectLst/>
+      </p:bgPr>
+    </p:bg>
+    <p:spTree>
+      <p:nvGrpSpPr>
+        <p:cNvPr id="1" name=""/>
+        <p:cNvGrpSpPr/>
+        <p:nvPr/>
+      </p:nvGrpSpPr>
+      <p:grpSpPr>
+        <a:xfrm>
+          <a:off x="0" y="0"/>
+          <a:ext cx="0" cy="0"/>
+          <a:chOff x="0" y="0"/>
+          <a:chExt cx="0" cy="0"/>
+        </a:xfrm>
+      </p:grpSpPr>
+      <p:sp>
+        <p:nvSpPr>
+          <p:cNvPr id="2" name="Título 1">
+            <a:extLst>
+              <a:ext uri="{FF2B5EF4-FFF2-40B4-BE49-F238E27FC236}">
+                <a16:creationId xmlns:a16="http://schemas.microsoft.com/office/drawing/2014/main" id="{921633EB-7DCB-4DDC-80AF-C885A3EE1245}"/>
+              </a:ext>
+            </a:extLst>
+          </p:cNvPr>
+          <p:cNvSpPr>
+            <a:spLocks noGrp="1"/>
+          </p:cNvSpPr>
+          <p:nvPr>
+            <p:ph type="title"/>
+          </p:nvPr>
+        </p:nvSpPr>
+        <p:spPr/>
+        <p:txBody>
+          <a:bodyPr rtlCol="0"/>
+          <a:lstStyle/>
+          <a:p>
+            <a:pPr rtl="0"/>
+            <a:r>
+              <a:rPr lang="es-ES" dirty="0"/>
+              <a:t>Objetivos</a:t>
+            </a:r>
+          </a:p>
+        </p:txBody>
+      </p:sp>
+      <p:sp>
+        <p:nvSpPr>
+          <p:cNvPr id="7" name="Rectángulo 6">
+            <a:extLst>
+              <a:ext uri="{FF2B5EF4-FFF2-40B4-BE49-F238E27FC236}">
+                <a16:creationId xmlns:a16="http://schemas.microsoft.com/office/drawing/2014/main" id="{89597A2D-CCA7-48B6-9C74-422508439B0B}"/>
+              </a:ext>
+            </a:extLst>
+          </p:cNvPr>
+          <p:cNvSpPr/>
+          <p:nvPr/>
+        </p:nvSpPr>
+        <p:spPr>
+          <a:xfrm>
+            <a:off x="928914" y="1959427"/>
+            <a:ext cx="10334172" cy="4789003"/>
+          </a:xfrm>
+          <a:prstGeom prst="rect">
+            <a:avLst/>
+          </a:prstGeom>
+        </p:spPr>
+        <p:txBody>
+          <a:bodyPr wrap="square">
+            <a:spAutoFit/>
+          </a:bodyPr>
+          <a:lstStyle/>
+          <a:p>
+            <a:pPr marL="6350" marR="35560" indent="-6350" algn="just">
+              <a:lnSpc>
+                <a:spcPct val="103000"/>
+              </a:lnSpc>
+              <a:spcBef>
+                <a:spcPts val="200"/>
+              </a:spcBef>
+              <a:spcAft>
+                <a:spcPts val="0"/>
+              </a:spcAft>
+            </a:pPr>
+            <a:r>
+              <a:rPr lang="es-MX" sz="2400" b="1" dirty="0">
+                <a:solidFill>
+                  <a:srgbClr val="2F5496"/>
+                </a:solidFill>
+                <a:latin typeface="Calibri Light" panose="020F0302020204030204" pitchFamily="34" charset="0"/>
+                <a:ea typeface="Times New Roman" panose="02020603050405020304" pitchFamily="18" charset="0"/>
+                <a:cs typeface="Times New Roman" panose="02020603050405020304" pitchFamily="18" charset="0"/>
+              </a:rPr>
+              <a:t>	</a:t>
+            </a:r>
+            <a:r>
+              <a:rPr lang="es-MX" sz="2800" b="1" dirty="0">
+                <a:solidFill>
+                  <a:srgbClr val="2F5496"/>
+                </a:solidFill>
+                <a:latin typeface="Calibri Light" panose="020F0302020204030204" pitchFamily="34" charset="0"/>
+                <a:ea typeface="Times New Roman" panose="02020603050405020304" pitchFamily="18" charset="0"/>
+                <a:cs typeface="Times New Roman" panose="02020603050405020304" pitchFamily="18" charset="0"/>
+              </a:rPr>
+              <a:t>Objetivo General</a:t>
+            </a:r>
+          </a:p>
+          <a:p>
+            <a:pPr marL="285750" marR="35560" indent="-285750" algn="just">
+              <a:lnSpc>
+                <a:spcPct val="103000"/>
+              </a:lnSpc>
+              <a:spcAft>
+                <a:spcPts val="830"/>
+              </a:spcAft>
+              <a:buFont typeface="Wingdings" panose="05000000000000000000" pitchFamily="2" charset="2"/>
+              <a:buChar char="Ø"/>
+            </a:pPr>
+            <a:r>
+              <a:rPr lang="es-MX" sz="2000" dirty="0">
+                <a:solidFill>
+                  <a:srgbClr val="000000"/>
+                </a:solidFill>
+                <a:latin typeface="Calibri" panose="020F0502020204030204" pitchFamily="34" charset="0"/>
+                <a:ea typeface="Calibri" panose="020F0502020204030204" pitchFamily="34" charset="0"/>
+              </a:rPr>
+              <a:t>Analizar una sucesión de árboles </a:t>
+            </a:r>
+            <a:r>
+              <a:rPr lang="es-MX" sz="2000" dirty="0" err="1">
+                <a:solidFill>
+                  <a:srgbClr val="000000"/>
+                </a:solidFill>
+                <a:latin typeface="Calibri" panose="020F0502020204030204" pitchFamily="34" charset="0"/>
+                <a:ea typeface="Calibri" panose="020F0502020204030204" pitchFamily="34" charset="0"/>
+              </a:rPr>
+              <a:t>filogenómicos</a:t>
+            </a:r>
+            <a:r>
+              <a:rPr lang="es-MX" sz="2000" dirty="0">
+                <a:solidFill>
+                  <a:srgbClr val="000000"/>
+                </a:solidFill>
+                <a:latin typeface="Calibri" panose="020F0502020204030204" pitchFamily="34" charset="0"/>
+                <a:ea typeface="Calibri" panose="020F0502020204030204" pitchFamily="34" charset="0"/>
+              </a:rPr>
+              <a:t> construida a través de los e-valores del programa BLAST utilizando una distancia del tipo diferencia simétrica que nos permita definir en esa sucesión un árbol </a:t>
+            </a:r>
+            <a:r>
+              <a:rPr lang="es-MX" sz="2000" dirty="0" err="1">
+                <a:solidFill>
+                  <a:srgbClr val="000000"/>
+                </a:solidFill>
+                <a:latin typeface="Calibri" panose="020F0502020204030204" pitchFamily="34" charset="0"/>
+                <a:ea typeface="Calibri" panose="020F0502020204030204" pitchFamily="34" charset="0"/>
+              </a:rPr>
+              <a:t>filogenómico</a:t>
+            </a:r>
+            <a:r>
+              <a:rPr lang="es-MX" sz="2000" dirty="0">
+                <a:solidFill>
+                  <a:srgbClr val="000000"/>
+                </a:solidFill>
+                <a:latin typeface="Calibri" panose="020F0502020204030204" pitchFamily="34" charset="0"/>
+                <a:ea typeface="Calibri" panose="020F0502020204030204" pitchFamily="34" charset="0"/>
+              </a:rPr>
+              <a:t> límite. </a:t>
+            </a:r>
+          </a:p>
+          <a:p>
+            <a:pPr marL="6350" marR="35560" indent="-6350" algn="just">
+              <a:lnSpc>
+                <a:spcPct val="103000"/>
+              </a:lnSpc>
+              <a:spcBef>
+                <a:spcPts val="200"/>
+              </a:spcBef>
+              <a:spcAft>
+                <a:spcPts val="0"/>
+              </a:spcAft>
+            </a:pPr>
+            <a:r>
+              <a:rPr lang="es-MX" sz="2800" b="1" dirty="0">
+                <a:solidFill>
+                  <a:srgbClr val="2F5496"/>
+                </a:solidFill>
+                <a:latin typeface="Calibri Light" panose="020F0302020204030204" pitchFamily="34" charset="0"/>
+                <a:ea typeface="Times New Roman" panose="02020603050405020304" pitchFamily="18" charset="0"/>
+                <a:cs typeface="Times New Roman" panose="02020603050405020304" pitchFamily="18" charset="0"/>
+              </a:rPr>
+              <a:t>Objetivos específicos</a:t>
+            </a:r>
+          </a:p>
+          <a:p>
+            <a:pPr marL="285750" marR="35560" indent="-285750" algn="just">
+              <a:lnSpc>
+                <a:spcPct val="103000"/>
+              </a:lnSpc>
+              <a:spcAft>
+                <a:spcPts val="830"/>
+              </a:spcAft>
+              <a:buFont typeface="Wingdings" panose="05000000000000000000" pitchFamily="2" charset="2"/>
+              <a:buChar char="Ø"/>
+            </a:pPr>
+            <a:r>
+              <a:rPr lang="es-MX" sz="2000" dirty="0">
+                <a:solidFill>
+                  <a:srgbClr val="000000"/>
+                </a:solidFill>
+                <a:latin typeface="Calibri" panose="020F0502020204030204" pitchFamily="34" charset="0"/>
+                <a:ea typeface="Calibri" panose="020F0502020204030204" pitchFamily="34" charset="0"/>
+              </a:rPr>
+              <a:t>Seleccionar una distancia del tipo diferencia simétrica adecuada para detectar las diferencias entre árboles </a:t>
+            </a:r>
+            <a:r>
+              <a:rPr lang="es-MX" sz="2000" dirty="0" err="1">
+                <a:solidFill>
+                  <a:srgbClr val="000000"/>
+                </a:solidFill>
+                <a:latin typeface="Calibri" panose="020F0502020204030204" pitchFamily="34" charset="0"/>
+                <a:ea typeface="Calibri" panose="020F0502020204030204" pitchFamily="34" charset="0"/>
+              </a:rPr>
+              <a:t>fillogenómicos</a:t>
+            </a:r>
+            <a:r>
+              <a:rPr lang="es-MX" sz="2000" dirty="0">
+                <a:solidFill>
+                  <a:srgbClr val="000000"/>
+                </a:solidFill>
+                <a:latin typeface="Calibri" panose="020F0502020204030204" pitchFamily="34" charset="0"/>
+                <a:ea typeface="Calibri" panose="020F0502020204030204" pitchFamily="34" charset="0"/>
+              </a:rPr>
+              <a:t>.</a:t>
+            </a:r>
+          </a:p>
+          <a:p>
+            <a:pPr marL="285750" marR="35560" indent="-285750" algn="just">
+              <a:lnSpc>
+                <a:spcPct val="103000"/>
+              </a:lnSpc>
+              <a:spcAft>
+                <a:spcPts val="830"/>
+              </a:spcAft>
+              <a:buFont typeface="Wingdings" panose="05000000000000000000" pitchFamily="2" charset="2"/>
+              <a:buChar char="Ø"/>
+            </a:pPr>
+            <a:r>
+              <a:rPr lang="es-MX" sz="2000" dirty="0">
+                <a:solidFill>
+                  <a:srgbClr val="000000"/>
+                </a:solidFill>
+                <a:latin typeface="Calibri" panose="020F0502020204030204" pitchFamily="34" charset="0"/>
+                <a:ea typeface="Calibri" panose="020F0502020204030204" pitchFamily="34" charset="0"/>
+              </a:rPr>
+              <a:t>Implementar un algoritmo que calcule esa distancia entre dos árboles filogenomicos utilizando el formato </a:t>
+            </a:r>
+            <a:r>
+              <a:rPr lang="es-MX" sz="2000" dirty="0" err="1">
+                <a:solidFill>
+                  <a:srgbClr val="000000"/>
+                </a:solidFill>
+                <a:latin typeface="Calibri" panose="020F0502020204030204" pitchFamily="34" charset="0"/>
+                <a:ea typeface="Calibri" panose="020F0502020204030204" pitchFamily="34" charset="0"/>
+              </a:rPr>
+              <a:t>Newick</a:t>
+            </a:r>
+            <a:r>
+              <a:rPr lang="es-MX" sz="2000" dirty="0">
+                <a:solidFill>
+                  <a:srgbClr val="000000"/>
+                </a:solidFill>
+                <a:latin typeface="Calibri" panose="020F0502020204030204" pitchFamily="34" charset="0"/>
+                <a:ea typeface="Calibri" panose="020F0502020204030204" pitchFamily="34" charset="0"/>
+              </a:rPr>
+              <a:t> para cada par de árboles consecutivos en la sucesión de árboles basada en el e-valor de BLAST.</a:t>
+            </a:r>
+          </a:p>
+          <a:p>
+            <a:pPr marL="285750" marR="35560" indent="-285750" algn="just">
+              <a:lnSpc>
+                <a:spcPct val="103000"/>
+              </a:lnSpc>
+              <a:spcAft>
+                <a:spcPts val="830"/>
+              </a:spcAft>
+              <a:buFont typeface="Wingdings" panose="05000000000000000000" pitchFamily="2" charset="2"/>
+              <a:buChar char="Ø"/>
+            </a:pPr>
+            <a:r>
+              <a:rPr lang="es-MX" sz="2000" dirty="0">
+                <a:solidFill>
+                  <a:srgbClr val="000000"/>
+                </a:solidFill>
+                <a:latin typeface="Calibri" panose="020F0502020204030204" pitchFamily="34" charset="0"/>
+                <a:ea typeface="Calibri" panose="020F0502020204030204" pitchFamily="34" charset="0"/>
+              </a:rPr>
+              <a:t>Encontrar el árbol limite, entendiéndose por aquel que a partir de un e-valor de exigencia de los mejores aciertos bidireccionales entre parejas de proteínas de organismos en estudio, la distancia entre árboles sucesivos al árbol límite tiende a cero.</a:t>
+            </a:r>
+          </a:p>
+        </p:txBody>
+      </p:sp>
+    </p:spTree>
+    <p:extLst>
+      <p:ext uri="{BB962C8B-B14F-4D97-AF65-F5344CB8AC3E}">
+        <p14:creationId xmlns:p14="http://schemas.microsoft.com/office/powerpoint/2010/main" val="497607547"/>
+      </p:ext>
+    </p:extLst>
+  </p:cSld>
+  <p:clrMapOvr>
+    <a:masterClrMapping/>
+  </p:clrMapOvr>
+</p:sld>
+</file>
+
+<file path=ppt/slides/slide4.xml><?xml version="1.0" encoding="utf-8"?>
+<p:sld xmlns:a="http://schemas.openxmlformats.org/drawingml/2006/main" xmlns:r="http://schemas.openxmlformats.org/officeDocument/2006/relationships" xmlns:p="http://schemas.openxmlformats.org/presentationml/2006/main">
+  <p:cSld>
+    <p:spTree>
+      <p:nvGrpSpPr>
+        <p:cNvPr id="1" name=""/>
+        <p:cNvGrpSpPr/>
+        <p:nvPr/>
+      </p:nvGrpSpPr>
+      <p:grpSpPr>
+        <a:xfrm>
+          <a:off x="0" y="0"/>
+          <a:ext cx="0" cy="0"/>
+          <a:chOff x="0" y="0"/>
+          <a:chExt cx="0" cy="0"/>
+        </a:xfrm>
+      </p:grpSpPr>
+      <p:sp>
+        <p:nvSpPr>
+          <p:cNvPr id="2" name="Título 1">
+            <a:extLst>
+              <a:ext uri="{FF2B5EF4-FFF2-40B4-BE49-F238E27FC236}">
+                <a16:creationId xmlns:a16="http://schemas.microsoft.com/office/drawing/2014/main" id="{A3A2BF2F-30E1-44EF-BCBB-B8ED22C94F45}"/>
+              </a:ext>
+            </a:extLst>
+          </p:cNvPr>
+          <p:cNvSpPr>
+            <a:spLocks noGrp="1"/>
+          </p:cNvSpPr>
+          <p:nvPr>
+            <p:ph type="title"/>
+          </p:nvPr>
+        </p:nvSpPr>
+        <p:spPr/>
+        <p:txBody>
+          <a:bodyPr/>
+          <a:lstStyle/>
+          <a:p>
+            <a:r>
+              <a:rPr lang="es-MX" dirty="0"/>
+              <a:t>Pasos metodológicos de la investigación</a:t>
+            </a:r>
+          </a:p>
+        </p:txBody>
+      </p:sp>
+      <p:sp>
+        <p:nvSpPr>
+          <p:cNvPr id="5" name="AutoShape 2">
+            <a:extLst>
+              <a:ext uri="{FF2B5EF4-FFF2-40B4-BE49-F238E27FC236}">
+                <a16:creationId xmlns:a16="http://schemas.microsoft.com/office/drawing/2014/main" id="{F6CF4ED8-3953-4428-BDBE-A69027FFFF9A}"/>
+              </a:ext>
+            </a:extLst>
+          </p:cNvPr>
+          <p:cNvSpPr>
+            <a:spLocks noChangeAspect="1" noChangeArrowheads="1"/>
+          </p:cNvSpPr>
+          <p:nvPr/>
+        </p:nvSpPr>
+        <p:spPr bwMode="auto">
+          <a:xfrm>
+            <a:off x="5943600" y="3276600"/>
+            <a:ext cx="304800" cy="304800"/>
+          </a:xfrm>
+          <a:prstGeom prst="rect">
+            <a:avLst/>
+          </a:prstGeom>
+          <a:noFill/>
+          <a:extLst>
+            <a:ext uri="{909E8E84-426E-40DD-AFC4-6F175D3DCCD1}">
+              <a14:hiddenFill xmlns:a14="http://schemas.microsoft.com/office/drawing/2010/main">
+                <a:solidFill>
+                  <a:srgbClr val="FFFFFF"/>
+                </a:solidFill>
+              </a14:hiddenFill>
+            </a:ext>
+          </a:extLst>
+        </p:spPr>
+        <p:txBody>
+          <a:bodyPr vert="horz" wrap="square" lIns="91440" tIns="45720" rIns="91440" bIns="45720" numCol="1" anchor="t" anchorCtr="0" compatLnSpc="1">
+            <a:prstTxWarp prst="textNoShape">
+              <a:avLst/>
+            </a:prstTxWarp>
+          </a:bodyPr>
+          <a:lstStyle/>
+          <a:p>
+            <a:endParaRPr lang="es-MX"/>
+          </a:p>
+        </p:txBody>
+      </p:sp>
+      <p:sp>
+        <p:nvSpPr>
+          <p:cNvPr id="3" name="CuadroTexto 2">
+            <a:extLst>
+              <a:ext uri="{FF2B5EF4-FFF2-40B4-BE49-F238E27FC236}">
+                <a16:creationId xmlns:a16="http://schemas.microsoft.com/office/drawing/2014/main" id="{0D391379-11DC-4D67-B8DB-3E3F901EAEDB}"/>
+              </a:ext>
+            </a:extLst>
+          </p:cNvPr>
+          <p:cNvSpPr txBox="1"/>
+          <p:nvPr/>
+        </p:nvSpPr>
+        <p:spPr>
+          <a:xfrm>
+            <a:off x="412689" y="2435023"/>
+            <a:ext cx="11366621" cy="3693319"/>
+          </a:xfrm>
+          <a:prstGeom prst="rect">
+            <a:avLst/>
+          </a:prstGeom>
+          <a:noFill/>
+        </p:spPr>
+        <p:txBody>
+          <a:bodyPr wrap="square" rtlCol="0">
+            <a:spAutoFit/>
+          </a:bodyPr>
+          <a:lstStyle/>
+          <a:p>
+            <a:pPr marL="285750" indent="-285750">
+              <a:buFont typeface="Wingdings" panose="05000000000000000000" pitchFamily="2" charset="2"/>
+              <a:buChar char="ü"/>
+            </a:pPr>
+            <a:r>
+              <a:rPr lang="es-MX" dirty="0"/>
+              <a:t>Elegir un tipo de distancia para comparar árboles </a:t>
+            </a:r>
+            <a:r>
+              <a:rPr lang="es-MX" dirty="0" err="1"/>
+              <a:t>filogenómicos</a:t>
+            </a:r>
+            <a:r>
+              <a:rPr lang="es-MX" dirty="0"/>
+              <a:t>.</a:t>
+            </a:r>
+          </a:p>
+          <a:p>
+            <a:pPr marL="285750" indent="-285750">
+              <a:buFont typeface="Wingdings" panose="05000000000000000000" pitchFamily="2" charset="2"/>
+              <a:buChar char="ü"/>
+            </a:pPr>
+            <a:endParaRPr lang="es-MX" dirty="0"/>
+          </a:p>
+          <a:p>
+            <a:pPr marL="285750" indent="-285750">
+              <a:buFont typeface="Wingdings" panose="05000000000000000000" pitchFamily="2" charset="2"/>
+              <a:buChar char="ü"/>
+            </a:pPr>
+            <a:r>
+              <a:rPr lang="es-MX" dirty="0"/>
+              <a:t>Establecer correctamente los parámetros en el programa que llama a MEGA para ejecutar el árbol </a:t>
+            </a:r>
+            <a:r>
+              <a:rPr lang="es-MX" dirty="0" err="1"/>
+              <a:t>filogenómico</a:t>
+            </a:r>
+            <a:r>
+              <a:rPr lang="es-MX" dirty="0"/>
+              <a:t> correspondiente al método seleccionado y a la matriz dada por datos.</a:t>
+            </a:r>
+          </a:p>
+          <a:p>
+            <a:pPr marL="285750" indent="-285750">
+              <a:buFont typeface="Wingdings" panose="05000000000000000000" pitchFamily="2" charset="2"/>
+              <a:buChar char="ü"/>
+            </a:pPr>
+            <a:endParaRPr lang="es-MX" dirty="0"/>
+          </a:p>
+          <a:p>
+            <a:pPr marL="285750" indent="-285750">
+              <a:buFont typeface="Wingdings" panose="05000000000000000000" pitchFamily="2" charset="2"/>
+              <a:buChar char="ü"/>
+            </a:pPr>
+            <a:r>
+              <a:rPr lang="es-MX" dirty="0"/>
+              <a:t>Diseñar e implementar un  algoritmo para el calculo de las distancias entre dos árboles filogenomicos</a:t>
+            </a:r>
+          </a:p>
+          <a:p>
+            <a:pPr marL="285750" indent="-285750">
+              <a:buFont typeface="Wingdings" panose="05000000000000000000" pitchFamily="2" charset="2"/>
+              <a:buChar char="ü"/>
+            </a:pPr>
+            <a:endParaRPr lang="es-MX" dirty="0"/>
+          </a:p>
+          <a:p>
+            <a:pPr marL="285750" indent="-285750">
+              <a:buFont typeface="Wingdings" panose="05000000000000000000" pitchFamily="2" charset="2"/>
+              <a:buChar char="ü"/>
+            </a:pPr>
+            <a:r>
+              <a:rPr lang="es-MX" dirty="0"/>
+              <a:t>Diseñar e implementar la metodología de encontrar el árbol </a:t>
+            </a:r>
+            <a:r>
+              <a:rPr lang="es-MX" dirty="0" err="1"/>
+              <a:t>filogenómico</a:t>
+            </a:r>
+            <a:r>
+              <a:rPr lang="es-MX" dirty="0"/>
+              <a:t> límite en una sucesión de árboles  adecuada para encontrar el e-valor en BLAST de los mejores aciertos bidireccionales entre proteínas .</a:t>
+            </a:r>
+          </a:p>
+          <a:p>
+            <a:pPr marL="285750" indent="-285750">
+              <a:buFont typeface="Wingdings" panose="05000000000000000000" pitchFamily="2" charset="2"/>
+              <a:buChar char="ü"/>
+            </a:pPr>
+            <a:endParaRPr lang="es-MX" dirty="0"/>
+          </a:p>
+          <a:p>
+            <a:pPr marL="285750" indent="-285750">
+              <a:buFont typeface="Wingdings" panose="05000000000000000000" pitchFamily="2" charset="2"/>
+              <a:buChar char="ü"/>
+            </a:pPr>
+            <a:r>
+              <a:rPr lang="es-MX" dirty="0"/>
+              <a:t>Diseñar  e implementar un experimento  para el análisis .</a:t>
+            </a:r>
+            <a:br>
+              <a:rPr lang="es-MX" dirty="0"/>
+            </a:br>
+            <a:br>
+              <a:rPr lang="es-MX" dirty="0"/>
+            </a:br>
+            <a:endParaRPr lang="es-MX" dirty="0"/>
+          </a:p>
+        </p:txBody>
+      </p:sp>
+    </p:spTree>
+    <p:extLst>
+      <p:ext uri="{BB962C8B-B14F-4D97-AF65-F5344CB8AC3E}">
+        <p14:creationId xmlns:p14="http://schemas.microsoft.com/office/powerpoint/2010/main" val="292639315"/>
+      </p:ext>
+    </p:extLst>
+  </p:cSld>
+  <p:clrMapOvr>
+    <a:masterClrMapping/>
+  </p:clrMapOvr>
+</p:sld>
+</file>
+
+<file path=ppt/slides/slide5.xml><?xml version="1.0" encoding="utf-8"?>
+<p:sld xmlns:a="http://schemas.openxmlformats.org/drawingml/2006/main" xmlns:r="http://schemas.openxmlformats.org/officeDocument/2006/relationships" xmlns:p="http://schemas.openxmlformats.org/presentationml/2006/main">
+  <p:cSld>
+    <p:spTree>
+      <p:nvGrpSpPr>
+        <p:cNvPr id="1" name=""/>
+        <p:cNvGrpSpPr/>
+        <p:nvPr/>
+      </p:nvGrpSpPr>
+      <p:grpSpPr>
+        <a:xfrm>
+          <a:off x="0" y="0"/>
+          <a:ext cx="0" cy="0"/>
+          <a:chOff x="0" y="0"/>
+          <a:chExt cx="0" cy="0"/>
+        </a:xfrm>
+      </p:grpSpPr>
+      <p:sp>
+        <p:nvSpPr>
+          <p:cNvPr id="2" name="Título 1">
+            <a:extLst>
+              <a:ext uri="{FF2B5EF4-FFF2-40B4-BE49-F238E27FC236}">
+                <a16:creationId xmlns:a16="http://schemas.microsoft.com/office/drawing/2014/main" id="{14426178-E9D4-4B09-AB71-88BC30D23B98}"/>
+              </a:ext>
+            </a:extLst>
+          </p:cNvPr>
+          <p:cNvSpPr>
+            <a:spLocks noGrp="1"/>
+          </p:cNvSpPr>
+          <p:nvPr>
+            <p:ph type="title"/>
+          </p:nvPr>
+        </p:nvSpPr>
+        <p:spPr/>
+        <p:txBody>
+          <a:bodyPr/>
+          <a:lstStyle/>
+          <a:p>
+            <a:endParaRPr lang="es-MX"/>
+          </a:p>
+        </p:txBody>
+      </p:sp>
+      <p:sp>
+        <p:nvSpPr>
+          <p:cNvPr id="5" name="CuadroTexto 4">
+            <a:extLst>
+              <a:ext uri="{FF2B5EF4-FFF2-40B4-BE49-F238E27FC236}">
+                <a16:creationId xmlns:a16="http://schemas.microsoft.com/office/drawing/2014/main" id="{D3DC05FA-ABBB-459E-8170-8DED9DB56F5E}"/>
+              </a:ext>
+            </a:extLst>
+          </p:cNvPr>
+          <p:cNvSpPr txBox="1"/>
+          <p:nvPr/>
+        </p:nvSpPr>
+        <p:spPr>
+          <a:xfrm>
+            <a:off x="374004" y="2189582"/>
+            <a:ext cx="7585772" cy="923330"/>
+          </a:xfrm>
+          <a:prstGeom prst="rect">
+            <a:avLst/>
+          </a:prstGeom>
+          <a:noFill/>
+        </p:spPr>
+        <p:txBody>
+          <a:bodyPr wrap="square" rtlCol="0">
+            <a:spAutoFit/>
+          </a:bodyPr>
+          <a:lstStyle/>
+          <a:p>
+            <a:r>
+              <a:rPr lang="es-MX" dirty="0"/>
+              <a:t>Se llego a que la distancia del tipo diferencia simétrica  es  “ “ para  analizar porque toma las diferencias de un árbol respecto a otro y viceversa,  Ejemplo para  paso 1</a:t>
+            </a:r>
+          </a:p>
+        </p:txBody>
+      </p:sp>
+    </p:spTree>
+    <p:extLst>
+      <p:ext uri="{BB962C8B-B14F-4D97-AF65-F5344CB8AC3E}">
+        <p14:creationId xmlns:p14="http://schemas.microsoft.com/office/powerpoint/2010/main" val="455625261"/>
+      </p:ext>
+    </p:extLst>
+  </p:cSld>
+  <p:clrMapOvr>
+    <a:masterClrMapping/>
+  </p:clrMapOvr>
+</p:sld>
+</file>
+
+<file path=ppt/slides/slide6.xml><?xml version="1.0" encoding="utf-8"?>
+<p:sld xmlns:a="http://schemas.openxmlformats.org/drawingml/2006/main" xmlns:r="http://schemas.openxmlformats.org/officeDocument/2006/relationships" xmlns:p="http://schemas.openxmlformats.org/presentationml/2006/main">
+  <p:cSld>
+    <p:spTree>
+      <p:nvGrpSpPr>
+        <p:cNvPr id="1" name=""/>
+        <p:cNvGrpSpPr/>
+        <p:nvPr/>
+      </p:nvGrpSpPr>
+      <p:grpSpPr>
+        <a:xfrm>
+          <a:off x="0" y="0"/>
+          <a:ext cx="0" cy="0"/>
+          <a:chOff x="0" y="0"/>
+          <a:chExt cx="0" cy="0"/>
+        </a:xfrm>
+      </p:grpSpPr>
+      <p:sp>
+        <p:nvSpPr>
+          <p:cNvPr id="2" name="Título 1">
+            <a:extLst>
+              <a:ext uri="{FF2B5EF4-FFF2-40B4-BE49-F238E27FC236}">
+                <a16:creationId xmlns:a16="http://schemas.microsoft.com/office/drawing/2014/main" id="{0E05B5A1-6F31-4108-B66B-07DC396D9BBD}"/>
+              </a:ext>
+            </a:extLst>
+          </p:cNvPr>
+          <p:cNvSpPr>
+            <a:spLocks noGrp="1"/>
+          </p:cNvSpPr>
+          <p:nvPr>
+            <p:ph type="title"/>
+          </p:nvPr>
+        </p:nvSpPr>
+        <p:spPr/>
+        <p:txBody>
+          <a:bodyPr/>
+          <a:lstStyle/>
+          <a:p>
+            <a:endParaRPr lang="es-MX"/>
+          </a:p>
+        </p:txBody>
+      </p:sp>
+      <p:sp>
+        <p:nvSpPr>
+          <p:cNvPr id="3" name="Marcador de contenido 2">
+            <a:extLst>
+              <a:ext uri="{FF2B5EF4-FFF2-40B4-BE49-F238E27FC236}">
+                <a16:creationId xmlns:a16="http://schemas.microsoft.com/office/drawing/2014/main" id="{A5D4F961-7089-4048-BF46-8B1EC47C3AB6}"/>
+              </a:ext>
+            </a:extLst>
+          </p:cNvPr>
+          <p:cNvSpPr>
+            <a:spLocks noGrp="1"/>
+          </p:cNvSpPr>
+          <p:nvPr>
+            <p:ph sz="half" idx="1"/>
+          </p:nvPr>
+        </p:nvSpPr>
+        <p:spPr/>
+        <p:txBody>
+          <a:bodyPr/>
+          <a:lstStyle/>
+          <a:p>
+            <a:endParaRPr lang="es-MX"/>
+          </a:p>
+        </p:txBody>
+      </p:sp>
+      <p:sp>
+        <p:nvSpPr>
+          <p:cNvPr id="4" name="Marcador de contenido 3">
+            <a:extLst>
+              <a:ext uri="{FF2B5EF4-FFF2-40B4-BE49-F238E27FC236}">
+                <a16:creationId xmlns:a16="http://schemas.microsoft.com/office/drawing/2014/main" id="{3975C28C-D6FF-481C-96FA-1105DAE9FF06}"/>
+              </a:ext>
+            </a:extLst>
+          </p:cNvPr>
+          <p:cNvSpPr>
+            <a:spLocks noGrp="1"/>
+          </p:cNvSpPr>
+          <p:nvPr>
+            <p:ph sz="half" idx="2"/>
+          </p:nvPr>
+        </p:nvSpPr>
+        <p:spPr/>
+        <p:txBody>
+          <a:bodyPr/>
+          <a:lstStyle/>
+          <a:p>
+            <a:endParaRPr lang="es-MX"/>
+          </a:p>
+        </p:txBody>
+      </p:sp>
+    </p:spTree>
+    <p:extLst>
+      <p:ext uri="{BB962C8B-B14F-4D97-AF65-F5344CB8AC3E}">
+        <p14:creationId xmlns:p14="http://schemas.microsoft.com/office/powerpoint/2010/main" val="60726803"/>
+      </p:ext>
+    </p:extLst>
+  </p:cSld>
+  <p:clrMapOvr>
+    <a:masterClrMapping/>
+  </p:clrMapOvr>
+</p:sld>
+</file>
+
+<file path=ppt/slides/slide7.xml><?xml version="1.0" encoding="utf-8"?>
+<p:sld xmlns:a="http://schemas.openxmlformats.org/drawingml/2006/main" xmlns:r="http://schemas.openxmlformats.org/officeDocument/2006/relationships" xmlns:p="http://schemas.openxmlformats.org/presentationml/2006/main">
+  <p:cSld>
+    <p:spTree>
+      <p:nvGrpSpPr>
+        <p:cNvPr id="1" name=""/>
+        <p:cNvGrpSpPr/>
+        <p:nvPr/>
+      </p:nvGrpSpPr>
+      <p:grpSpPr>
+        <a:xfrm>
+          <a:off x="0" y="0"/>
+          <a:ext cx="0" cy="0"/>
+          <a:chOff x="0" y="0"/>
+          <a:chExt cx="0" cy="0"/>
+        </a:xfrm>
+      </p:grpSpPr>
+      <p:sp>
+        <p:nvSpPr>
+          <p:cNvPr id="2" name="Título 1">
+            <a:extLst>
+              <a:ext uri="{FF2B5EF4-FFF2-40B4-BE49-F238E27FC236}">
+                <a16:creationId xmlns:a16="http://schemas.microsoft.com/office/drawing/2014/main" id="{64C02B56-B5AD-4941-9948-BA3DF21213F2}"/>
+              </a:ext>
+            </a:extLst>
+          </p:cNvPr>
+          <p:cNvSpPr>
+            <a:spLocks noGrp="1"/>
+          </p:cNvSpPr>
+          <p:nvPr>
+            <p:ph type="title"/>
+          </p:nvPr>
+        </p:nvSpPr>
+        <p:spPr/>
+        <p:txBody>
+          <a:bodyPr/>
+          <a:lstStyle/>
+          <a:p>
+            <a:endParaRPr lang="es-MX"/>
+          </a:p>
+        </p:txBody>
+      </p:sp>
+      <p:sp>
+        <p:nvSpPr>
+          <p:cNvPr id="3" name="Marcador de contenido 2">
+            <a:extLst>
+              <a:ext uri="{FF2B5EF4-FFF2-40B4-BE49-F238E27FC236}">
+                <a16:creationId xmlns:a16="http://schemas.microsoft.com/office/drawing/2014/main" id="{DFCD9D1D-5156-4597-9FCE-30F6A8B905D9}"/>
+              </a:ext>
+            </a:extLst>
+          </p:cNvPr>
+          <p:cNvSpPr>
+            <a:spLocks noGrp="1"/>
+          </p:cNvSpPr>
+          <p:nvPr>
+            <p:ph sz="half" idx="1"/>
+          </p:nvPr>
+        </p:nvSpPr>
+        <p:spPr/>
+        <p:txBody>
+          <a:bodyPr/>
+          <a:lstStyle/>
+          <a:p>
+            <a:endParaRPr lang="es-MX"/>
+          </a:p>
+        </p:txBody>
+      </p:sp>
+      <p:sp>
+        <p:nvSpPr>
+          <p:cNvPr id="4" name="Marcador de contenido 3">
+            <a:extLst>
+              <a:ext uri="{FF2B5EF4-FFF2-40B4-BE49-F238E27FC236}">
+                <a16:creationId xmlns:a16="http://schemas.microsoft.com/office/drawing/2014/main" id="{707F55F3-CE4C-443B-B7BE-E6555B29706A}"/>
+              </a:ext>
+            </a:extLst>
+          </p:cNvPr>
+          <p:cNvSpPr>
+            <a:spLocks noGrp="1"/>
+          </p:cNvSpPr>
+          <p:nvPr>
+            <p:ph sz="half" idx="2"/>
+          </p:nvPr>
+        </p:nvSpPr>
+        <p:spPr/>
+        <p:txBody>
+          <a:bodyPr/>
+          <a:lstStyle/>
+          <a:p>
+            <a:endParaRPr lang="es-MX"/>
+          </a:p>
+        </p:txBody>
+      </p:sp>
+    </p:spTree>
+    <p:extLst>
+      <p:ext uri="{BB962C8B-B14F-4D97-AF65-F5344CB8AC3E}">
+        <p14:creationId xmlns:p14="http://schemas.microsoft.com/office/powerpoint/2010/main" val="3496182681"/>
+      </p:ext>
+    </p:extLst>
+  </p:cSld>
+  <p:clrMapOvr>
+    <a:masterClrMapping/>
+  </p:clrMapOvr>
+</p:sld>
+</file>
+
+<file path=ppt/slides/slide8.xml><?xml version="1.0" encoding="utf-8"?>
+<p:sld xmlns:a="http://schemas.openxmlformats.org/drawingml/2006/main" xmlns:r="http://schemas.openxmlformats.org/officeDocument/2006/relationships" xmlns:p="http://schemas.openxmlformats.org/presentationml/2006/main">
+  <p:cSld>
+    <p:spTree>
+      <p:nvGrpSpPr>
+        <p:cNvPr id="1" name=""/>
+        <p:cNvGrpSpPr/>
+        <p:nvPr/>
+      </p:nvGrpSpPr>
+      <p:grpSpPr>
+        <a:xfrm>
+          <a:off x="0" y="0"/>
+          <a:ext cx="0" cy="0"/>
+          <a:chOff x="0" y="0"/>
+          <a:chExt cx="0" cy="0"/>
+        </a:xfrm>
+      </p:grpSpPr>
+      <p:sp>
+        <p:nvSpPr>
+          <p:cNvPr id="2" name="Título 1">
+            <a:extLst>
+              <a:ext uri="{FF2B5EF4-FFF2-40B4-BE49-F238E27FC236}">
+                <a16:creationId xmlns:a16="http://schemas.microsoft.com/office/drawing/2014/main" id="{9585E004-4D2A-49A7-9A97-56847105614D}"/>
+              </a:ext>
+            </a:extLst>
+          </p:cNvPr>
+          <p:cNvSpPr>
+            <a:spLocks noGrp="1"/>
+          </p:cNvSpPr>
+          <p:nvPr>
+            <p:ph type="title"/>
+          </p:nvPr>
+        </p:nvSpPr>
+        <p:spPr/>
+        <p:txBody>
+          <a:bodyPr/>
+          <a:lstStyle/>
+          <a:p>
+            <a:endParaRPr lang="es-MX"/>
+          </a:p>
+        </p:txBody>
+      </p:sp>
+      <p:sp>
+        <p:nvSpPr>
+          <p:cNvPr id="3" name="Marcador de contenido 2">
+            <a:extLst>
+              <a:ext uri="{FF2B5EF4-FFF2-40B4-BE49-F238E27FC236}">
+                <a16:creationId xmlns:a16="http://schemas.microsoft.com/office/drawing/2014/main" id="{603B821C-31D5-45EA-835C-9F8F6DF68179}"/>
+              </a:ext>
+            </a:extLst>
+          </p:cNvPr>
+          <p:cNvSpPr>
+            <a:spLocks noGrp="1"/>
+          </p:cNvSpPr>
+          <p:nvPr>
+            <p:ph sz="half" idx="1"/>
+          </p:nvPr>
+        </p:nvSpPr>
+        <p:spPr/>
+        <p:txBody>
+          <a:bodyPr/>
+          <a:lstStyle/>
+          <a:p>
+            <a:endParaRPr lang="es-MX"/>
+          </a:p>
+        </p:txBody>
+      </p:sp>
+      <p:sp>
+        <p:nvSpPr>
+          <p:cNvPr id="4" name="Marcador de contenido 3">
+            <a:extLst>
+              <a:ext uri="{FF2B5EF4-FFF2-40B4-BE49-F238E27FC236}">
+                <a16:creationId xmlns:a16="http://schemas.microsoft.com/office/drawing/2014/main" id="{080B5E05-A571-4608-87D9-2A7298536F82}"/>
+              </a:ext>
+            </a:extLst>
+          </p:cNvPr>
+          <p:cNvSpPr>
+            <a:spLocks noGrp="1"/>
+          </p:cNvSpPr>
+          <p:nvPr>
+            <p:ph sz="half" idx="2"/>
+          </p:nvPr>
+        </p:nvSpPr>
+        <p:spPr/>
+        <p:txBody>
+          <a:bodyPr/>
+          <a:lstStyle/>
+          <a:p>
+            <a:endParaRPr lang="es-MX"/>
+          </a:p>
+        </p:txBody>
+      </p:sp>
+    </p:spTree>
+    <p:extLst>
+      <p:ext uri="{BB962C8B-B14F-4D97-AF65-F5344CB8AC3E}">
+        <p14:creationId xmlns:p14="http://schemas.microsoft.com/office/powerpoint/2010/main" val="105021611"/>
+      </p:ext>
+    </p:extLst>
+  </p:cSld>
+  <p:clrMapOvr>
+    <a:masterClrMapping/>
+  </p:clrMapOvr>
+</p:sld>
+</file>
+
+<file path=ppt/slides/slide9.xml><?xml version="1.0" encoding="utf-8"?>
+<p:sld xmlns:a="http://schemas.openxmlformats.org/drawingml/2006/main" xmlns:r="http://schemas.openxmlformats.org/officeDocument/2006/relationships" xmlns:p="http://schemas.openxmlformats.org/presentationml/2006/main">
+  <p:cSld>
+    <p:spTree>
+      <p:nvGrpSpPr>
+        <p:cNvPr id="1" name=""/>
+        <p:cNvGrpSpPr/>
+        <p:nvPr/>
+      </p:nvGrpSpPr>
+      <p:grpSpPr>
+        <a:xfrm>
+          <a:off x="0" y="0"/>
+          <a:ext cx="0" cy="0"/>
+          <a:chOff x="0" y="0"/>
+          <a:chExt cx="0" cy="0"/>
+        </a:xfrm>
+      </p:grpSpPr>
+      <p:sp>
+        <p:nvSpPr>
+          <p:cNvPr id="2" name="Título 1">
+            <a:extLst>
+              <a:ext uri="{FF2B5EF4-FFF2-40B4-BE49-F238E27FC236}">
+                <a16:creationId xmlns:a16="http://schemas.microsoft.com/office/drawing/2014/main" id="{091DFB34-8747-43E1-A195-CC339B9EC136}"/>
+              </a:ext>
+            </a:extLst>
+          </p:cNvPr>
+          <p:cNvSpPr>
+            <a:spLocks noGrp="1"/>
+          </p:cNvSpPr>
+          <p:nvPr>
+            <p:ph type="title"/>
+          </p:nvPr>
+        </p:nvSpPr>
+        <p:spPr/>
+        <p:txBody>
+          <a:bodyPr/>
+          <a:lstStyle/>
+          <a:p>
+            <a:endParaRPr lang="es-MX"/>
+          </a:p>
+        </p:txBody>
+      </p:sp>
+      <p:sp>
+        <p:nvSpPr>
+          <p:cNvPr id="3" name="Marcador de contenido 2">
+            <a:extLst>
+              <a:ext uri="{FF2B5EF4-FFF2-40B4-BE49-F238E27FC236}">
+                <a16:creationId xmlns:a16="http://schemas.microsoft.com/office/drawing/2014/main" id="{F42EAECB-9235-4152-9301-C84064E6AB10}"/>
+              </a:ext>
+            </a:extLst>
+          </p:cNvPr>
+          <p:cNvSpPr>
+            <a:spLocks noGrp="1"/>
+          </p:cNvSpPr>
+          <p:nvPr>
+            <p:ph sz="half" idx="1"/>
+          </p:nvPr>
+        </p:nvSpPr>
+        <p:spPr/>
+        <p:txBody>
+          <a:bodyPr/>
+          <a:lstStyle/>
+          <a:p>
+            <a:endParaRPr lang="es-MX"/>
+          </a:p>
+        </p:txBody>
+      </p:sp>
+      <p:sp>
+        <p:nvSpPr>
+          <p:cNvPr id="4" name="Marcador de contenido 3">
+            <a:extLst>
+              <a:ext uri="{FF2B5EF4-FFF2-40B4-BE49-F238E27FC236}">
+                <a16:creationId xmlns:a16="http://schemas.microsoft.com/office/drawing/2014/main" id="{A96DAF49-9286-40AC-B670-F36EC73C7BD1}"/>
+              </a:ext>
+            </a:extLst>
+          </p:cNvPr>
+          <p:cNvSpPr>
+            <a:spLocks noGrp="1"/>
+          </p:cNvSpPr>
+          <p:nvPr>
+            <p:ph sz="half" idx="2"/>
+          </p:nvPr>
+        </p:nvSpPr>
+        <p:spPr/>
+        <p:txBody>
+          <a:bodyPr/>
+          <a:lstStyle/>
+          <a:p>
+            <a:endParaRPr lang="es-MX"/>
+          </a:p>
+        </p:txBody>
+      </p:sp>
+    </p:spTree>
+    <p:extLst>
+      <p:ext uri="{BB962C8B-B14F-4D97-AF65-F5344CB8AC3E}">
+        <p14:creationId xmlns:p14="http://schemas.microsoft.com/office/powerpoint/2010/main" val="4218348571"/>
       </p:ext>
     </p:extLst>
   </p:cSld>
@@ -7666,23 +8174,6 @@
 </file>
 
 <file path=customXml/item1.xml><?xml version="1.0" encoding="utf-8"?>
-<p:properties xmlns:p="http://schemas.microsoft.com/office/2006/metadata/properties" xmlns:xsi="http://www.w3.org/2001/XMLSchema-instance" xmlns:pc="http://schemas.microsoft.com/office/infopath/2007/PartnerControls">
-  <documentManagement>
-    <MediaServiceKeyPoints xmlns="71af3243-3dd4-4a8d-8c0d-dd76da1f02a5" xsi:nil="true"/>
-  </documentManagement>
-</p:properties>
-</file>
-
-<file path=customXml/item2.xml><?xml version="1.0" encoding="utf-8"?>
-<?mso-contentType ?>
-<FormTemplates xmlns="http://schemas.microsoft.com/sharepoint/v3/contenttype/forms">
-  <Display>DocumentLibraryForm</Display>
-  <Edit>DocumentLibraryForm</Edit>
-  <New>DocumentLibraryForm</New>
-</FormTemplates>
-</file>
-
-<file path=customXml/item3.xml><?xml version="1.0" encoding="utf-8"?>
 <ct:contentTypeSchema xmlns:ct="http://schemas.microsoft.com/office/2006/metadata/contentType" xmlns:ma="http://schemas.microsoft.com/office/2006/metadata/properties/metaAttributes" ct:_="" ma:_="" ma:contentTypeName="Document" ma:contentTypeID="0x01010079F111ED35F8CC479449609E8A0923A6" ma:contentTypeVersion="11" ma:contentTypeDescription="Create a new document." ma:contentTypeScope="" ma:versionID="1c2eb7a32e66fb6e4260f3771546a5e2">
   <xsd:schema xmlns:xsd="http://www.w3.org/2001/XMLSchema" xmlns:xs="http://www.w3.org/2001/XMLSchema" xmlns:p="http://schemas.microsoft.com/office/2006/metadata/properties" xmlns:ns2="71af3243-3dd4-4a8d-8c0d-dd76da1f02a5" xmlns:ns3="16c05727-aa75-4e4a-9b5f-8a80a1165891" targetNamespace="http://schemas.microsoft.com/office/2006/metadata/properties" ma:root="true" ma:fieldsID="04e1f6479c48b08974ba73b5ca973489" ns2:_="" ns3:_="">
     <xsd:import namespace="71af3243-3dd4-4a8d-8c0d-dd76da1f02a5"/>
@@ -7893,25 +8384,24 @@
 </ct:contentTypeSchema>
 </file>
 
-<file path=customXml/itemProps1.xml><?xml version="1.0" encoding="utf-8"?>
-<ds:datastoreItem xmlns:ds="http://schemas.openxmlformats.org/officeDocument/2006/customXml" ds:itemID="{1EBC12AA-1C15-4500-BC9C-8EE83A441DE9}">
-  <ds:schemaRefs>
-    <ds:schemaRef ds:uri="http://schemas.microsoft.com/office/2006/metadata/properties"/>
-    <ds:schemaRef ds:uri="http://schemas.microsoft.com/office/infopath/2007/PartnerControls"/>
-    <ds:schemaRef ds:uri="71af3243-3dd4-4a8d-8c0d-dd76da1f02a5"/>
-  </ds:schemaRefs>
-</ds:datastoreItem>
+<file path=customXml/item2.xml><?xml version="1.0" encoding="utf-8"?>
+<?mso-contentType ?>
+<FormTemplates xmlns="http://schemas.microsoft.com/sharepoint/v3/contenttype/forms">
+  <Display>DocumentLibraryForm</Display>
+  <Edit>DocumentLibraryForm</Edit>
+  <New>DocumentLibraryForm</New>
+</FormTemplates>
 </file>
 
-<file path=customXml/itemProps2.xml><?xml version="1.0" encoding="utf-8"?>
-<ds:datastoreItem xmlns:ds="http://schemas.openxmlformats.org/officeDocument/2006/customXml" ds:itemID="{BA0CF3B2-1F0F-4FC5-8002-3E4869ABAD55}">
-  <ds:schemaRefs>
-    <ds:schemaRef ds:uri="http://schemas.microsoft.com/sharepoint/v3/contenttype/forms"/>
-  </ds:schemaRefs>
-</ds:datastoreItem>
+<file path=customXml/item3.xml><?xml version="1.0" encoding="utf-8"?>
+<p:properties xmlns:p="http://schemas.microsoft.com/office/2006/metadata/properties" xmlns:xsi="http://www.w3.org/2001/XMLSchema-instance" xmlns:pc="http://schemas.microsoft.com/office/infopath/2007/PartnerControls">
+  <documentManagement>
+    <MediaServiceKeyPoints xmlns="71af3243-3dd4-4a8d-8c0d-dd76da1f02a5" xsi:nil="true"/>
+  </documentManagement>
+</p:properties>
 </file>
 
-<file path=customXml/itemProps3.xml><?xml version="1.0" encoding="utf-8"?>
+<file path=customXml/itemProps1.xml><?xml version="1.0" encoding="utf-8"?>
 <ds:datastoreItem xmlns:ds="http://schemas.openxmlformats.org/officeDocument/2006/customXml" ds:itemID="{1F69AFF4-BB30-4BA0-AD22-82CC3C43276B}">
   <ds:schemaRefs>
     <ds:schemaRef ds:uri="http://schemas.microsoft.com/office/2006/metadata/contentType"/>
@@ -7928,4 +8418,22 @@
     <ds:schemaRef ds:uri="http://schemas.microsoft.com/internal/obd"/>
   </ds:schemaRefs>
 </ds:datastoreItem>
+</file>
+
+<file path=customXml/itemProps2.xml><?xml version="1.0" encoding="utf-8"?>
+<ds:datastoreItem xmlns:ds="http://schemas.openxmlformats.org/officeDocument/2006/customXml" ds:itemID="{BA0CF3B2-1F0F-4FC5-8002-3E4869ABAD55}">
+  <ds:schemaRefs>
+    <ds:schemaRef ds:uri="http://schemas.microsoft.com/sharepoint/v3/contenttype/forms"/>
+  </ds:schemaRefs>
+</ds:datastoreItem>
+</file>
+
+<file path=customXml/itemProps3.xml><?xml version="1.0" encoding="utf-8"?>
+<ds:datastoreItem xmlns:ds="http://schemas.openxmlformats.org/officeDocument/2006/customXml" ds:itemID="{1EBC12AA-1C15-4500-BC9C-8EE83A441DE9}">
+  <ds:schemaRefs>
+    <ds:schemaRef ds:uri="http://schemas.microsoft.com/office/2006/metadata/properties"/>
+    <ds:schemaRef ds:uri="http://schemas.microsoft.com/office/infopath/2007/PartnerControls"/>
+    <ds:schemaRef ds:uri="71af3243-3dd4-4a8d-8c0d-dd76da1f02a5"/>
+  </ds:schemaRefs>
+</ds:datastoreItem>
 </file>
</xml_diff>

<commit_message>
Se agregó test de programa
</commit_message>
<xml_diff>
--- a/DocumentosTesina/Presentación.pptx
+++ b/DocumentosTesina/Presentación.pptx
@@ -132,7 +132,7 @@
 
 <file path=ppt/commentAuthors.xml><?xml version="1.0" encoding="utf-8"?>
 <p:cmAuthorLst xmlns:a="http://schemas.openxmlformats.org/drawingml/2006/main" xmlns:r="http://schemas.openxmlformats.org/officeDocument/2006/relationships" xmlns:p="http://schemas.openxmlformats.org/presentationml/2006/main">
-  <p:cmAuthor id="2" name="Autor" initials="A" lastIdx="11" clrIdx="1"/>
+  <p:cmAuthor id="2" name="Autor" initials="A" lastIdx="17" clrIdx="1"/>
 </p:cmAuthorLst>
 </file>
 
@@ -229,6 +229,53 @@
       </p:ext>
     </p:extLst>
   </p:cm>
+  <p:cm authorId="2" dt="2020-04-19T19:25:06.254" idx="12">
+    <p:pos x="282" y="282"/>
+    <p:text>separar un paso por cada paso de la metodologia</p:text>
+    <p:extLst>
+      <p:ext uri="{C676402C-5697-4E1C-873F-D02D1690AC5C}">
+        <p15:threadingInfo xmlns:p15="http://schemas.microsoft.com/office/powerpoint/2012/main" timeZoneBias="300"/>
+      </p:ext>
+    </p:extLst>
+  </p:cm>
+  <p:cm authorId="2" dt="2020-04-19T19:26:33.123" idx="13">
+    <p:pos x="418" y="418"/>
+    <p:text>Poner ejemplo de como se hace diferencia simétrica, poner un ejemplo de Robinson-Foulds y explicar el algoritmo</p:text>
+    <p:extLst>
+      <p:ext uri="{C676402C-5697-4E1C-873F-D02D1690AC5C}">
+        <p15:threadingInfo xmlns:p15="http://schemas.microsoft.com/office/powerpoint/2012/main" timeZoneBias="300"/>
+      </p:ext>
+    </p:extLst>
+  </p:cm>
+  <p:cm authorId="2" dt="2020-04-19T19:36:51.597" idx="14">
+    <p:pos x="538" y="3107"/>
+    <p:text>Diseñar algoritmo de robinson-Fould</p:text>
+    <p:extLst>
+      <p:ext uri="{C676402C-5697-4E1C-873F-D02D1690AC5C}">
+        <p15:threadingInfo xmlns:p15="http://schemas.microsoft.com/office/powerpoint/2012/main" timeZoneBias="300"/>
+      </p:ext>
+    </p:extLst>
+  </p:cm>
+  <p:cm authorId="2" dt="2020-04-19T19:42:19.411" idx="15">
+    <p:pos x="538" y="3243"/>
+    <p:text>Buscar un pseudocodigo</p:text>
+    <p:extLst>
+      <p:ext uri="{C676402C-5697-4E1C-873F-D02D1690AC5C}">
+        <p15:threadingInfo xmlns:p15="http://schemas.microsoft.com/office/powerpoint/2012/main" timeZoneBias="300">
+          <p15:parentCm authorId="2" idx="14"/>
+        </p15:threadingInfo>
+      </p:ext>
+    </p:extLst>
+  </p:cm>
+  <p:cm authorId="2" dt="2020-04-19T19:42:41.843" idx="16">
+    <p:pos x="4259" y="1558"/>
+    <p:text>En la primera metodologia poner articulos en donde se ha usado la distancia de Robinson</p:text>
+    <p:extLst>
+      <p:ext uri="{C676402C-5697-4E1C-873F-D02D1690AC5C}">
+        <p15:threadingInfo xmlns:p15="http://schemas.microsoft.com/office/powerpoint/2012/main" timeZoneBias="300"/>
+      </p:ext>
+    </p:extLst>
+  </p:cm>
 </p:cmLst>
 </file>
 
@@ -248,6 +295,15 @@
   </p:cm>
   <p:cm authorId="2" dt="2020-04-16T17:25:10.834" idx="9">
     <p:pos x="146" y="146"/>
+    <p:text/>
+    <p:extLst>
+      <p:ext uri="{C676402C-5697-4E1C-873F-D02D1690AC5C}">
+        <p15:threadingInfo xmlns:p15="http://schemas.microsoft.com/office/powerpoint/2012/main" timeZoneBias="300"/>
+      </p:ext>
+    </p:extLst>
+  </p:cm>
+  <p:cm authorId="2" dt="2020-04-19T19:24:46.181" idx="17">
+    <p:pos x="282" y="282"/>
     <p:text/>
     <p:extLst>
       <p:ext uri="{C676402C-5697-4E1C-873F-D02D1690AC5C}">
@@ -369,7 +425,7 @@
           <a:p>
             <a:fld id="{00FB8E98-EB83-4166-8CDF-F8D5CC97446D}" type="datetimeFigureOut">
               <a:rPr lang="es-ES" smtClean="0"/>
-              <a:t>16/04/2020</a:t>
+              <a:t>19/04/2020</a:t>
             </a:fld>
             <a:endParaRPr lang="es-ES"/>
           </a:p>
@@ -546,7 +602,7 @@
           <a:p>
             <a:fld id="{9C59F1FC-52BF-40A0-B8CD-E5DB9AB207F2}" type="datetimeFigureOut">
               <a:rPr lang="es-ES" noProof="0" smtClean="0"/>
-              <a:t>16/04/2020</a:t>
+              <a:t>19/04/2020</a:t>
             </a:fld>
             <a:endParaRPr lang="es-ES" noProof="0"/>
           </a:p>
@@ -1395,7 +1451,7 @@
             <a:pPr rtl="0"/>
             <a:fld id="{7F3AD093-6935-4E25-8E83-BEC3D2E3622E}" type="datetime1">
               <a:rPr lang="es-ES" noProof="0" smtClean="0"/>
-              <a:t>16/04/2020</a:t>
+              <a:t>19/04/2020</a:t>
             </a:fld>
             <a:endParaRPr lang="es-ES" noProof="0"/>
           </a:p>
@@ -1660,7 +1716,7 @@
             <a:pPr rtl="0"/>
             <a:fld id="{90FE6873-B7CD-47F1-B4BA-70026F4A4FD4}" type="datetime1">
               <a:rPr lang="es-ES" noProof="0" smtClean="0"/>
-              <a:t>16/04/2020</a:t>
+              <a:t>19/04/2020</a:t>
             </a:fld>
             <a:endParaRPr lang="es-ES" noProof="0"/>
           </a:p>
@@ -1902,7 +1958,7 @@
             <a:pPr rtl="0"/>
             <a:fld id="{96AA1814-B970-47C5-B4E1-BCA0D77E15F3}" type="datetime1">
               <a:rPr lang="es-ES" noProof="0" smtClean="0"/>
-              <a:t>16/04/2020</a:t>
+              <a:t>19/04/2020</a:t>
             </a:fld>
             <a:endParaRPr lang="es-ES" noProof="0"/>
           </a:p>
@@ -2149,7 +2205,7 @@
             <a:pPr rtl="0"/>
             <a:fld id="{3ECF8AC2-1C52-4F78-88EE-331D670B19A5}" type="datetime1">
               <a:rPr lang="es-ES" noProof="0" smtClean="0"/>
-              <a:t>16/04/2020</a:t>
+              <a:t>19/04/2020</a:t>
             </a:fld>
             <a:endParaRPr lang="es-ES" noProof="0"/>
           </a:p>
@@ -2460,7 +2516,7 @@
             <a:pPr rtl="0"/>
             <a:fld id="{FE6CF4E9-F423-4970-91B6-143DF72FA056}" type="datetime1">
               <a:rPr lang="es-ES" noProof="0" smtClean="0"/>
-              <a:t>16/04/2020</a:t>
+              <a:t>19/04/2020</a:t>
             </a:fld>
             <a:endParaRPr lang="es-ES" noProof="0"/>
           </a:p>
@@ -2772,7 +2828,7 @@
             <a:pPr rtl="0"/>
             <a:fld id="{E3955445-6089-478A-9DA1-4738AC4A8C11}" type="datetime1">
               <a:rPr lang="es-ES" noProof="0" smtClean="0"/>
-              <a:t>16/04/2020</a:t>
+              <a:t>19/04/2020</a:t>
             </a:fld>
             <a:endParaRPr lang="es-ES" noProof="0"/>
           </a:p>
@@ -3204,7 +3260,7 @@
             <a:pPr rtl="0"/>
             <a:fld id="{F32D574B-5FDE-4FDF-8F45-99828D8C688F}" type="datetime1">
               <a:rPr lang="es-ES" noProof="0" smtClean="0"/>
-              <a:t>16/04/2020</a:t>
+              <a:t>19/04/2020</a:t>
             </a:fld>
             <a:endParaRPr lang="es-ES" noProof="0"/>
           </a:p>
@@ -3303,7 +3359,7 @@
             <a:pPr rtl="0"/>
             <a:fld id="{5C9631C6-D8ED-4343-819F-B7AEF7D4E056}" type="datetime1">
               <a:rPr lang="es-ES" noProof="0" smtClean="0"/>
-              <a:t>16/04/2020</a:t>
+              <a:t>19/04/2020</a:t>
             </a:fld>
             <a:endParaRPr lang="es-ES" noProof="0"/>
           </a:p>
@@ -3469,7 +3525,7 @@
             <a:pPr rtl="0"/>
             <a:fld id="{146FA238-7AE4-47C1-BF2A-706B9C8FFAA8}" type="datetime1">
               <a:rPr lang="es-ES" noProof="0" smtClean="0"/>
-              <a:t>16/04/2020</a:t>
+              <a:t>19/04/2020</a:t>
             </a:fld>
             <a:endParaRPr lang="es-ES" noProof="0"/>
           </a:p>
@@ -3850,7 +3906,7 @@
             <a:pPr rtl="0"/>
             <a:fld id="{1E6D5EDF-0088-49D6-AAFA-F513F5E3B893}" type="datetime1">
               <a:rPr lang="es-ES" noProof="0" smtClean="0"/>
-              <a:t>16/04/2020</a:t>
+              <a:t>19/04/2020</a:t>
             </a:fld>
             <a:endParaRPr lang="es-ES" noProof="0"/>
           </a:p>
@@ -4143,7 +4199,7 @@
             <a:pPr rtl="0"/>
             <a:fld id="{9E2E0ACB-2DC9-41EC-A846-D82D047DE411}" type="datetime1">
               <a:rPr lang="es-ES" noProof="0" smtClean="0"/>
-              <a:t>16/04/2020</a:t>
+              <a:t>19/04/2020</a:t>
             </a:fld>
             <a:endParaRPr lang="es-ES" noProof="0"/>
           </a:p>
@@ -4357,7 +4413,7 @@
             <a:pPr rtl="0"/>
             <a:fld id="{8DB00A2C-96CA-430C-81E9-81B790CC7C63}" type="datetime1">
               <a:rPr lang="es-ES" noProof="0" smtClean="0"/>
-              <a:t>16/04/2020</a:t>
+              <a:t>19/04/2020</a:t>
             </a:fld>
             <a:endParaRPr lang="es-ES" noProof="0"/>
           </a:p>
@@ -6842,7 +6898,15 @@
           <a:bodyPr/>
           <a:lstStyle/>
           <a:p>
-            <a:endParaRPr lang="es-MX"/>
+            <a:r>
+              <a:rPr lang="es-MX" dirty="0"/>
+              <a:t>Explicar diferencia </a:t>
+            </a:r>
+            <a:r>
+              <a:rPr lang="es-MX" dirty="0" err="1"/>
+              <a:t>simetrica</a:t>
+            </a:r>
+            <a:endParaRPr lang="es-MX" dirty="0"/>
           </a:p>
         </p:txBody>
       </p:sp>
@@ -6932,7 +6996,10 @@
           <a:bodyPr/>
           <a:lstStyle/>
           <a:p>
-            <a:endParaRPr lang="es-MX"/>
+            <a:r>
+              <a:rPr lang="es-MX" dirty="0"/>
+              <a:t>Explicar obtención de Parámetros</a:t>
+            </a:r>
           </a:p>
         </p:txBody>
       </p:sp>
@@ -7037,7 +7104,10 @@
           <a:bodyPr/>
           <a:lstStyle/>
           <a:p>
-            <a:endParaRPr lang="es-MX"/>
+            <a:r>
+              <a:rPr lang="es-MX" dirty="0"/>
+              <a:t>Diseño e implementación de arboles </a:t>
+            </a:r>
           </a:p>
         </p:txBody>
       </p:sp>
@@ -7062,7 +7132,18 @@
           <a:bodyPr/>
           <a:lstStyle/>
           <a:p>
-            <a:endParaRPr lang="es-MX"/>
+            <a:r>
+              <a:rPr lang="es-MX" dirty="0"/>
+              <a:t>Hacer un </a:t>
+            </a:r>
+            <a:r>
+              <a:rPr lang="es-MX" dirty="0" err="1"/>
+              <a:t>pseudocodigo</a:t>
+            </a:r>
+            <a:r>
+              <a:rPr lang="es-MX" dirty="0"/>
+              <a:t> para definir el algoritmo entre árboles</a:t>
+            </a:r>
           </a:p>
         </p:txBody>
       </p:sp>
@@ -7142,7 +7223,10 @@
           <a:bodyPr/>
           <a:lstStyle/>
           <a:p>
-            <a:endParaRPr lang="es-MX"/>
+            <a:r>
+              <a:rPr lang="es-MX" dirty="0"/>
+              <a:t>Implementación y experimentación</a:t>
+            </a:r>
           </a:p>
         </p:txBody>
       </p:sp>
@@ -7247,7 +7331,10 @@
           <a:bodyPr/>
           <a:lstStyle/>
           <a:p>
-            <a:endParaRPr lang="es-MX"/>
+            <a:r>
+              <a:rPr lang="es-MX" dirty="0"/>
+              <a:t>Conclusiones</a:t>
+            </a:r>
           </a:p>
         </p:txBody>
       </p:sp>
@@ -7272,7 +7359,24 @@
           <a:bodyPr/>
           <a:lstStyle/>
           <a:p>
-            <a:endParaRPr lang="es-MX"/>
+            <a:r>
+              <a:rPr lang="es-MX" dirty="0"/>
+              <a:t>Se eligió una distancia de diferencia simétrica revisando artículos de </a:t>
+            </a:r>
+            <a:r>
+              <a:rPr lang="es-MX" dirty="0" err="1"/>
+              <a:t>robinson</a:t>
+            </a:r>
+            <a:endParaRPr lang="es-MX" dirty="0"/>
+          </a:p>
+          <a:p>
+            <a:r>
+              <a:rPr lang="es-MX" dirty="0"/>
+              <a:t>Se   implementó el código para ejecutar los pasos para  poner los 3 tipos de  distancia</a:t>
+            </a:r>
+          </a:p>
+          <a:p>
+            <a:endParaRPr lang="es-MX" dirty="0"/>
           </a:p>
         </p:txBody>
       </p:sp>
@@ -7297,7 +7401,39 @@
           <a:bodyPr/>
           <a:lstStyle/>
           <a:p>
-            <a:endParaRPr lang="es-MX"/>
+            <a:r>
+              <a:rPr lang="es-MX" dirty="0"/>
+              <a:t>Falta implementación y prueba del algoritmo</a:t>
+            </a:r>
+          </a:p>
+          <a:p>
+            <a:r>
+              <a:rPr lang="es-MX" dirty="0"/>
+              <a:t>Estimado de cuando estaría cada cosa</a:t>
+            </a:r>
+          </a:p>
+          <a:p>
+            <a:r>
+              <a:rPr lang="es-MX" dirty="0"/>
+              <a:t>Estimado :	</a:t>
+            </a:r>
+            <a:br>
+              <a:rPr lang="es-MX" dirty="0"/>
+            </a:br>
+            <a:r>
+              <a:rPr lang="es-MX" dirty="0"/>
+              <a:t>1 mayo código y eso ~</a:t>
+            </a:r>
+            <a:br>
+              <a:rPr lang="es-MX" dirty="0"/>
+            </a:br>
+            <a:r>
+              <a:rPr lang="es-MX" dirty="0"/>
+              <a:t>	hasta el 15 experimentación</a:t>
+            </a:r>
+          </a:p>
+          <a:p>
+            <a:endParaRPr lang="es-MX" dirty="0"/>
           </a:p>
         </p:txBody>
       </p:sp>
@@ -8385,20 +8521,20 @@
 </file>
 
 <file path=customXml/item2.xml><?xml version="1.0" encoding="utf-8"?>
+<p:properties xmlns:p="http://schemas.microsoft.com/office/2006/metadata/properties" xmlns:xsi="http://www.w3.org/2001/XMLSchema-instance" xmlns:pc="http://schemas.microsoft.com/office/infopath/2007/PartnerControls">
+  <documentManagement>
+    <MediaServiceKeyPoints xmlns="71af3243-3dd4-4a8d-8c0d-dd76da1f02a5" xsi:nil="true"/>
+  </documentManagement>
+</p:properties>
+</file>
+
+<file path=customXml/item3.xml><?xml version="1.0" encoding="utf-8"?>
 <?mso-contentType ?>
 <FormTemplates xmlns="http://schemas.microsoft.com/sharepoint/v3/contenttype/forms">
   <Display>DocumentLibraryForm</Display>
   <Edit>DocumentLibraryForm</Edit>
   <New>DocumentLibraryForm</New>
 </FormTemplates>
-</file>
-
-<file path=customXml/item3.xml><?xml version="1.0" encoding="utf-8"?>
-<p:properties xmlns:p="http://schemas.microsoft.com/office/2006/metadata/properties" xmlns:xsi="http://www.w3.org/2001/XMLSchema-instance" xmlns:pc="http://schemas.microsoft.com/office/infopath/2007/PartnerControls">
-  <documentManagement>
-    <MediaServiceKeyPoints xmlns="71af3243-3dd4-4a8d-8c0d-dd76da1f02a5" xsi:nil="true"/>
-  </documentManagement>
-</p:properties>
 </file>
 
 <file path=customXml/itemProps1.xml><?xml version="1.0" encoding="utf-8"?>
@@ -8421,14 +8557,6 @@
 </file>
 
 <file path=customXml/itemProps2.xml><?xml version="1.0" encoding="utf-8"?>
-<ds:datastoreItem xmlns:ds="http://schemas.openxmlformats.org/officeDocument/2006/customXml" ds:itemID="{BA0CF3B2-1F0F-4FC5-8002-3E4869ABAD55}">
-  <ds:schemaRefs>
-    <ds:schemaRef ds:uri="http://schemas.microsoft.com/sharepoint/v3/contenttype/forms"/>
-  </ds:schemaRefs>
-</ds:datastoreItem>
-</file>
-
-<file path=customXml/itemProps3.xml><?xml version="1.0" encoding="utf-8"?>
 <ds:datastoreItem xmlns:ds="http://schemas.openxmlformats.org/officeDocument/2006/customXml" ds:itemID="{1EBC12AA-1C15-4500-BC9C-8EE83A441DE9}">
   <ds:schemaRefs>
     <ds:schemaRef ds:uri="http://schemas.microsoft.com/office/2006/metadata/properties"/>
@@ -8436,4 +8564,12 @@
     <ds:schemaRef ds:uri="71af3243-3dd4-4a8d-8c0d-dd76da1f02a5"/>
   </ds:schemaRefs>
 </ds:datastoreItem>
+</file>
+
+<file path=customXml/itemProps3.xml><?xml version="1.0" encoding="utf-8"?>
+<ds:datastoreItem xmlns:ds="http://schemas.openxmlformats.org/officeDocument/2006/customXml" ds:itemID="{BA0CF3B2-1F0F-4FC5-8002-3E4869ABAD55}">
+  <ds:schemaRefs>
+    <ds:schemaRef ds:uri="http://schemas.microsoft.com/sharepoint/v3/contenttype/forms"/>
+  </ds:schemaRefs>
+</ds:datastoreItem>
 </file>
</xml_diff>